<commit_message>
update presentation using diagram
</commit_message>
<xml_diff>
--- a/reports/lvtn/presentation.pptx
+++ b/reports/lvtn/presentation.pptx
@@ -130,6 +130,3392 @@
     </p:ext>
   </p:extLst>
 </p:presentation>
+</file>
+
+<file path=ppt/charts/chart1.xml><?xml version="1.0" encoding="utf-8"?>
+<c:chartSpace xmlns:c="http://schemas.openxmlformats.org/drawingml/2006/chart" xmlns:a="http://schemas.openxmlformats.org/drawingml/2006/main" xmlns:r="http://schemas.openxmlformats.org/officeDocument/2006/relationships">
+  <c:date1904 val="0"/>
+  <c:lang val="en-US"/>
+  <c:roundedCorners val="0"/>
+  <mc:AlternateContent xmlns:mc="http://schemas.openxmlformats.org/markup-compatibility/2006">
+    <mc:Choice xmlns:c14="http://schemas.microsoft.com/office/drawing/2007/8/2/chart" Requires="c14">
+      <c14:style val="102"/>
+    </mc:Choice>
+    <mc:Fallback>
+      <c:style val="2"/>
+    </mc:Fallback>
+  </mc:AlternateContent>
+  <c:chart>
+    <c:title>
+      <c:layout/>
+      <c:overlay val="0"/>
+      <c:spPr>
+        <a:noFill/>
+        <a:ln>
+          <a:noFill/>
+        </a:ln>
+        <a:effectLst/>
+      </c:spPr>
+      <c:txPr>
+        <a:bodyPr rot="0" spcFirstLastPara="1" vertOverflow="ellipsis" vert="horz" wrap="square" anchor="ctr" anchorCtr="1"/>
+        <a:lstStyle/>
+        <a:p>
+          <a:pPr>
+            <a:defRPr sz="1862" b="0" i="0" u="none" strike="noStrike" kern="1200" spc="0" baseline="0">
+              <a:solidFill>
+                <a:schemeClr val="tx1">
+                  <a:lumMod val="65000"/>
+                  <a:lumOff val="35000"/>
+                </a:schemeClr>
+              </a:solidFill>
+              <a:latin typeface="+mn-lt"/>
+              <a:ea typeface="+mn-ea"/>
+              <a:cs typeface="+mn-cs"/>
+            </a:defRPr>
+          </a:pPr>
+          <a:endParaRPr lang="en-US"/>
+        </a:p>
+      </c:txPr>
+    </c:title>
+    <c:autoTitleDeleted val="0"/>
+    <c:plotArea>
+      <c:layout/>
+      <c:pieChart>
+        <c:varyColors val="1"/>
+        <c:ser>
+          <c:idx val="0"/>
+          <c:order val="0"/>
+          <c:tx>
+            <c:strRef>
+              <c:f>Sheet1!$B$1</c:f>
+              <c:strCache>
+                <c:ptCount val="1"/>
+                <c:pt idx="0">
+                  <c:v>Person Pair</c:v>
+                </c:pt>
+              </c:strCache>
+            </c:strRef>
+          </c:tx>
+          <c:dPt>
+            <c:idx val="0"/>
+            <c:bubble3D val="0"/>
+            <c:spPr>
+              <a:solidFill>
+                <a:schemeClr val="accent1"/>
+              </a:solidFill>
+              <a:ln w="19050">
+                <a:solidFill>
+                  <a:schemeClr val="lt1"/>
+                </a:solidFill>
+              </a:ln>
+              <a:effectLst/>
+            </c:spPr>
+          </c:dPt>
+          <c:dPt>
+            <c:idx val="1"/>
+            <c:bubble3D val="0"/>
+            <c:spPr>
+              <a:solidFill>
+                <a:schemeClr val="accent2"/>
+              </a:solidFill>
+              <a:ln w="19050">
+                <a:solidFill>
+                  <a:schemeClr val="lt1"/>
+                </a:solidFill>
+              </a:ln>
+              <a:effectLst/>
+            </c:spPr>
+          </c:dPt>
+          <c:dPt>
+            <c:idx val="2"/>
+            <c:bubble3D val="0"/>
+            <c:spPr>
+              <a:solidFill>
+                <a:schemeClr val="accent3"/>
+              </a:solidFill>
+              <a:ln w="19050">
+                <a:solidFill>
+                  <a:schemeClr val="lt1"/>
+                </a:solidFill>
+              </a:ln>
+              <a:effectLst/>
+            </c:spPr>
+          </c:dPt>
+          <c:dPt>
+            <c:idx val="3"/>
+            <c:bubble3D val="0"/>
+            <c:spPr>
+              <a:solidFill>
+                <a:schemeClr val="accent4"/>
+              </a:solidFill>
+              <a:ln w="19050">
+                <a:solidFill>
+                  <a:schemeClr val="lt1"/>
+                </a:solidFill>
+              </a:ln>
+              <a:effectLst/>
+            </c:spPr>
+          </c:dPt>
+          <c:dLbls>
+            <c:spPr>
+              <a:noFill/>
+              <a:ln>
+                <a:noFill/>
+              </a:ln>
+              <a:effectLst/>
+            </c:spPr>
+            <c:txPr>
+              <a:bodyPr rot="0" spcFirstLastPara="1" vertOverflow="ellipsis" vert="horz" wrap="square" lIns="38100" tIns="19050" rIns="38100" bIns="19050" anchor="ctr" anchorCtr="1">
+                <a:spAutoFit/>
+              </a:bodyPr>
+              <a:lstStyle/>
+              <a:p>
+                <a:pPr>
+                  <a:defRPr sz="1197" b="0" i="0" u="none" strike="noStrike" kern="1200" baseline="0">
+                    <a:solidFill>
+                      <a:schemeClr val="tx1">
+                        <a:lumMod val="75000"/>
+                        <a:lumOff val="25000"/>
+                      </a:schemeClr>
+                    </a:solidFill>
+                    <a:latin typeface="+mn-lt"/>
+                    <a:ea typeface="+mn-ea"/>
+                    <a:cs typeface="+mn-cs"/>
+                  </a:defRPr>
+                </a:pPr>
+                <a:endParaRPr lang="en-US"/>
+              </a:p>
+            </c:txPr>
+            <c:dLblPos val="ctr"/>
+            <c:showLegendKey val="0"/>
+            <c:showVal val="1"/>
+            <c:showCatName val="0"/>
+            <c:showSerName val="0"/>
+            <c:showPercent val="0"/>
+            <c:showBubbleSize val="0"/>
+            <c:showLeaderLines val="1"/>
+            <c:leaderLines>
+              <c:spPr>
+                <a:ln w="9525" cap="flat" cmpd="sng" algn="ctr">
+                  <a:solidFill>
+                    <a:schemeClr val="tx1">
+                      <a:lumMod val="35000"/>
+                      <a:lumOff val="65000"/>
+                    </a:schemeClr>
+                  </a:solidFill>
+                  <a:round/>
+                </a:ln>
+                <a:effectLst/>
+              </c:spPr>
+            </c:leaderLines>
+            <c:extLst>
+              <c:ext xmlns:c15="http://schemas.microsoft.com/office/drawing/2012/chart" uri="{CE6537A1-D6FC-4f65-9D91-7224C49458BB}">
+                <c15:layout/>
+              </c:ext>
+            </c:extLst>
+          </c:dLbls>
+          <c:cat>
+            <c:strRef>
+              <c:f>Sheet1!$A$2:$A$5</c:f>
+              <c:strCache>
+                <c:ptCount val="2"/>
+                <c:pt idx="0">
+                  <c:v>Implemented</c:v>
+                </c:pt>
+                <c:pt idx="1">
+                  <c:v>Unimplemented</c:v>
+                </c:pt>
+              </c:strCache>
+            </c:strRef>
+          </c:cat>
+          <c:val>
+            <c:numRef>
+              <c:f>Sheet1!$B$2:$B$5</c:f>
+              <c:numCache>
+                <c:formatCode>General</c:formatCode>
+                <c:ptCount val="4"/>
+                <c:pt idx="0">
+                  <c:v>15</c:v>
+                </c:pt>
+                <c:pt idx="1">
+                  <c:v>5</c:v>
+                </c:pt>
+              </c:numCache>
+            </c:numRef>
+          </c:val>
+        </c:ser>
+        <c:dLbls>
+          <c:showLegendKey val="0"/>
+          <c:showVal val="0"/>
+          <c:showCatName val="0"/>
+          <c:showSerName val="0"/>
+          <c:showPercent val="0"/>
+          <c:showBubbleSize val="0"/>
+          <c:showLeaderLines val="1"/>
+        </c:dLbls>
+        <c:firstSliceAng val="0"/>
+      </c:pieChart>
+      <c:spPr>
+        <a:noFill/>
+        <a:ln>
+          <a:noFill/>
+        </a:ln>
+        <a:effectLst/>
+      </c:spPr>
+    </c:plotArea>
+    <c:plotVisOnly val="1"/>
+    <c:dispBlanksAs val="gap"/>
+    <c:showDLblsOverMax val="0"/>
+  </c:chart>
+  <c:spPr>
+    <a:noFill/>
+    <a:ln>
+      <a:noFill/>
+    </a:ln>
+    <a:effectLst/>
+  </c:spPr>
+  <c:txPr>
+    <a:bodyPr/>
+    <a:lstStyle/>
+    <a:p>
+      <a:pPr>
+        <a:defRPr/>
+      </a:pPr>
+      <a:endParaRPr lang="en-US"/>
+    </a:p>
+  </c:txPr>
+  <c:externalData r:id="rId3">
+    <c:autoUpdate val="0"/>
+  </c:externalData>
+</c:chartSpace>
+</file>
+
+<file path=ppt/charts/chart2.xml><?xml version="1.0" encoding="utf-8"?>
+<c:chartSpace xmlns:c="http://schemas.openxmlformats.org/drawingml/2006/chart" xmlns:a="http://schemas.openxmlformats.org/drawingml/2006/main" xmlns:r="http://schemas.openxmlformats.org/officeDocument/2006/relationships">
+  <c:date1904 val="0"/>
+  <c:lang val="en-US"/>
+  <c:roundedCorners val="0"/>
+  <mc:AlternateContent xmlns:mc="http://schemas.openxmlformats.org/markup-compatibility/2006">
+    <mc:Choice xmlns:c14="http://schemas.microsoft.com/office/drawing/2007/8/2/chart" Requires="c14">
+      <c14:style val="102"/>
+    </mc:Choice>
+    <mc:Fallback>
+      <c:style val="2"/>
+    </mc:Fallback>
+  </mc:AlternateContent>
+  <c:chart>
+    <c:title>
+      <c:layout/>
+      <c:overlay val="0"/>
+      <c:spPr>
+        <a:noFill/>
+        <a:ln>
+          <a:noFill/>
+        </a:ln>
+        <a:effectLst/>
+      </c:spPr>
+      <c:txPr>
+        <a:bodyPr rot="0" spcFirstLastPara="1" vertOverflow="ellipsis" vert="horz" wrap="square" anchor="ctr" anchorCtr="1"/>
+        <a:lstStyle/>
+        <a:p>
+          <a:pPr>
+            <a:defRPr sz="1862" b="0" i="0" u="none" strike="noStrike" kern="1200" spc="0" baseline="0">
+              <a:solidFill>
+                <a:schemeClr val="tx1">
+                  <a:lumMod val="65000"/>
+                  <a:lumOff val="35000"/>
+                </a:schemeClr>
+              </a:solidFill>
+              <a:latin typeface="+mn-lt"/>
+              <a:ea typeface="+mn-ea"/>
+              <a:cs typeface="+mn-cs"/>
+            </a:defRPr>
+          </a:pPr>
+          <a:endParaRPr lang="en-US"/>
+        </a:p>
+      </c:txPr>
+    </c:title>
+    <c:autoTitleDeleted val="0"/>
+    <c:plotArea>
+      <c:layout/>
+      <c:pieChart>
+        <c:varyColors val="1"/>
+        <c:ser>
+          <c:idx val="0"/>
+          <c:order val="0"/>
+          <c:tx>
+            <c:strRef>
+              <c:f>Sheet1!$B$1</c:f>
+              <c:strCache>
+                <c:ptCount val="1"/>
+                <c:pt idx="0">
+                  <c:v>Pronoun Instance</c:v>
+                </c:pt>
+              </c:strCache>
+            </c:strRef>
+          </c:tx>
+          <c:dPt>
+            <c:idx val="0"/>
+            <c:bubble3D val="0"/>
+            <c:spPr>
+              <a:solidFill>
+                <a:schemeClr val="accent1"/>
+              </a:solidFill>
+              <a:ln w="19050">
+                <a:solidFill>
+                  <a:schemeClr val="lt1"/>
+                </a:solidFill>
+              </a:ln>
+              <a:effectLst/>
+            </c:spPr>
+          </c:dPt>
+          <c:dPt>
+            <c:idx val="1"/>
+            <c:bubble3D val="0"/>
+            <c:explosion val="2"/>
+            <c:spPr>
+              <a:solidFill>
+                <a:schemeClr val="accent2"/>
+              </a:solidFill>
+              <a:ln w="19050">
+                <a:solidFill>
+                  <a:schemeClr val="lt1"/>
+                </a:solidFill>
+              </a:ln>
+              <a:effectLst/>
+            </c:spPr>
+          </c:dPt>
+          <c:dPt>
+            <c:idx val="2"/>
+            <c:bubble3D val="0"/>
+            <c:spPr>
+              <a:solidFill>
+                <a:schemeClr val="accent3"/>
+              </a:solidFill>
+              <a:ln w="19050">
+                <a:solidFill>
+                  <a:schemeClr val="lt1"/>
+                </a:solidFill>
+              </a:ln>
+              <a:effectLst/>
+            </c:spPr>
+          </c:dPt>
+          <c:dPt>
+            <c:idx val="3"/>
+            <c:bubble3D val="0"/>
+            <c:spPr>
+              <a:solidFill>
+                <a:schemeClr val="accent4"/>
+              </a:solidFill>
+              <a:ln w="19050">
+                <a:solidFill>
+                  <a:schemeClr val="lt1"/>
+                </a:solidFill>
+              </a:ln>
+              <a:effectLst/>
+            </c:spPr>
+          </c:dPt>
+          <c:dLbls>
+            <c:spPr>
+              <a:noFill/>
+              <a:ln>
+                <a:noFill/>
+              </a:ln>
+              <a:effectLst/>
+            </c:spPr>
+            <c:txPr>
+              <a:bodyPr rot="0" spcFirstLastPara="1" vertOverflow="ellipsis" vert="horz" wrap="square" lIns="38100" tIns="19050" rIns="38100" bIns="19050" anchor="ctr" anchorCtr="1">
+                <a:spAutoFit/>
+              </a:bodyPr>
+              <a:lstStyle/>
+              <a:p>
+                <a:pPr>
+                  <a:defRPr sz="1197" b="0" i="0" u="none" strike="noStrike" kern="1200" baseline="0">
+                    <a:solidFill>
+                      <a:schemeClr val="tx1">
+                        <a:lumMod val="75000"/>
+                        <a:lumOff val="25000"/>
+                      </a:schemeClr>
+                    </a:solidFill>
+                    <a:latin typeface="+mn-lt"/>
+                    <a:ea typeface="+mn-ea"/>
+                    <a:cs typeface="+mn-cs"/>
+                  </a:defRPr>
+                </a:pPr>
+                <a:endParaRPr lang="en-US"/>
+              </a:p>
+            </c:txPr>
+            <c:dLblPos val="ctr"/>
+            <c:showLegendKey val="0"/>
+            <c:showVal val="1"/>
+            <c:showCatName val="0"/>
+            <c:showSerName val="0"/>
+            <c:showPercent val="0"/>
+            <c:showBubbleSize val="0"/>
+            <c:showLeaderLines val="1"/>
+            <c:leaderLines>
+              <c:spPr>
+                <a:ln w="9525" cap="flat" cmpd="sng" algn="ctr">
+                  <a:solidFill>
+                    <a:schemeClr val="tx1">
+                      <a:lumMod val="35000"/>
+                      <a:lumOff val="65000"/>
+                    </a:schemeClr>
+                  </a:solidFill>
+                  <a:round/>
+                </a:ln>
+                <a:effectLst/>
+              </c:spPr>
+            </c:leaderLines>
+            <c:extLst>
+              <c:ext xmlns:c15="http://schemas.microsoft.com/office/drawing/2012/chart" uri="{CE6537A1-D6FC-4f65-9D91-7224C49458BB}">
+                <c15:layout/>
+              </c:ext>
+            </c:extLst>
+          </c:dLbls>
+          <c:cat>
+            <c:strRef>
+              <c:f>Sheet1!$A$2:$A$5</c:f>
+              <c:strCache>
+                <c:ptCount val="2"/>
+                <c:pt idx="0">
+                  <c:v>Implemented</c:v>
+                </c:pt>
+                <c:pt idx="1">
+                  <c:v>Unimplemented</c:v>
+                </c:pt>
+              </c:strCache>
+            </c:strRef>
+          </c:cat>
+          <c:val>
+            <c:numRef>
+              <c:f>Sheet1!$B$2:$B$5</c:f>
+              <c:numCache>
+                <c:formatCode>General</c:formatCode>
+                <c:ptCount val="4"/>
+                <c:pt idx="0">
+                  <c:v>7</c:v>
+                </c:pt>
+                <c:pt idx="1">
+                  <c:v>6</c:v>
+                </c:pt>
+              </c:numCache>
+            </c:numRef>
+          </c:val>
+        </c:ser>
+        <c:dLbls>
+          <c:showLegendKey val="0"/>
+          <c:showVal val="0"/>
+          <c:showCatName val="0"/>
+          <c:showSerName val="0"/>
+          <c:showPercent val="0"/>
+          <c:showBubbleSize val="0"/>
+          <c:showLeaderLines val="1"/>
+        </c:dLbls>
+        <c:firstSliceAng val="0"/>
+      </c:pieChart>
+      <c:spPr>
+        <a:noFill/>
+        <a:ln>
+          <a:noFill/>
+        </a:ln>
+        <a:effectLst/>
+      </c:spPr>
+    </c:plotArea>
+    <c:plotVisOnly val="1"/>
+    <c:dispBlanksAs val="gap"/>
+    <c:showDLblsOverMax val="0"/>
+  </c:chart>
+  <c:spPr>
+    <a:noFill/>
+    <a:ln>
+      <a:noFill/>
+    </a:ln>
+    <a:effectLst/>
+  </c:spPr>
+  <c:txPr>
+    <a:bodyPr/>
+    <a:lstStyle/>
+    <a:p>
+      <a:pPr>
+        <a:defRPr/>
+      </a:pPr>
+      <a:endParaRPr lang="en-US"/>
+    </a:p>
+  </c:txPr>
+  <c:externalData r:id="rId3">
+    <c:autoUpdate val="0"/>
+  </c:externalData>
+</c:chartSpace>
+</file>
+
+<file path=ppt/charts/chart3.xml><?xml version="1.0" encoding="utf-8"?>
+<c:chartSpace xmlns:c="http://schemas.openxmlformats.org/drawingml/2006/chart" xmlns:a="http://schemas.openxmlformats.org/drawingml/2006/main" xmlns:r="http://schemas.openxmlformats.org/officeDocument/2006/relationships">
+  <c:date1904 val="0"/>
+  <c:lang val="en-US"/>
+  <c:roundedCorners val="0"/>
+  <mc:AlternateContent xmlns:mc="http://schemas.openxmlformats.org/markup-compatibility/2006">
+    <mc:Choice xmlns:c14="http://schemas.microsoft.com/office/drawing/2007/8/2/chart" Requires="c14">
+      <c14:style val="102"/>
+    </mc:Choice>
+    <mc:Fallback>
+      <c:style val="2"/>
+    </mc:Fallback>
+  </mc:AlternateContent>
+  <c:chart>
+    <c:title>
+      <c:layout/>
+      <c:overlay val="0"/>
+      <c:spPr>
+        <a:noFill/>
+        <a:ln>
+          <a:noFill/>
+        </a:ln>
+        <a:effectLst/>
+      </c:spPr>
+      <c:txPr>
+        <a:bodyPr rot="0" spcFirstLastPara="1" vertOverflow="ellipsis" vert="horz" wrap="square" anchor="ctr" anchorCtr="1"/>
+        <a:lstStyle/>
+        <a:p>
+          <a:pPr>
+            <a:defRPr sz="1862" b="0" i="0" u="none" strike="noStrike" kern="1200" spc="0" baseline="0">
+              <a:solidFill>
+                <a:schemeClr val="tx1">
+                  <a:lumMod val="65000"/>
+                  <a:lumOff val="35000"/>
+                </a:schemeClr>
+              </a:solidFill>
+              <a:latin typeface="+mn-lt"/>
+              <a:ea typeface="+mn-ea"/>
+              <a:cs typeface="+mn-cs"/>
+            </a:defRPr>
+          </a:pPr>
+          <a:endParaRPr lang="en-US"/>
+        </a:p>
+      </c:txPr>
+    </c:title>
+    <c:autoTitleDeleted val="0"/>
+    <c:plotArea>
+      <c:layout/>
+      <c:pieChart>
+        <c:varyColors val="1"/>
+        <c:ser>
+          <c:idx val="0"/>
+          <c:order val="0"/>
+          <c:tx>
+            <c:strRef>
+              <c:f>Sheet1!$B$1</c:f>
+              <c:strCache>
+                <c:ptCount val="1"/>
+                <c:pt idx="0">
+                  <c:v>Person Instance</c:v>
+                </c:pt>
+              </c:strCache>
+            </c:strRef>
+          </c:tx>
+          <c:dPt>
+            <c:idx val="0"/>
+            <c:bubble3D val="0"/>
+            <c:spPr>
+              <a:solidFill>
+                <a:schemeClr val="accent1"/>
+              </a:solidFill>
+              <a:ln w="19050">
+                <a:solidFill>
+                  <a:schemeClr val="lt1"/>
+                </a:solidFill>
+              </a:ln>
+              <a:effectLst/>
+            </c:spPr>
+          </c:dPt>
+          <c:dPt>
+            <c:idx val="1"/>
+            <c:bubble3D val="0"/>
+            <c:spPr>
+              <a:solidFill>
+                <a:schemeClr val="accent2"/>
+              </a:solidFill>
+              <a:ln w="19050">
+                <a:solidFill>
+                  <a:schemeClr val="lt1"/>
+                </a:solidFill>
+              </a:ln>
+              <a:effectLst/>
+            </c:spPr>
+          </c:dPt>
+          <c:dPt>
+            <c:idx val="2"/>
+            <c:bubble3D val="0"/>
+            <c:spPr>
+              <a:solidFill>
+                <a:schemeClr val="accent3"/>
+              </a:solidFill>
+              <a:ln w="19050">
+                <a:solidFill>
+                  <a:schemeClr val="lt1"/>
+                </a:solidFill>
+              </a:ln>
+              <a:effectLst/>
+            </c:spPr>
+          </c:dPt>
+          <c:dPt>
+            <c:idx val="3"/>
+            <c:bubble3D val="0"/>
+            <c:spPr>
+              <a:solidFill>
+                <a:schemeClr val="accent4"/>
+              </a:solidFill>
+              <a:ln w="19050">
+                <a:solidFill>
+                  <a:schemeClr val="lt1"/>
+                </a:solidFill>
+              </a:ln>
+              <a:effectLst/>
+            </c:spPr>
+          </c:dPt>
+          <c:dLbls>
+            <c:spPr>
+              <a:noFill/>
+              <a:ln>
+                <a:noFill/>
+              </a:ln>
+              <a:effectLst/>
+            </c:spPr>
+            <c:txPr>
+              <a:bodyPr rot="0" spcFirstLastPara="1" vertOverflow="ellipsis" vert="horz" wrap="square" lIns="38100" tIns="19050" rIns="38100" bIns="19050" anchor="ctr" anchorCtr="1">
+                <a:spAutoFit/>
+              </a:bodyPr>
+              <a:lstStyle/>
+              <a:p>
+                <a:pPr>
+                  <a:defRPr sz="1197" b="0" i="0" u="none" strike="noStrike" kern="1200" baseline="0">
+                    <a:solidFill>
+                      <a:schemeClr val="tx1">
+                        <a:lumMod val="75000"/>
+                        <a:lumOff val="25000"/>
+                      </a:schemeClr>
+                    </a:solidFill>
+                    <a:latin typeface="+mn-lt"/>
+                    <a:ea typeface="+mn-ea"/>
+                    <a:cs typeface="+mn-cs"/>
+                  </a:defRPr>
+                </a:pPr>
+                <a:endParaRPr lang="en-US"/>
+              </a:p>
+            </c:txPr>
+            <c:dLblPos val="ctr"/>
+            <c:showLegendKey val="0"/>
+            <c:showVal val="1"/>
+            <c:showCatName val="0"/>
+            <c:showSerName val="0"/>
+            <c:showPercent val="0"/>
+            <c:showBubbleSize val="0"/>
+            <c:showLeaderLines val="1"/>
+            <c:leaderLines>
+              <c:spPr>
+                <a:ln w="9525" cap="flat" cmpd="sng" algn="ctr">
+                  <a:solidFill>
+                    <a:schemeClr val="tx1">
+                      <a:lumMod val="35000"/>
+                      <a:lumOff val="65000"/>
+                    </a:schemeClr>
+                  </a:solidFill>
+                  <a:round/>
+                </a:ln>
+                <a:effectLst/>
+              </c:spPr>
+            </c:leaderLines>
+            <c:extLst>
+              <c:ext xmlns:c15="http://schemas.microsoft.com/office/drawing/2012/chart" uri="{CE6537A1-D6FC-4f65-9D91-7224C49458BB}">
+                <c15:layout/>
+              </c:ext>
+            </c:extLst>
+          </c:dLbls>
+          <c:cat>
+            <c:strRef>
+              <c:f>Sheet1!$A$2:$A$3</c:f>
+              <c:strCache>
+                <c:ptCount val="2"/>
+                <c:pt idx="0">
+                  <c:v>Implemented</c:v>
+                </c:pt>
+                <c:pt idx="1">
+                  <c:v>Unimplemented</c:v>
+                </c:pt>
+              </c:strCache>
+            </c:strRef>
+          </c:cat>
+          <c:val>
+            <c:numRef>
+              <c:f>Sheet1!$B$2:$B$3</c:f>
+              <c:numCache>
+                <c:formatCode>General</c:formatCode>
+                <c:ptCount val="2"/>
+                <c:pt idx="0">
+                  <c:v>12</c:v>
+                </c:pt>
+                <c:pt idx="1">
+                  <c:v>17</c:v>
+                </c:pt>
+              </c:numCache>
+            </c:numRef>
+          </c:val>
+        </c:ser>
+        <c:dLbls>
+          <c:showLegendKey val="0"/>
+          <c:showVal val="0"/>
+          <c:showCatName val="0"/>
+          <c:showSerName val="0"/>
+          <c:showPercent val="0"/>
+          <c:showBubbleSize val="0"/>
+          <c:showLeaderLines val="1"/>
+        </c:dLbls>
+        <c:firstSliceAng val="0"/>
+      </c:pieChart>
+      <c:spPr>
+        <a:noFill/>
+        <a:ln>
+          <a:noFill/>
+        </a:ln>
+        <a:effectLst/>
+      </c:spPr>
+    </c:plotArea>
+    <c:legend>
+      <c:legendPos val="r"/>
+      <c:layout/>
+      <c:overlay val="0"/>
+      <c:spPr>
+        <a:noFill/>
+        <a:ln>
+          <a:noFill/>
+        </a:ln>
+        <a:effectLst/>
+      </c:spPr>
+      <c:txPr>
+        <a:bodyPr rot="0" spcFirstLastPara="1" vertOverflow="ellipsis" vert="horz" wrap="square" anchor="ctr" anchorCtr="1"/>
+        <a:lstStyle/>
+        <a:p>
+          <a:pPr>
+            <a:defRPr sz="1197" b="0" i="0" u="none" strike="noStrike" kern="1200" baseline="0">
+              <a:solidFill>
+                <a:schemeClr val="tx1">
+                  <a:lumMod val="65000"/>
+                  <a:lumOff val="35000"/>
+                </a:schemeClr>
+              </a:solidFill>
+              <a:latin typeface="+mn-lt"/>
+              <a:ea typeface="+mn-ea"/>
+              <a:cs typeface="+mn-cs"/>
+            </a:defRPr>
+          </a:pPr>
+          <a:endParaRPr lang="en-US"/>
+        </a:p>
+      </c:txPr>
+    </c:legend>
+    <c:plotVisOnly val="1"/>
+    <c:dispBlanksAs val="gap"/>
+    <c:showDLblsOverMax val="0"/>
+  </c:chart>
+  <c:spPr>
+    <a:noFill/>
+    <a:ln>
+      <a:noFill/>
+    </a:ln>
+    <a:effectLst/>
+  </c:spPr>
+  <c:txPr>
+    <a:bodyPr/>
+    <a:lstStyle/>
+    <a:p>
+      <a:pPr>
+        <a:defRPr/>
+      </a:pPr>
+      <a:endParaRPr lang="en-US"/>
+    </a:p>
+  </c:txPr>
+  <c:externalData r:id="rId3">
+    <c:autoUpdate val="0"/>
+  </c:externalData>
+</c:chartSpace>
+</file>
+
+<file path=ppt/charts/chart4.xml><?xml version="1.0" encoding="utf-8"?>
+<c:chartSpace xmlns:c="http://schemas.openxmlformats.org/drawingml/2006/chart" xmlns:a="http://schemas.openxmlformats.org/drawingml/2006/main" xmlns:r="http://schemas.openxmlformats.org/officeDocument/2006/relationships">
+  <c:date1904 val="0"/>
+  <c:lang val="en-US"/>
+  <c:roundedCorners val="0"/>
+  <mc:AlternateContent xmlns:mc="http://schemas.openxmlformats.org/markup-compatibility/2006">
+    <mc:Choice xmlns:c14="http://schemas.microsoft.com/office/drawing/2007/8/2/chart" Requires="c14">
+      <c14:style val="102"/>
+    </mc:Choice>
+    <mc:Fallback>
+      <c:style val="2"/>
+    </mc:Fallback>
+  </mc:AlternateContent>
+  <c:chart>
+    <c:title>
+      <c:layout/>
+      <c:overlay val="0"/>
+      <c:spPr>
+        <a:noFill/>
+        <a:ln>
+          <a:noFill/>
+        </a:ln>
+        <a:effectLst/>
+      </c:spPr>
+      <c:txPr>
+        <a:bodyPr rot="0" spcFirstLastPara="1" vertOverflow="ellipsis" vert="horz" wrap="square" anchor="ctr" anchorCtr="1"/>
+        <a:lstStyle/>
+        <a:p>
+          <a:pPr>
+            <a:defRPr sz="1862" b="0" i="0" u="none" strike="noStrike" kern="1200" spc="0" baseline="0">
+              <a:solidFill>
+                <a:schemeClr val="tx1">
+                  <a:lumMod val="65000"/>
+                  <a:lumOff val="35000"/>
+                </a:schemeClr>
+              </a:solidFill>
+              <a:latin typeface="+mn-lt"/>
+              <a:ea typeface="+mn-ea"/>
+              <a:cs typeface="+mn-cs"/>
+            </a:defRPr>
+          </a:pPr>
+          <a:endParaRPr lang="en-US"/>
+        </a:p>
+      </c:txPr>
+    </c:title>
+    <c:autoTitleDeleted val="0"/>
+    <c:plotArea>
+      <c:layout/>
+      <c:barChart>
+        <c:barDir val="col"/>
+        <c:grouping val="clustered"/>
+        <c:varyColors val="0"/>
+        <c:ser>
+          <c:idx val="0"/>
+          <c:order val="0"/>
+          <c:tx>
+            <c:strRef>
+              <c:f>Sheet1!$B$1</c:f>
+              <c:strCache>
+                <c:ptCount val="1"/>
+                <c:pt idx="0">
+                  <c:v>Percentage</c:v>
+                </c:pt>
+              </c:strCache>
+            </c:strRef>
+          </c:tx>
+          <c:spPr>
+            <a:solidFill>
+              <a:schemeClr val="accent1"/>
+            </a:solidFill>
+            <a:ln>
+              <a:noFill/>
+            </a:ln>
+            <a:effectLst/>
+          </c:spPr>
+          <c:invertIfNegative val="0"/>
+          <c:dLbls>
+            <c:spPr>
+              <a:noFill/>
+              <a:ln>
+                <a:noFill/>
+              </a:ln>
+              <a:effectLst/>
+            </c:spPr>
+            <c:txPr>
+              <a:bodyPr rot="0" spcFirstLastPara="1" vertOverflow="ellipsis" vert="horz" wrap="square" lIns="38100" tIns="19050" rIns="38100" bIns="19050" anchor="ctr" anchorCtr="1">
+                <a:spAutoFit/>
+              </a:bodyPr>
+              <a:lstStyle/>
+              <a:p>
+                <a:pPr>
+                  <a:defRPr sz="1197" b="0" i="0" u="none" strike="noStrike" kern="1200" baseline="0">
+                    <a:solidFill>
+                      <a:schemeClr val="tx1">
+                        <a:lumMod val="75000"/>
+                        <a:lumOff val="25000"/>
+                      </a:schemeClr>
+                    </a:solidFill>
+                    <a:latin typeface="+mn-lt"/>
+                    <a:ea typeface="+mn-ea"/>
+                    <a:cs typeface="+mn-cs"/>
+                  </a:defRPr>
+                </a:pPr>
+                <a:endParaRPr lang="en-US"/>
+              </a:p>
+            </c:txPr>
+            <c:dLblPos val="outEnd"/>
+            <c:showLegendKey val="0"/>
+            <c:showVal val="1"/>
+            <c:showCatName val="0"/>
+            <c:showSerName val="0"/>
+            <c:showPercent val="0"/>
+            <c:showBubbleSize val="0"/>
+            <c:showLeaderLines val="0"/>
+            <c:extLst>
+              <c:ext xmlns:c15="http://schemas.microsoft.com/office/drawing/2012/chart" uri="{CE6537A1-D6FC-4f65-9D91-7224C49458BB}">
+                <c15:layout/>
+                <c15:showLeaderLines val="1"/>
+                <c15:leaderLines>
+                  <c:spPr>
+                    <a:ln w="9525" cap="flat" cmpd="sng" algn="ctr">
+                      <a:solidFill>
+                        <a:schemeClr val="tx1">
+                          <a:lumMod val="35000"/>
+                          <a:lumOff val="65000"/>
+                        </a:schemeClr>
+                      </a:solidFill>
+                      <a:round/>
+                    </a:ln>
+                    <a:effectLst/>
+                  </c:spPr>
+                </c15:leaderLines>
+              </c:ext>
+            </c:extLst>
+          </c:dLbls>
+          <c:cat>
+            <c:strRef>
+              <c:f>Sheet1!$A$2:$A$4</c:f>
+              <c:strCache>
+                <c:ptCount val="3"/>
+                <c:pt idx="0">
+                  <c:v>Person Instance</c:v>
+                </c:pt>
+                <c:pt idx="1">
+                  <c:v>Person Pair</c:v>
+                </c:pt>
+                <c:pt idx="2">
+                  <c:v>Pronoun Instance</c:v>
+                </c:pt>
+              </c:strCache>
+            </c:strRef>
+          </c:cat>
+          <c:val>
+            <c:numRef>
+              <c:f>Sheet1!$B$2:$B$4</c:f>
+              <c:numCache>
+                <c:formatCode>General</c:formatCode>
+                <c:ptCount val="3"/>
+                <c:pt idx="0">
+                  <c:v>78.45</c:v>
+                </c:pt>
+                <c:pt idx="1">
+                  <c:v>63.91</c:v>
+                </c:pt>
+                <c:pt idx="2">
+                  <c:v>72.95</c:v>
+                </c:pt>
+              </c:numCache>
+            </c:numRef>
+          </c:val>
+        </c:ser>
+        <c:dLbls>
+          <c:dLblPos val="outEnd"/>
+          <c:showLegendKey val="0"/>
+          <c:showVal val="1"/>
+          <c:showCatName val="0"/>
+          <c:showSerName val="0"/>
+          <c:showPercent val="0"/>
+          <c:showBubbleSize val="0"/>
+        </c:dLbls>
+        <c:gapWidth val="219"/>
+        <c:overlap val="-27"/>
+        <c:axId val="211311840"/>
+        <c:axId val="212286576"/>
+      </c:barChart>
+      <c:catAx>
+        <c:axId val="211311840"/>
+        <c:scaling>
+          <c:orientation val="minMax"/>
+        </c:scaling>
+        <c:delete val="0"/>
+        <c:axPos val="b"/>
+        <c:numFmt formatCode="General" sourceLinked="1"/>
+        <c:majorTickMark val="none"/>
+        <c:minorTickMark val="none"/>
+        <c:tickLblPos val="nextTo"/>
+        <c:spPr>
+          <a:noFill/>
+          <a:ln w="9525" cap="flat" cmpd="sng" algn="ctr">
+            <a:solidFill>
+              <a:schemeClr val="tx1">
+                <a:lumMod val="15000"/>
+                <a:lumOff val="85000"/>
+              </a:schemeClr>
+            </a:solidFill>
+            <a:round/>
+          </a:ln>
+          <a:effectLst/>
+        </c:spPr>
+        <c:txPr>
+          <a:bodyPr rot="-60000000" spcFirstLastPara="1" vertOverflow="ellipsis" vert="horz" wrap="square" anchor="ctr" anchorCtr="1"/>
+          <a:lstStyle/>
+          <a:p>
+            <a:pPr>
+              <a:defRPr sz="1197" b="0" i="0" u="none" strike="noStrike" kern="1200" baseline="0">
+                <a:solidFill>
+                  <a:schemeClr val="tx1">
+                    <a:lumMod val="65000"/>
+                    <a:lumOff val="35000"/>
+                  </a:schemeClr>
+                </a:solidFill>
+                <a:latin typeface="+mn-lt"/>
+                <a:ea typeface="+mn-ea"/>
+                <a:cs typeface="+mn-cs"/>
+              </a:defRPr>
+            </a:pPr>
+            <a:endParaRPr lang="en-US"/>
+          </a:p>
+        </c:txPr>
+        <c:crossAx val="212286576"/>
+        <c:crosses val="autoZero"/>
+        <c:auto val="1"/>
+        <c:lblAlgn val="ctr"/>
+        <c:lblOffset val="100"/>
+        <c:noMultiLvlLbl val="0"/>
+      </c:catAx>
+      <c:valAx>
+        <c:axId val="212286576"/>
+        <c:scaling>
+          <c:orientation val="minMax"/>
+        </c:scaling>
+        <c:delete val="0"/>
+        <c:axPos val="l"/>
+        <c:majorGridlines>
+          <c:spPr>
+            <a:ln w="9525" cap="flat" cmpd="sng" algn="ctr">
+              <a:solidFill>
+                <a:schemeClr val="tx1">
+                  <a:lumMod val="15000"/>
+                  <a:lumOff val="85000"/>
+                </a:schemeClr>
+              </a:solidFill>
+              <a:round/>
+            </a:ln>
+            <a:effectLst/>
+          </c:spPr>
+        </c:majorGridlines>
+        <c:numFmt formatCode="General" sourceLinked="1"/>
+        <c:majorTickMark val="none"/>
+        <c:minorTickMark val="none"/>
+        <c:tickLblPos val="nextTo"/>
+        <c:spPr>
+          <a:noFill/>
+          <a:ln>
+            <a:noFill/>
+          </a:ln>
+          <a:effectLst/>
+        </c:spPr>
+        <c:txPr>
+          <a:bodyPr rot="-60000000" spcFirstLastPara="1" vertOverflow="ellipsis" vert="horz" wrap="square" anchor="ctr" anchorCtr="1"/>
+          <a:lstStyle/>
+          <a:p>
+            <a:pPr>
+              <a:defRPr sz="1197" b="0" i="0" u="none" strike="noStrike" kern="1200" baseline="0">
+                <a:solidFill>
+                  <a:schemeClr val="tx1">
+                    <a:lumMod val="65000"/>
+                    <a:lumOff val="35000"/>
+                  </a:schemeClr>
+                </a:solidFill>
+                <a:latin typeface="+mn-lt"/>
+                <a:ea typeface="+mn-ea"/>
+                <a:cs typeface="+mn-cs"/>
+              </a:defRPr>
+            </a:pPr>
+            <a:endParaRPr lang="en-US"/>
+          </a:p>
+        </c:txPr>
+        <c:crossAx val="211311840"/>
+        <c:crosses val="autoZero"/>
+        <c:crossBetween val="between"/>
+      </c:valAx>
+      <c:spPr>
+        <a:noFill/>
+        <a:ln>
+          <a:noFill/>
+        </a:ln>
+        <a:effectLst/>
+      </c:spPr>
+    </c:plotArea>
+    <c:legend>
+      <c:legendPos val="b"/>
+      <c:layout/>
+      <c:overlay val="0"/>
+      <c:spPr>
+        <a:noFill/>
+        <a:ln>
+          <a:noFill/>
+        </a:ln>
+        <a:effectLst/>
+      </c:spPr>
+      <c:txPr>
+        <a:bodyPr rot="0" spcFirstLastPara="1" vertOverflow="ellipsis" vert="horz" wrap="square" anchor="ctr" anchorCtr="1"/>
+        <a:lstStyle/>
+        <a:p>
+          <a:pPr>
+            <a:defRPr sz="1197" b="0" i="0" u="none" strike="noStrike" kern="1200" baseline="0">
+              <a:solidFill>
+                <a:schemeClr val="tx1">
+                  <a:lumMod val="65000"/>
+                  <a:lumOff val="35000"/>
+                </a:schemeClr>
+              </a:solidFill>
+              <a:latin typeface="+mn-lt"/>
+              <a:ea typeface="+mn-ea"/>
+              <a:cs typeface="+mn-cs"/>
+            </a:defRPr>
+          </a:pPr>
+          <a:endParaRPr lang="en-US"/>
+        </a:p>
+      </c:txPr>
+    </c:legend>
+    <c:plotVisOnly val="1"/>
+    <c:dispBlanksAs val="gap"/>
+    <c:showDLblsOverMax val="0"/>
+  </c:chart>
+  <c:spPr>
+    <a:noFill/>
+    <a:ln>
+      <a:noFill/>
+    </a:ln>
+    <a:effectLst/>
+  </c:spPr>
+  <c:txPr>
+    <a:bodyPr/>
+    <a:lstStyle/>
+    <a:p>
+      <a:pPr>
+        <a:defRPr/>
+      </a:pPr>
+      <a:endParaRPr lang="en-US"/>
+    </a:p>
+  </c:txPr>
+  <c:externalData r:id="rId3">
+    <c:autoUpdate val="0"/>
+  </c:externalData>
+</c:chartSpace>
+</file>
+
+<file path=ppt/charts/colors1.xml><?xml version="1.0" encoding="utf-8"?>
+<cs:colorStyle xmlns:cs="http://schemas.microsoft.com/office/drawing/2012/chartStyle" xmlns:a="http://schemas.openxmlformats.org/drawingml/2006/main" meth="cycle" id="10">
+  <a:schemeClr val="accent1"/>
+  <a:schemeClr val="accent2"/>
+  <a:schemeClr val="accent3"/>
+  <a:schemeClr val="accent4"/>
+  <a:schemeClr val="accent5"/>
+  <a:schemeClr val="accent6"/>
+  <cs:variation/>
+  <cs:variation>
+    <a:lumMod val="60000"/>
+  </cs:variation>
+  <cs:variation>
+    <a:lumMod val="80000"/>
+    <a:lumOff val="20000"/>
+  </cs:variation>
+  <cs:variation>
+    <a:lumMod val="80000"/>
+  </cs:variation>
+  <cs:variation>
+    <a:lumMod val="60000"/>
+    <a:lumOff val="40000"/>
+  </cs:variation>
+  <cs:variation>
+    <a:lumMod val="50000"/>
+  </cs:variation>
+  <cs:variation>
+    <a:lumMod val="70000"/>
+    <a:lumOff val="30000"/>
+  </cs:variation>
+  <cs:variation>
+    <a:lumMod val="70000"/>
+  </cs:variation>
+  <cs:variation>
+    <a:lumMod val="50000"/>
+    <a:lumOff val="50000"/>
+  </cs:variation>
+</cs:colorStyle>
+</file>
+
+<file path=ppt/charts/colors2.xml><?xml version="1.0" encoding="utf-8"?>
+<cs:colorStyle xmlns:cs="http://schemas.microsoft.com/office/drawing/2012/chartStyle" xmlns:a="http://schemas.openxmlformats.org/drawingml/2006/main" meth="cycle" id="10">
+  <a:schemeClr val="accent1"/>
+  <a:schemeClr val="accent2"/>
+  <a:schemeClr val="accent3"/>
+  <a:schemeClr val="accent4"/>
+  <a:schemeClr val="accent5"/>
+  <a:schemeClr val="accent6"/>
+  <cs:variation/>
+  <cs:variation>
+    <a:lumMod val="60000"/>
+  </cs:variation>
+  <cs:variation>
+    <a:lumMod val="80000"/>
+    <a:lumOff val="20000"/>
+  </cs:variation>
+  <cs:variation>
+    <a:lumMod val="80000"/>
+  </cs:variation>
+  <cs:variation>
+    <a:lumMod val="60000"/>
+    <a:lumOff val="40000"/>
+  </cs:variation>
+  <cs:variation>
+    <a:lumMod val="50000"/>
+  </cs:variation>
+  <cs:variation>
+    <a:lumMod val="70000"/>
+    <a:lumOff val="30000"/>
+  </cs:variation>
+  <cs:variation>
+    <a:lumMod val="70000"/>
+  </cs:variation>
+  <cs:variation>
+    <a:lumMod val="50000"/>
+    <a:lumOff val="50000"/>
+  </cs:variation>
+</cs:colorStyle>
+</file>
+
+<file path=ppt/charts/colors3.xml><?xml version="1.0" encoding="utf-8"?>
+<cs:colorStyle xmlns:cs="http://schemas.microsoft.com/office/drawing/2012/chartStyle" xmlns:a="http://schemas.openxmlformats.org/drawingml/2006/main" meth="cycle" id="10">
+  <a:schemeClr val="accent1"/>
+  <a:schemeClr val="accent2"/>
+  <a:schemeClr val="accent3"/>
+  <a:schemeClr val="accent4"/>
+  <a:schemeClr val="accent5"/>
+  <a:schemeClr val="accent6"/>
+  <cs:variation/>
+  <cs:variation>
+    <a:lumMod val="60000"/>
+  </cs:variation>
+  <cs:variation>
+    <a:lumMod val="80000"/>
+    <a:lumOff val="20000"/>
+  </cs:variation>
+  <cs:variation>
+    <a:lumMod val="80000"/>
+  </cs:variation>
+  <cs:variation>
+    <a:lumMod val="60000"/>
+    <a:lumOff val="40000"/>
+  </cs:variation>
+  <cs:variation>
+    <a:lumMod val="50000"/>
+  </cs:variation>
+  <cs:variation>
+    <a:lumMod val="70000"/>
+    <a:lumOff val="30000"/>
+  </cs:variation>
+  <cs:variation>
+    <a:lumMod val="70000"/>
+  </cs:variation>
+  <cs:variation>
+    <a:lumMod val="50000"/>
+    <a:lumOff val="50000"/>
+  </cs:variation>
+</cs:colorStyle>
+</file>
+
+<file path=ppt/charts/colors4.xml><?xml version="1.0" encoding="utf-8"?>
+<cs:colorStyle xmlns:cs="http://schemas.microsoft.com/office/drawing/2012/chartStyle" xmlns:a="http://schemas.openxmlformats.org/drawingml/2006/main" meth="cycle" id="10">
+  <a:schemeClr val="accent1"/>
+  <a:schemeClr val="accent2"/>
+  <a:schemeClr val="accent3"/>
+  <a:schemeClr val="accent4"/>
+  <a:schemeClr val="accent5"/>
+  <a:schemeClr val="accent6"/>
+  <cs:variation/>
+  <cs:variation>
+    <a:lumMod val="60000"/>
+  </cs:variation>
+  <cs:variation>
+    <a:lumMod val="80000"/>
+    <a:lumOff val="20000"/>
+  </cs:variation>
+  <cs:variation>
+    <a:lumMod val="80000"/>
+  </cs:variation>
+  <cs:variation>
+    <a:lumMod val="60000"/>
+    <a:lumOff val="40000"/>
+  </cs:variation>
+  <cs:variation>
+    <a:lumMod val="50000"/>
+  </cs:variation>
+  <cs:variation>
+    <a:lumMod val="70000"/>
+    <a:lumOff val="30000"/>
+  </cs:variation>
+  <cs:variation>
+    <a:lumMod val="70000"/>
+  </cs:variation>
+  <cs:variation>
+    <a:lumMod val="50000"/>
+    <a:lumOff val="50000"/>
+  </cs:variation>
+</cs:colorStyle>
+</file>
+
+<file path=ppt/charts/style1.xml><?xml version="1.0" encoding="utf-8"?>
+<cs:chartStyle xmlns:cs="http://schemas.microsoft.com/office/drawing/2012/chartStyle" xmlns:a="http://schemas.openxmlformats.org/drawingml/2006/main" id="251">
+  <cs:axisTitle>
+    <cs:lnRef idx="0"/>
+    <cs:fillRef idx="0"/>
+    <cs:effectRef idx="0"/>
+    <cs:fontRef idx="minor">
+      <a:schemeClr val="tx1">
+        <a:lumMod val="65000"/>
+        <a:lumOff val="35000"/>
+      </a:schemeClr>
+    </cs:fontRef>
+    <cs:defRPr sz="1330" kern="1200"/>
+  </cs:axisTitle>
+  <cs:categoryAxis>
+    <cs:lnRef idx="0"/>
+    <cs:fillRef idx="0"/>
+    <cs:effectRef idx="0"/>
+    <cs:fontRef idx="minor">
+      <a:schemeClr val="tx1">
+        <a:lumMod val="65000"/>
+        <a:lumOff val="35000"/>
+      </a:schemeClr>
+    </cs:fontRef>
+    <cs:spPr>
+      <a:ln w="9525" cap="flat" cmpd="sng" algn="ctr">
+        <a:solidFill>
+          <a:schemeClr val="tx1">
+            <a:lumMod val="15000"/>
+            <a:lumOff val="85000"/>
+          </a:schemeClr>
+        </a:solidFill>
+        <a:round/>
+      </a:ln>
+    </cs:spPr>
+    <cs:defRPr sz="1197" kern="1200"/>
+  </cs:categoryAxis>
+  <cs:chartArea mods="allowNoFillOverride allowNoLineOverride">
+    <cs:lnRef idx="0"/>
+    <cs:fillRef idx="0"/>
+    <cs:effectRef idx="0"/>
+    <cs:fontRef idx="minor">
+      <a:schemeClr val="tx1"/>
+    </cs:fontRef>
+    <cs:spPr>
+      <a:solidFill>
+        <a:schemeClr val="bg1"/>
+      </a:solidFill>
+      <a:ln w="9525" cap="flat" cmpd="sng" algn="ctr">
+        <a:solidFill>
+          <a:schemeClr val="tx1">
+            <a:lumMod val="15000"/>
+            <a:lumOff val="85000"/>
+          </a:schemeClr>
+        </a:solidFill>
+        <a:round/>
+      </a:ln>
+    </cs:spPr>
+    <cs:defRPr sz="1197" kern="1200"/>
+  </cs:chartArea>
+  <cs:dataLabel>
+    <cs:lnRef idx="0"/>
+    <cs:fillRef idx="0"/>
+    <cs:effectRef idx="0"/>
+    <cs:fontRef idx="minor">
+      <a:schemeClr val="tx1">
+        <a:lumMod val="75000"/>
+        <a:lumOff val="25000"/>
+      </a:schemeClr>
+    </cs:fontRef>
+    <cs:defRPr sz="1197" kern="1200"/>
+  </cs:dataLabel>
+  <cs:dataLabelCallout>
+    <cs:lnRef idx="0"/>
+    <cs:fillRef idx="0"/>
+    <cs:effectRef idx="0"/>
+    <cs:fontRef idx="minor">
+      <a:schemeClr val="dk1">
+        <a:lumMod val="65000"/>
+        <a:lumOff val="35000"/>
+      </a:schemeClr>
+    </cs:fontRef>
+    <cs:spPr>
+      <a:solidFill>
+        <a:schemeClr val="lt1"/>
+      </a:solidFill>
+      <a:ln>
+        <a:solidFill>
+          <a:schemeClr val="dk1">
+            <a:lumMod val="25000"/>
+            <a:lumOff val="75000"/>
+          </a:schemeClr>
+        </a:solidFill>
+      </a:ln>
+    </cs:spPr>
+    <cs:defRPr sz="1197" kern="1200"/>
+    <cs:bodyPr rot="0" spcFirstLastPara="1" vertOverflow="clip" horzOverflow="clip" vert="horz" wrap="square" lIns="36576" tIns="18288" rIns="36576" bIns="18288" anchor="ctr" anchorCtr="1">
+      <a:spAutoFit/>
+    </cs:bodyPr>
+  </cs:dataLabelCallout>
+  <cs:dataPoint>
+    <cs:lnRef idx="0"/>
+    <cs:fillRef idx="1">
+      <cs:styleClr val="auto"/>
+    </cs:fillRef>
+    <cs:effectRef idx="0"/>
+    <cs:fontRef idx="minor">
+      <a:schemeClr val="tx1"/>
+    </cs:fontRef>
+    <cs:spPr>
+      <a:ln w="19050">
+        <a:solidFill>
+          <a:schemeClr val="lt1"/>
+        </a:solidFill>
+      </a:ln>
+    </cs:spPr>
+  </cs:dataPoint>
+  <cs:dataPoint3D>
+    <cs:lnRef idx="0"/>
+    <cs:fillRef idx="1">
+      <cs:styleClr val="auto"/>
+    </cs:fillRef>
+    <cs:effectRef idx="0"/>
+    <cs:fontRef idx="minor">
+      <a:schemeClr val="tx1"/>
+    </cs:fontRef>
+    <cs:spPr>
+      <a:ln w="25400">
+        <a:solidFill>
+          <a:schemeClr val="lt1"/>
+        </a:solidFill>
+      </a:ln>
+    </cs:spPr>
+  </cs:dataPoint3D>
+  <cs:dataPointLine>
+    <cs:lnRef idx="0">
+      <cs:styleClr val="auto"/>
+    </cs:lnRef>
+    <cs:fillRef idx="0"/>
+    <cs:effectRef idx="0"/>
+    <cs:fontRef idx="minor">
+      <a:schemeClr val="tx1"/>
+    </cs:fontRef>
+    <cs:spPr>
+      <a:ln w="28575" cap="rnd">
+        <a:solidFill>
+          <a:schemeClr val="phClr"/>
+        </a:solidFill>
+        <a:round/>
+      </a:ln>
+    </cs:spPr>
+  </cs:dataPointLine>
+  <cs:dataPointMarker>
+    <cs:lnRef idx="0">
+      <cs:styleClr val="auto"/>
+    </cs:lnRef>
+    <cs:fillRef idx="1">
+      <cs:styleClr val="auto"/>
+    </cs:fillRef>
+    <cs:effectRef idx="0"/>
+    <cs:fontRef idx="minor">
+      <a:schemeClr val="tx1"/>
+    </cs:fontRef>
+    <cs:spPr>
+      <a:ln w="9525">
+        <a:solidFill>
+          <a:schemeClr val="phClr"/>
+        </a:solidFill>
+      </a:ln>
+    </cs:spPr>
+  </cs:dataPointMarker>
+  <cs:dataPointMarkerLayout symbol="circle" size="5"/>
+  <cs:dataPointWireframe>
+    <cs:lnRef idx="0">
+      <cs:styleClr val="auto"/>
+    </cs:lnRef>
+    <cs:fillRef idx="0"/>
+    <cs:effectRef idx="0"/>
+    <cs:fontRef idx="minor">
+      <a:schemeClr val="tx1"/>
+    </cs:fontRef>
+    <cs:spPr>
+      <a:ln w="9525" cap="rnd">
+        <a:solidFill>
+          <a:schemeClr val="phClr"/>
+        </a:solidFill>
+        <a:round/>
+      </a:ln>
+    </cs:spPr>
+  </cs:dataPointWireframe>
+  <cs:dataTable>
+    <cs:lnRef idx="0"/>
+    <cs:fillRef idx="0"/>
+    <cs:effectRef idx="0"/>
+    <cs:fontRef idx="minor">
+      <a:schemeClr val="tx1">
+        <a:lumMod val="65000"/>
+        <a:lumOff val="35000"/>
+      </a:schemeClr>
+    </cs:fontRef>
+    <cs:spPr>
+      <a:noFill/>
+      <a:ln w="9525" cap="flat" cmpd="sng" algn="ctr">
+        <a:solidFill>
+          <a:schemeClr val="tx1">
+            <a:lumMod val="15000"/>
+            <a:lumOff val="85000"/>
+          </a:schemeClr>
+        </a:solidFill>
+        <a:round/>
+      </a:ln>
+    </cs:spPr>
+    <cs:defRPr sz="1197" kern="1200"/>
+  </cs:dataTable>
+  <cs:downBar>
+    <cs:lnRef idx="0"/>
+    <cs:fillRef idx="0"/>
+    <cs:effectRef idx="0"/>
+    <cs:fontRef idx="minor">
+      <a:schemeClr val="tx1"/>
+    </cs:fontRef>
+    <cs:spPr>
+      <a:solidFill>
+        <a:schemeClr val="dk1">
+          <a:lumMod val="75000"/>
+          <a:lumOff val="25000"/>
+        </a:schemeClr>
+      </a:solidFill>
+      <a:ln w="9525" cap="flat" cmpd="sng" algn="ctr">
+        <a:solidFill>
+          <a:schemeClr val="tx1">
+            <a:lumMod val="65000"/>
+            <a:lumOff val="35000"/>
+          </a:schemeClr>
+        </a:solidFill>
+        <a:round/>
+      </a:ln>
+    </cs:spPr>
+  </cs:downBar>
+  <cs:dropLine>
+    <cs:lnRef idx="0"/>
+    <cs:fillRef idx="0"/>
+    <cs:effectRef idx="0"/>
+    <cs:fontRef idx="minor">
+      <a:schemeClr val="tx1"/>
+    </cs:fontRef>
+    <cs:spPr>
+      <a:ln w="9525" cap="flat" cmpd="sng" algn="ctr">
+        <a:solidFill>
+          <a:schemeClr val="tx1">
+            <a:lumMod val="35000"/>
+            <a:lumOff val="65000"/>
+          </a:schemeClr>
+        </a:solidFill>
+        <a:round/>
+      </a:ln>
+    </cs:spPr>
+  </cs:dropLine>
+  <cs:errorBar>
+    <cs:lnRef idx="0"/>
+    <cs:fillRef idx="0"/>
+    <cs:effectRef idx="0"/>
+    <cs:fontRef idx="minor">
+      <a:schemeClr val="tx1"/>
+    </cs:fontRef>
+    <cs:spPr>
+      <a:ln w="9525" cap="flat" cmpd="sng" algn="ctr">
+        <a:solidFill>
+          <a:schemeClr val="tx1">
+            <a:lumMod val="65000"/>
+            <a:lumOff val="35000"/>
+          </a:schemeClr>
+        </a:solidFill>
+        <a:round/>
+      </a:ln>
+    </cs:spPr>
+  </cs:errorBar>
+  <cs:floor>
+    <cs:lnRef idx="0"/>
+    <cs:fillRef idx="0"/>
+    <cs:effectRef idx="0"/>
+    <cs:fontRef idx="minor">
+      <a:schemeClr val="tx1"/>
+    </cs:fontRef>
+    <cs:spPr>
+      <a:noFill/>
+      <a:ln>
+        <a:noFill/>
+      </a:ln>
+    </cs:spPr>
+  </cs:floor>
+  <cs:gridlineMajor>
+    <cs:lnRef idx="0"/>
+    <cs:fillRef idx="0"/>
+    <cs:effectRef idx="0"/>
+    <cs:fontRef idx="minor">
+      <a:schemeClr val="tx1"/>
+    </cs:fontRef>
+    <cs:spPr>
+      <a:ln w="9525" cap="flat" cmpd="sng" algn="ctr">
+        <a:solidFill>
+          <a:schemeClr val="tx1">
+            <a:lumMod val="15000"/>
+            <a:lumOff val="85000"/>
+          </a:schemeClr>
+        </a:solidFill>
+        <a:round/>
+      </a:ln>
+    </cs:spPr>
+  </cs:gridlineMajor>
+  <cs:gridlineMinor>
+    <cs:lnRef idx="0"/>
+    <cs:fillRef idx="0"/>
+    <cs:effectRef idx="0"/>
+    <cs:fontRef idx="minor">
+      <a:schemeClr val="tx1"/>
+    </cs:fontRef>
+    <cs:spPr>
+      <a:ln w="9525" cap="flat" cmpd="sng" algn="ctr">
+        <a:solidFill>
+          <a:schemeClr val="tx1">
+            <a:lumMod val="5000"/>
+            <a:lumOff val="95000"/>
+          </a:schemeClr>
+        </a:solidFill>
+        <a:round/>
+      </a:ln>
+    </cs:spPr>
+  </cs:gridlineMinor>
+  <cs:hiLoLine>
+    <cs:lnRef idx="0"/>
+    <cs:fillRef idx="0"/>
+    <cs:effectRef idx="0"/>
+    <cs:fontRef idx="minor">
+      <a:schemeClr val="tx1"/>
+    </cs:fontRef>
+    <cs:spPr>
+      <a:ln w="9525" cap="flat" cmpd="sng" algn="ctr">
+        <a:solidFill>
+          <a:schemeClr val="tx1">
+            <a:lumMod val="50000"/>
+            <a:lumOff val="50000"/>
+          </a:schemeClr>
+        </a:solidFill>
+        <a:round/>
+      </a:ln>
+    </cs:spPr>
+  </cs:hiLoLine>
+  <cs:leaderLine>
+    <cs:lnRef idx="0"/>
+    <cs:fillRef idx="0"/>
+    <cs:effectRef idx="0"/>
+    <cs:fontRef idx="minor">
+      <a:schemeClr val="tx1"/>
+    </cs:fontRef>
+    <cs:spPr>
+      <a:ln w="9525" cap="flat" cmpd="sng" algn="ctr">
+        <a:solidFill>
+          <a:schemeClr val="tx1">
+            <a:lumMod val="35000"/>
+            <a:lumOff val="65000"/>
+          </a:schemeClr>
+        </a:solidFill>
+        <a:round/>
+      </a:ln>
+    </cs:spPr>
+  </cs:leaderLine>
+  <cs:legend>
+    <cs:lnRef idx="0"/>
+    <cs:fillRef idx="0"/>
+    <cs:effectRef idx="0"/>
+    <cs:fontRef idx="minor">
+      <a:schemeClr val="tx1">
+        <a:lumMod val="65000"/>
+        <a:lumOff val="35000"/>
+      </a:schemeClr>
+    </cs:fontRef>
+    <cs:defRPr sz="1197" kern="1200"/>
+  </cs:legend>
+  <cs:plotArea mods="allowNoFillOverride allowNoLineOverride">
+    <cs:lnRef idx="0"/>
+    <cs:fillRef idx="0"/>
+    <cs:effectRef idx="0"/>
+    <cs:fontRef idx="minor">
+      <a:schemeClr val="tx1"/>
+    </cs:fontRef>
+  </cs:plotArea>
+  <cs:plotArea3D mods="allowNoFillOverride allowNoLineOverride">
+    <cs:lnRef idx="0"/>
+    <cs:fillRef idx="0"/>
+    <cs:effectRef idx="0"/>
+    <cs:fontRef idx="minor">
+      <a:schemeClr val="tx1"/>
+    </cs:fontRef>
+  </cs:plotArea3D>
+  <cs:seriesAxis>
+    <cs:lnRef idx="0"/>
+    <cs:fillRef idx="0"/>
+    <cs:effectRef idx="0"/>
+    <cs:fontRef idx="minor">
+      <a:schemeClr val="tx1">
+        <a:lumMod val="65000"/>
+        <a:lumOff val="35000"/>
+      </a:schemeClr>
+    </cs:fontRef>
+    <cs:defRPr sz="1197" kern="1200"/>
+  </cs:seriesAxis>
+  <cs:seriesLine>
+    <cs:lnRef idx="0"/>
+    <cs:fillRef idx="0"/>
+    <cs:effectRef idx="0"/>
+    <cs:fontRef idx="minor">
+      <a:schemeClr val="tx1"/>
+    </cs:fontRef>
+    <cs:spPr>
+      <a:ln w="9525" cap="flat" cmpd="sng" algn="ctr">
+        <a:solidFill>
+          <a:schemeClr val="tx1">
+            <a:lumMod val="35000"/>
+            <a:lumOff val="65000"/>
+          </a:schemeClr>
+        </a:solidFill>
+        <a:round/>
+      </a:ln>
+    </cs:spPr>
+  </cs:seriesLine>
+  <cs:title>
+    <cs:lnRef idx="0"/>
+    <cs:fillRef idx="0"/>
+    <cs:effectRef idx="0"/>
+    <cs:fontRef idx="minor">
+      <a:schemeClr val="tx1">
+        <a:lumMod val="65000"/>
+        <a:lumOff val="35000"/>
+      </a:schemeClr>
+    </cs:fontRef>
+    <cs:defRPr sz="1862" b="0" kern="1200" spc="0" baseline="0"/>
+  </cs:title>
+  <cs:trendline>
+    <cs:lnRef idx="0">
+      <cs:styleClr val="auto"/>
+    </cs:lnRef>
+    <cs:fillRef idx="0"/>
+    <cs:effectRef idx="0"/>
+    <cs:fontRef idx="minor">
+      <a:schemeClr val="tx1"/>
+    </cs:fontRef>
+    <cs:spPr>
+      <a:ln w="19050" cap="rnd">
+        <a:solidFill>
+          <a:schemeClr val="phClr"/>
+        </a:solidFill>
+        <a:prstDash val="sysDot"/>
+      </a:ln>
+    </cs:spPr>
+  </cs:trendline>
+  <cs:trendlineLabel>
+    <cs:lnRef idx="0"/>
+    <cs:fillRef idx="0"/>
+    <cs:effectRef idx="0"/>
+    <cs:fontRef idx="minor">
+      <a:schemeClr val="tx1">
+        <a:lumMod val="65000"/>
+        <a:lumOff val="35000"/>
+      </a:schemeClr>
+    </cs:fontRef>
+    <cs:defRPr sz="1197" kern="1200"/>
+  </cs:trendlineLabel>
+  <cs:upBar>
+    <cs:lnRef idx="0"/>
+    <cs:fillRef idx="0"/>
+    <cs:effectRef idx="0"/>
+    <cs:fontRef idx="minor">
+      <a:schemeClr val="tx1"/>
+    </cs:fontRef>
+    <cs:spPr>
+      <a:solidFill>
+        <a:schemeClr val="lt1"/>
+      </a:solidFill>
+      <a:ln w="9525" cap="flat" cmpd="sng" algn="ctr">
+        <a:solidFill>
+          <a:schemeClr val="tx1">
+            <a:lumMod val="65000"/>
+            <a:lumOff val="35000"/>
+          </a:schemeClr>
+        </a:solidFill>
+        <a:round/>
+      </a:ln>
+    </cs:spPr>
+  </cs:upBar>
+  <cs:valueAxis>
+    <cs:lnRef idx="0"/>
+    <cs:fillRef idx="0"/>
+    <cs:effectRef idx="0"/>
+    <cs:fontRef idx="minor">
+      <a:schemeClr val="tx1">
+        <a:lumMod val="65000"/>
+        <a:lumOff val="35000"/>
+      </a:schemeClr>
+    </cs:fontRef>
+    <cs:defRPr sz="1197" kern="1200"/>
+  </cs:valueAxis>
+  <cs:wall>
+    <cs:lnRef idx="0"/>
+    <cs:fillRef idx="0"/>
+    <cs:effectRef idx="0"/>
+    <cs:fontRef idx="minor">
+      <a:schemeClr val="tx1"/>
+    </cs:fontRef>
+    <cs:spPr>
+      <a:noFill/>
+      <a:ln>
+        <a:noFill/>
+      </a:ln>
+    </cs:spPr>
+  </cs:wall>
+</cs:chartStyle>
+</file>
+
+<file path=ppt/charts/style2.xml><?xml version="1.0" encoding="utf-8"?>
+<cs:chartStyle xmlns:cs="http://schemas.microsoft.com/office/drawing/2012/chartStyle" xmlns:a="http://schemas.openxmlformats.org/drawingml/2006/main" id="251">
+  <cs:axisTitle>
+    <cs:lnRef idx="0"/>
+    <cs:fillRef idx="0"/>
+    <cs:effectRef idx="0"/>
+    <cs:fontRef idx="minor">
+      <a:schemeClr val="tx1">
+        <a:lumMod val="65000"/>
+        <a:lumOff val="35000"/>
+      </a:schemeClr>
+    </cs:fontRef>
+    <cs:defRPr sz="1330" kern="1200"/>
+  </cs:axisTitle>
+  <cs:categoryAxis>
+    <cs:lnRef idx="0"/>
+    <cs:fillRef idx="0"/>
+    <cs:effectRef idx="0"/>
+    <cs:fontRef idx="minor">
+      <a:schemeClr val="tx1">
+        <a:lumMod val="65000"/>
+        <a:lumOff val="35000"/>
+      </a:schemeClr>
+    </cs:fontRef>
+    <cs:spPr>
+      <a:ln w="9525" cap="flat" cmpd="sng" algn="ctr">
+        <a:solidFill>
+          <a:schemeClr val="tx1">
+            <a:lumMod val="15000"/>
+            <a:lumOff val="85000"/>
+          </a:schemeClr>
+        </a:solidFill>
+        <a:round/>
+      </a:ln>
+    </cs:spPr>
+    <cs:defRPr sz="1197" kern="1200"/>
+  </cs:categoryAxis>
+  <cs:chartArea mods="allowNoFillOverride allowNoLineOverride">
+    <cs:lnRef idx="0"/>
+    <cs:fillRef idx="0"/>
+    <cs:effectRef idx="0"/>
+    <cs:fontRef idx="minor">
+      <a:schemeClr val="tx1"/>
+    </cs:fontRef>
+    <cs:spPr>
+      <a:solidFill>
+        <a:schemeClr val="bg1"/>
+      </a:solidFill>
+      <a:ln w="9525" cap="flat" cmpd="sng" algn="ctr">
+        <a:solidFill>
+          <a:schemeClr val="tx1">
+            <a:lumMod val="15000"/>
+            <a:lumOff val="85000"/>
+          </a:schemeClr>
+        </a:solidFill>
+        <a:round/>
+      </a:ln>
+    </cs:spPr>
+    <cs:defRPr sz="1197" kern="1200"/>
+  </cs:chartArea>
+  <cs:dataLabel>
+    <cs:lnRef idx="0"/>
+    <cs:fillRef idx="0"/>
+    <cs:effectRef idx="0"/>
+    <cs:fontRef idx="minor">
+      <a:schemeClr val="tx1">
+        <a:lumMod val="75000"/>
+        <a:lumOff val="25000"/>
+      </a:schemeClr>
+    </cs:fontRef>
+    <cs:defRPr sz="1197" kern="1200"/>
+  </cs:dataLabel>
+  <cs:dataLabelCallout>
+    <cs:lnRef idx="0"/>
+    <cs:fillRef idx="0"/>
+    <cs:effectRef idx="0"/>
+    <cs:fontRef idx="minor">
+      <a:schemeClr val="dk1">
+        <a:lumMod val="65000"/>
+        <a:lumOff val="35000"/>
+      </a:schemeClr>
+    </cs:fontRef>
+    <cs:spPr>
+      <a:solidFill>
+        <a:schemeClr val="lt1"/>
+      </a:solidFill>
+      <a:ln>
+        <a:solidFill>
+          <a:schemeClr val="dk1">
+            <a:lumMod val="25000"/>
+            <a:lumOff val="75000"/>
+          </a:schemeClr>
+        </a:solidFill>
+      </a:ln>
+    </cs:spPr>
+    <cs:defRPr sz="1197" kern="1200"/>
+    <cs:bodyPr rot="0" spcFirstLastPara="1" vertOverflow="clip" horzOverflow="clip" vert="horz" wrap="square" lIns="36576" tIns="18288" rIns="36576" bIns="18288" anchor="ctr" anchorCtr="1">
+      <a:spAutoFit/>
+    </cs:bodyPr>
+  </cs:dataLabelCallout>
+  <cs:dataPoint>
+    <cs:lnRef idx="0"/>
+    <cs:fillRef idx="1">
+      <cs:styleClr val="auto"/>
+    </cs:fillRef>
+    <cs:effectRef idx="0"/>
+    <cs:fontRef idx="minor">
+      <a:schemeClr val="tx1"/>
+    </cs:fontRef>
+    <cs:spPr>
+      <a:ln w="19050">
+        <a:solidFill>
+          <a:schemeClr val="lt1"/>
+        </a:solidFill>
+      </a:ln>
+    </cs:spPr>
+  </cs:dataPoint>
+  <cs:dataPoint3D>
+    <cs:lnRef idx="0"/>
+    <cs:fillRef idx="1">
+      <cs:styleClr val="auto"/>
+    </cs:fillRef>
+    <cs:effectRef idx="0"/>
+    <cs:fontRef idx="minor">
+      <a:schemeClr val="tx1"/>
+    </cs:fontRef>
+    <cs:spPr>
+      <a:ln w="25400">
+        <a:solidFill>
+          <a:schemeClr val="lt1"/>
+        </a:solidFill>
+      </a:ln>
+    </cs:spPr>
+  </cs:dataPoint3D>
+  <cs:dataPointLine>
+    <cs:lnRef idx="0">
+      <cs:styleClr val="auto"/>
+    </cs:lnRef>
+    <cs:fillRef idx="0"/>
+    <cs:effectRef idx="0"/>
+    <cs:fontRef idx="minor">
+      <a:schemeClr val="tx1"/>
+    </cs:fontRef>
+    <cs:spPr>
+      <a:ln w="28575" cap="rnd">
+        <a:solidFill>
+          <a:schemeClr val="phClr"/>
+        </a:solidFill>
+        <a:round/>
+      </a:ln>
+    </cs:spPr>
+  </cs:dataPointLine>
+  <cs:dataPointMarker>
+    <cs:lnRef idx="0">
+      <cs:styleClr val="auto"/>
+    </cs:lnRef>
+    <cs:fillRef idx="1">
+      <cs:styleClr val="auto"/>
+    </cs:fillRef>
+    <cs:effectRef idx="0"/>
+    <cs:fontRef idx="minor">
+      <a:schemeClr val="tx1"/>
+    </cs:fontRef>
+    <cs:spPr>
+      <a:ln w="9525">
+        <a:solidFill>
+          <a:schemeClr val="phClr"/>
+        </a:solidFill>
+      </a:ln>
+    </cs:spPr>
+  </cs:dataPointMarker>
+  <cs:dataPointMarkerLayout symbol="circle" size="5"/>
+  <cs:dataPointWireframe>
+    <cs:lnRef idx="0">
+      <cs:styleClr val="auto"/>
+    </cs:lnRef>
+    <cs:fillRef idx="0"/>
+    <cs:effectRef idx="0"/>
+    <cs:fontRef idx="minor">
+      <a:schemeClr val="tx1"/>
+    </cs:fontRef>
+    <cs:spPr>
+      <a:ln w="9525" cap="rnd">
+        <a:solidFill>
+          <a:schemeClr val="phClr"/>
+        </a:solidFill>
+        <a:round/>
+      </a:ln>
+    </cs:spPr>
+  </cs:dataPointWireframe>
+  <cs:dataTable>
+    <cs:lnRef idx="0"/>
+    <cs:fillRef idx="0"/>
+    <cs:effectRef idx="0"/>
+    <cs:fontRef idx="minor">
+      <a:schemeClr val="tx1">
+        <a:lumMod val="65000"/>
+        <a:lumOff val="35000"/>
+      </a:schemeClr>
+    </cs:fontRef>
+    <cs:spPr>
+      <a:noFill/>
+      <a:ln w="9525" cap="flat" cmpd="sng" algn="ctr">
+        <a:solidFill>
+          <a:schemeClr val="tx1">
+            <a:lumMod val="15000"/>
+            <a:lumOff val="85000"/>
+          </a:schemeClr>
+        </a:solidFill>
+        <a:round/>
+      </a:ln>
+    </cs:spPr>
+    <cs:defRPr sz="1197" kern="1200"/>
+  </cs:dataTable>
+  <cs:downBar>
+    <cs:lnRef idx="0"/>
+    <cs:fillRef idx="0"/>
+    <cs:effectRef idx="0"/>
+    <cs:fontRef idx="minor">
+      <a:schemeClr val="tx1"/>
+    </cs:fontRef>
+    <cs:spPr>
+      <a:solidFill>
+        <a:schemeClr val="dk1">
+          <a:lumMod val="75000"/>
+          <a:lumOff val="25000"/>
+        </a:schemeClr>
+      </a:solidFill>
+      <a:ln w="9525" cap="flat" cmpd="sng" algn="ctr">
+        <a:solidFill>
+          <a:schemeClr val="tx1">
+            <a:lumMod val="65000"/>
+            <a:lumOff val="35000"/>
+          </a:schemeClr>
+        </a:solidFill>
+        <a:round/>
+      </a:ln>
+    </cs:spPr>
+  </cs:downBar>
+  <cs:dropLine>
+    <cs:lnRef idx="0"/>
+    <cs:fillRef idx="0"/>
+    <cs:effectRef idx="0"/>
+    <cs:fontRef idx="minor">
+      <a:schemeClr val="tx1"/>
+    </cs:fontRef>
+    <cs:spPr>
+      <a:ln w="9525" cap="flat" cmpd="sng" algn="ctr">
+        <a:solidFill>
+          <a:schemeClr val="tx1">
+            <a:lumMod val="35000"/>
+            <a:lumOff val="65000"/>
+          </a:schemeClr>
+        </a:solidFill>
+        <a:round/>
+      </a:ln>
+    </cs:spPr>
+  </cs:dropLine>
+  <cs:errorBar>
+    <cs:lnRef idx="0"/>
+    <cs:fillRef idx="0"/>
+    <cs:effectRef idx="0"/>
+    <cs:fontRef idx="minor">
+      <a:schemeClr val="tx1"/>
+    </cs:fontRef>
+    <cs:spPr>
+      <a:ln w="9525" cap="flat" cmpd="sng" algn="ctr">
+        <a:solidFill>
+          <a:schemeClr val="tx1">
+            <a:lumMod val="65000"/>
+            <a:lumOff val="35000"/>
+          </a:schemeClr>
+        </a:solidFill>
+        <a:round/>
+      </a:ln>
+    </cs:spPr>
+  </cs:errorBar>
+  <cs:floor>
+    <cs:lnRef idx="0"/>
+    <cs:fillRef idx="0"/>
+    <cs:effectRef idx="0"/>
+    <cs:fontRef idx="minor">
+      <a:schemeClr val="tx1"/>
+    </cs:fontRef>
+    <cs:spPr>
+      <a:noFill/>
+      <a:ln>
+        <a:noFill/>
+      </a:ln>
+    </cs:spPr>
+  </cs:floor>
+  <cs:gridlineMajor>
+    <cs:lnRef idx="0"/>
+    <cs:fillRef idx="0"/>
+    <cs:effectRef idx="0"/>
+    <cs:fontRef idx="minor">
+      <a:schemeClr val="tx1"/>
+    </cs:fontRef>
+    <cs:spPr>
+      <a:ln w="9525" cap="flat" cmpd="sng" algn="ctr">
+        <a:solidFill>
+          <a:schemeClr val="tx1">
+            <a:lumMod val="15000"/>
+            <a:lumOff val="85000"/>
+          </a:schemeClr>
+        </a:solidFill>
+        <a:round/>
+      </a:ln>
+    </cs:spPr>
+  </cs:gridlineMajor>
+  <cs:gridlineMinor>
+    <cs:lnRef idx="0"/>
+    <cs:fillRef idx="0"/>
+    <cs:effectRef idx="0"/>
+    <cs:fontRef idx="minor">
+      <a:schemeClr val="tx1"/>
+    </cs:fontRef>
+    <cs:spPr>
+      <a:ln w="9525" cap="flat" cmpd="sng" algn="ctr">
+        <a:solidFill>
+          <a:schemeClr val="tx1">
+            <a:lumMod val="5000"/>
+            <a:lumOff val="95000"/>
+          </a:schemeClr>
+        </a:solidFill>
+        <a:round/>
+      </a:ln>
+    </cs:spPr>
+  </cs:gridlineMinor>
+  <cs:hiLoLine>
+    <cs:lnRef idx="0"/>
+    <cs:fillRef idx="0"/>
+    <cs:effectRef idx="0"/>
+    <cs:fontRef idx="minor">
+      <a:schemeClr val="tx1"/>
+    </cs:fontRef>
+    <cs:spPr>
+      <a:ln w="9525" cap="flat" cmpd="sng" algn="ctr">
+        <a:solidFill>
+          <a:schemeClr val="tx1">
+            <a:lumMod val="50000"/>
+            <a:lumOff val="50000"/>
+          </a:schemeClr>
+        </a:solidFill>
+        <a:round/>
+      </a:ln>
+    </cs:spPr>
+  </cs:hiLoLine>
+  <cs:leaderLine>
+    <cs:lnRef idx="0"/>
+    <cs:fillRef idx="0"/>
+    <cs:effectRef idx="0"/>
+    <cs:fontRef idx="minor">
+      <a:schemeClr val="tx1"/>
+    </cs:fontRef>
+    <cs:spPr>
+      <a:ln w="9525" cap="flat" cmpd="sng" algn="ctr">
+        <a:solidFill>
+          <a:schemeClr val="tx1">
+            <a:lumMod val="35000"/>
+            <a:lumOff val="65000"/>
+          </a:schemeClr>
+        </a:solidFill>
+        <a:round/>
+      </a:ln>
+    </cs:spPr>
+  </cs:leaderLine>
+  <cs:legend>
+    <cs:lnRef idx="0"/>
+    <cs:fillRef idx="0"/>
+    <cs:effectRef idx="0"/>
+    <cs:fontRef idx="minor">
+      <a:schemeClr val="tx1">
+        <a:lumMod val="65000"/>
+        <a:lumOff val="35000"/>
+      </a:schemeClr>
+    </cs:fontRef>
+    <cs:defRPr sz="1197" kern="1200"/>
+  </cs:legend>
+  <cs:plotArea mods="allowNoFillOverride allowNoLineOverride">
+    <cs:lnRef idx="0"/>
+    <cs:fillRef idx="0"/>
+    <cs:effectRef idx="0"/>
+    <cs:fontRef idx="minor">
+      <a:schemeClr val="tx1"/>
+    </cs:fontRef>
+  </cs:plotArea>
+  <cs:plotArea3D mods="allowNoFillOverride allowNoLineOverride">
+    <cs:lnRef idx="0"/>
+    <cs:fillRef idx="0"/>
+    <cs:effectRef idx="0"/>
+    <cs:fontRef idx="minor">
+      <a:schemeClr val="tx1"/>
+    </cs:fontRef>
+  </cs:plotArea3D>
+  <cs:seriesAxis>
+    <cs:lnRef idx="0"/>
+    <cs:fillRef idx="0"/>
+    <cs:effectRef idx="0"/>
+    <cs:fontRef idx="minor">
+      <a:schemeClr val="tx1">
+        <a:lumMod val="65000"/>
+        <a:lumOff val="35000"/>
+      </a:schemeClr>
+    </cs:fontRef>
+    <cs:defRPr sz="1197" kern="1200"/>
+  </cs:seriesAxis>
+  <cs:seriesLine>
+    <cs:lnRef idx="0"/>
+    <cs:fillRef idx="0"/>
+    <cs:effectRef idx="0"/>
+    <cs:fontRef idx="minor">
+      <a:schemeClr val="tx1"/>
+    </cs:fontRef>
+    <cs:spPr>
+      <a:ln w="9525" cap="flat" cmpd="sng" algn="ctr">
+        <a:solidFill>
+          <a:schemeClr val="tx1">
+            <a:lumMod val="35000"/>
+            <a:lumOff val="65000"/>
+          </a:schemeClr>
+        </a:solidFill>
+        <a:round/>
+      </a:ln>
+    </cs:spPr>
+  </cs:seriesLine>
+  <cs:title>
+    <cs:lnRef idx="0"/>
+    <cs:fillRef idx="0"/>
+    <cs:effectRef idx="0"/>
+    <cs:fontRef idx="minor">
+      <a:schemeClr val="tx1">
+        <a:lumMod val="65000"/>
+        <a:lumOff val="35000"/>
+      </a:schemeClr>
+    </cs:fontRef>
+    <cs:defRPr sz="1862" b="0" kern="1200" spc="0" baseline="0"/>
+  </cs:title>
+  <cs:trendline>
+    <cs:lnRef idx="0">
+      <cs:styleClr val="auto"/>
+    </cs:lnRef>
+    <cs:fillRef idx="0"/>
+    <cs:effectRef idx="0"/>
+    <cs:fontRef idx="minor">
+      <a:schemeClr val="tx1"/>
+    </cs:fontRef>
+    <cs:spPr>
+      <a:ln w="19050" cap="rnd">
+        <a:solidFill>
+          <a:schemeClr val="phClr"/>
+        </a:solidFill>
+        <a:prstDash val="sysDot"/>
+      </a:ln>
+    </cs:spPr>
+  </cs:trendline>
+  <cs:trendlineLabel>
+    <cs:lnRef idx="0"/>
+    <cs:fillRef idx="0"/>
+    <cs:effectRef idx="0"/>
+    <cs:fontRef idx="minor">
+      <a:schemeClr val="tx1">
+        <a:lumMod val="65000"/>
+        <a:lumOff val="35000"/>
+      </a:schemeClr>
+    </cs:fontRef>
+    <cs:defRPr sz="1197" kern="1200"/>
+  </cs:trendlineLabel>
+  <cs:upBar>
+    <cs:lnRef idx="0"/>
+    <cs:fillRef idx="0"/>
+    <cs:effectRef idx="0"/>
+    <cs:fontRef idx="minor">
+      <a:schemeClr val="tx1"/>
+    </cs:fontRef>
+    <cs:spPr>
+      <a:solidFill>
+        <a:schemeClr val="lt1"/>
+      </a:solidFill>
+      <a:ln w="9525" cap="flat" cmpd="sng" algn="ctr">
+        <a:solidFill>
+          <a:schemeClr val="tx1">
+            <a:lumMod val="65000"/>
+            <a:lumOff val="35000"/>
+          </a:schemeClr>
+        </a:solidFill>
+        <a:round/>
+      </a:ln>
+    </cs:spPr>
+  </cs:upBar>
+  <cs:valueAxis>
+    <cs:lnRef idx="0"/>
+    <cs:fillRef idx="0"/>
+    <cs:effectRef idx="0"/>
+    <cs:fontRef idx="minor">
+      <a:schemeClr val="tx1">
+        <a:lumMod val="65000"/>
+        <a:lumOff val="35000"/>
+      </a:schemeClr>
+    </cs:fontRef>
+    <cs:defRPr sz="1197" kern="1200"/>
+  </cs:valueAxis>
+  <cs:wall>
+    <cs:lnRef idx="0"/>
+    <cs:fillRef idx="0"/>
+    <cs:effectRef idx="0"/>
+    <cs:fontRef idx="minor">
+      <a:schemeClr val="tx1"/>
+    </cs:fontRef>
+    <cs:spPr>
+      <a:noFill/>
+      <a:ln>
+        <a:noFill/>
+      </a:ln>
+    </cs:spPr>
+  </cs:wall>
+</cs:chartStyle>
+</file>
+
+<file path=ppt/charts/style3.xml><?xml version="1.0" encoding="utf-8"?>
+<cs:chartStyle xmlns:cs="http://schemas.microsoft.com/office/drawing/2012/chartStyle" xmlns:a="http://schemas.openxmlformats.org/drawingml/2006/main" id="251">
+  <cs:axisTitle>
+    <cs:lnRef idx="0"/>
+    <cs:fillRef idx="0"/>
+    <cs:effectRef idx="0"/>
+    <cs:fontRef idx="minor">
+      <a:schemeClr val="tx1">
+        <a:lumMod val="65000"/>
+        <a:lumOff val="35000"/>
+      </a:schemeClr>
+    </cs:fontRef>
+    <cs:defRPr sz="1330" kern="1200"/>
+  </cs:axisTitle>
+  <cs:categoryAxis>
+    <cs:lnRef idx="0"/>
+    <cs:fillRef idx="0"/>
+    <cs:effectRef idx="0"/>
+    <cs:fontRef idx="minor">
+      <a:schemeClr val="tx1">
+        <a:lumMod val="65000"/>
+        <a:lumOff val="35000"/>
+      </a:schemeClr>
+    </cs:fontRef>
+    <cs:spPr>
+      <a:ln w="9525" cap="flat" cmpd="sng" algn="ctr">
+        <a:solidFill>
+          <a:schemeClr val="tx1">
+            <a:lumMod val="15000"/>
+            <a:lumOff val="85000"/>
+          </a:schemeClr>
+        </a:solidFill>
+        <a:round/>
+      </a:ln>
+    </cs:spPr>
+    <cs:defRPr sz="1197" kern="1200"/>
+  </cs:categoryAxis>
+  <cs:chartArea mods="allowNoFillOverride allowNoLineOverride">
+    <cs:lnRef idx="0"/>
+    <cs:fillRef idx="0"/>
+    <cs:effectRef idx="0"/>
+    <cs:fontRef idx="minor">
+      <a:schemeClr val="tx1"/>
+    </cs:fontRef>
+    <cs:spPr>
+      <a:solidFill>
+        <a:schemeClr val="bg1"/>
+      </a:solidFill>
+      <a:ln w="9525" cap="flat" cmpd="sng" algn="ctr">
+        <a:solidFill>
+          <a:schemeClr val="tx1">
+            <a:lumMod val="15000"/>
+            <a:lumOff val="85000"/>
+          </a:schemeClr>
+        </a:solidFill>
+        <a:round/>
+      </a:ln>
+    </cs:spPr>
+    <cs:defRPr sz="1197" kern="1200"/>
+  </cs:chartArea>
+  <cs:dataLabel>
+    <cs:lnRef idx="0"/>
+    <cs:fillRef idx="0"/>
+    <cs:effectRef idx="0"/>
+    <cs:fontRef idx="minor">
+      <a:schemeClr val="tx1">
+        <a:lumMod val="75000"/>
+        <a:lumOff val="25000"/>
+      </a:schemeClr>
+    </cs:fontRef>
+    <cs:defRPr sz="1197" kern="1200"/>
+  </cs:dataLabel>
+  <cs:dataLabelCallout>
+    <cs:lnRef idx="0"/>
+    <cs:fillRef idx="0"/>
+    <cs:effectRef idx="0"/>
+    <cs:fontRef idx="minor">
+      <a:schemeClr val="dk1">
+        <a:lumMod val="65000"/>
+        <a:lumOff val="35000"/>
+      </a:schemeClr>
+    </cs:fontRef>
+    <cs:spPr>
+      <a:solidFill>
+        <a:schemeClr val="lt1"/>
+      </a:solidFill>
+      <a:ln>
+        <a:solidFill>
+          <a:schemeClr val="dk1">
+            <a:lumMod val="25000"/>
+            <a:lumOff val="75000"/>
+          </a:schemeClr>
+        </a:solidFill>
+      </a:ln>
+    </cs:spPr>
+    <cs:defRPr sz="1197" kern="1200"/>
+    <cs:bodyPr rot="0" spcFirstLastPara="1" vertOverflow="clip" horzOverflow="clip" vert="horz" wrap="square" lIns="36576" tIns="18288" rIns="36576" bIns="18288" anchor="ctr" anchorCtr="1">
+      <a:spAutoFit/>
+    </cs:bodyPr>
+  </cs:dataLabelCallout>
+  <cs:dataPoint>
+    <cs:lnRef idx="0"/>
+    <cs:fillRef idx="1">
+      <cs:styleClr val="auto"/>
+    </cs:fillRef>
+    <cs:effectRef idx="0"/>
+    <cs:fontRef idx="minor">
+      <a:schemeClr val="tx1"/>
+    </cs:fontRef>
+    <cs:spPr>
+      <a:ln w="19050">
+        <a:solidFill>
+          <a:schemeClr val="lt1"/>
+        </a:solidFill>
+      </a:ln>
+    </cs:spPr>
+  </cs:dataPoint>
+  <cs:dataPoint3D>
+    <cs:lnRef idx="0"/>
+    <cs:fillRef idx="1">
+      <cs:styleClr val="auto"/>
+    </cs:fillRef>
+    <cs:effectRef idx="0"/>
+    <cs:fontRef idx="minor">
+      <a:schemeClr val="tx1"/>
+    </cs:fontRef>
+    <cs:spPr>
+      <a:ln w="25400">
+        <a:solidFill>
+          <a:schemeClr val="lt1"/>
+        </a:solidFill>
+      </a:ln>
+    </cs:spPr>
+  </cs:dataPoint3D>
+  <cs:dataPointLine>
+    <cs:lnRef idx="0">
+      <cs:styleClr val="auto"/>
+    </cs:lnRef>
+    <cs:fillRef idx="0"/>
+    <cs:effectRef idx="0"/>
+    <cs:fontRef idx="minor">
+      <a:schemeClr val="tx1"/>
+    </cs:fontRef>
+    <cs:spPr>
+      <a:ln w="28575" cap="rnd">
+        <a:solidFill>
+          <a:schemeClr val="phClr"/>
+        </a:solidFill>
+        <a:round/>
+      </a:ln>
+    </cs:spPr>
+  </cs:dataPointLine>
+  <cs:dataPointMarker>
+    <cs:lnRef idx="0">
+      <cs:styleClr val="auto"/>
+    </cs:lnRef>
+    <cs:fillRef idx="1">
+      <cs:styleClr val="auto"/>
+    </cs:fillRef>
+    <cs:effectRef idx="0"/>
+    <cs:fontRef idx="minor">
+      <a:schemeClr val="tx1"/>
+    </cs:fontRef>
+    <cs:spPr>
+      <a:ln w="9525">
+        <a:solidFill>
+          <a:schemeClr val="phClr"/>
+        </a:solidFill>
+      </a:ln>
+    </cs:spPr>
+  </cs:dataPointMarker>
+  <cs:dataPointMarkerLayout symbol="circle" size="5"/>
+  <cs:dataPointWireframe>
+    <cs:lnRef idx="0">
+      <cs:styleClr val="auto"/>
+    </cs:lnRef>
+    <cs:fillRef idx="0"/>
+    <cs:effectRef idx="0"/>
+    <cs:fontRef idx="minor">
+      <a:schemeClr val="tx1"/>
+    </cs:fontRef>
+    <cs:spPr>
+      <a:ln w="9525" cap="rnd">
+        <a:solidFill>
+          <a:schemeClr val="phClr"/>
+        </a:solidFill>
+        <a:round/>
+      </a:ln>
+    </cs:spPr>
+  </cs:dataPointWireframe>
+  <cs:dataTable>
+    <cs:lnRef idx="0"/>
+    <cs:fillRef idx="0"/>
+    <cs:effectRef idx="0"/>
+    <cs:fontRef idx="minor">
+      <a:schemeClr val="tx1">
+        <a:lumMod val="65000"/>
+        <a:lumOff val="35000"/>
+      </a:schemeClr>
+    </cs:fontRef>
+    <cs:spPr>
+      <a:noFill/>
+      <a:ln w="9525" cap="flat" cmpd="sng" algn="ctr">
+        <a:solidFill>
+          <a:schemeClr val="tx1">
+            <a:lumMod val="15000"/>
+            <a:lumOff val="85000"/>
+          </a:schemeClr>
+        </a:solidFill>
+        <a:round/>
+      </a:ln>
+    </cs:spPr>
+    <cs:defRPr sz="1197" kern="1200"/>
+  </cs:dataTable>
+  <cs:downBar>
+    <cs:lnRef idx="0"/>
+    <cs:fillRef idx="0"/>
+    <cs:effectRef idx="0"/>
+    <cs:fontRef idx="minor">
+      <a:schemeClr val="tx1"/>
+    </cs:fontRef>
+    <cs:spPr>
+      <a:solidFill>
+        <a:schemeClr val="dk1">
+          <a:lumMod val="75000"/>
+          <a:lumOff val="25000"/>
+        </a:schemeClr>
+      </a:solidFill>
+      <a:ln w="9525" cap="flat" cmpd="sng" algn="ctr">
+        <a:solidFill>
+          <a:schemeClr val="tx1">
+            <a:lumMod val="65000"/>
+            <a:lumOff val="35000"/>
+          </a:schemeClr>
+        </a:solidFill>
+        <a:round/>
+      </a:ln>
+    </cs:spPr>
+  </cs:downBar>
+  <cs:dropLine>
+    <cs:lnRef idx="0"/>
+    <cs:fillRef idx="0"/>
+    <cs:effectRef idx="0"/>
+    <cs:fontRef idx="minor">
+      <a:schemeClr val="tx1"/>
+    </cs:fontRef>
+    <cs:spPr>
+      <a:ln w="9525" cap="flat" cmpd="sng" algn="ctr">
+        <a:solidFill>
+          <a:schemeClr val="tx1">
+            <a:lumMod val="35000"/>
+            <a:lumOff val="65000"/>
+          </a:schemeClr>
+        </a:solidFill>
+        <a:round/>
+      </a:ln>
+    </cs:spPr>
+  </cs:dropLine>
+  <cs:errorBar>
+    <cs:lnRef idx="0"/>
+    <cs:fillRef idx="0"/>
+    <cs:effectRef idx="0"/>
+    <cs:fontRef idx="minor">
+      <a:schemeClr val="tx1"/>
+    </cs:fontRef>
+    <cs:spPr>
+      <a:ln w="9525" cap="flat" cmpd="sng" algn="ctr">
+        <a:solidFill>
+          <a:schemeClr val="tx1">
+            <a:lumMod val="65000"/>
+            <a:lumOff val="35000"/>
+          </a:schemeClr>
+        </a:solidFill>
+        <a:round/>
+      </a:ln>
+    </cs:spPr>
+  </cs:errorBar>
+  <cs:floor>
+    <cs:lnRef idx="0"/>
+    <cs:fillRef idx="0"/>
+    <cs:effectRef idx="0"/>
+    <cs:fontRef idx="minor">
+      <a:schemeClr val="tx1"/>
+    </cs:fontRef>
+    <cs:spPr>
+      <a:noFill/>
+      <a:ln>
+        <a:noFill/>
+      </a:ln>
+    </cs:spPr>
+  </cs:floor>
+  <cs:gridlineMajor>
+    <cs:lnRef idx="0"/>
+    <cs:fillRef idx="0"/>
+    <cs:effectRef idx="0"/>
+    <cs:fontRef idx="minor">
+      <a:schemeClr val="tx1"/>
+    </cs:fontRef>
+    <cs:spPr>
+      <a:ln w="9525" cap="flat" cmpd="sng" algn="ctr">
+        <a:solidFill>
+          <a:schemeClr val="tx1">
+            <a:lumMod val="15000"/>
+            <a:lumOff val="85000"/>
+          </a:schemeClr>
+        </a:solidFill>
+        <a:round/>
+      </a:ln>
+    </cs:spPr>
+  </cs:gridlineMajor>
+  <cs:gridlineMinor>
+    <cs:lnRef idx="0"/>
+    <cs:fillRef idx="0"/>
+    <cs:effectRef idx="0"/>
+    <cs:fontRef idx="minor">
+      <a:schemeClr val="tx1"/>
+    </cs:fontRef>
+    <cs:spPr>
+      <a:ln w="9525" cap="flat" cmpd="sng" algn="ctr">
+        <a:solidFill>
+          <a:schemeClr val="tx1">
+            <a:lumMod val="5000"/>
+            <a:lumOff val="95000"/>
+          </a:schemeClr>
+        </a:solidFill>
+        <a:round/>
+      </a:ln>
+    </cs:spPr>
+  </cs:gridlineMinor>
+  <cs:hiLoLine>
+    <cs:lnRef idx="0"/>
+    <cs:fillRef idx="0"/>
+    <cs:effectRef idx="0"/>
+    <cs:fontRef idx="minor">
+      <a:schemeClr val="tx1"/>
+    </cs:fontRef>
+    <cs:spPr>
+      <a:ln w="9525" cap="flat" cmpd="sng" algn="ctr">
+        <a:solidFill>
+          <a:schemeClr val="tx1">
+            <a:lumMod val="50000"/>
+            <a:lumOff val="50000"/>
+          </a:schemeClr>
+        </a:solidFill>
+        <a:round/>
+      </a:ln>
+    </cs:spPr>
+  </cs:hiLoLine>
+  <cs:leaderLine>
+    <cs:lnRef idx="0"/>
+    <cs:fillRef idx="0"/>
+    <cs:effectRef idx="0"/>
+    <cs:fontRef idx="minor">
+      <a:schemeClr val="tx1"/>
+    </cs:fontRef>
+    <cs:spPr>
+      <a:ln w="9525" cap="flat" cmpd="sng" algn="ctr">
+        <a:solidFill>
+          <a:schemeClr val="tx1">
+            <a:lumMod val="35000"/>
+            <a:lumOff val="65000"/>
+          </a:schemeClr>
+        </a:solidFill>
+        <a:round/>
+      </a:ln>
+    </cs:spPr>
+  </cs:leaderLine>
+  <cs:legend>
+    <cs:lnRef idx="0"/>
+    <cs:fillRef idx="0"/>
+    <cs:effectRef idx="0"/>
+    <cs:fontRef idx="minor">
+      <a:schemeClr val="tx1">
+        <a:lumMod val="65000"/>
+        <a:lumOff val="35000"/>
+      </a:schemeClr>
+    </cs:fontRef>
+    <cs:defRPr sz="1197" kern="1200"/>
+  </cs:legend>
+  <cs:plotArea mods="allowNoFillOverride allowNoLineOverride">
+    <cs:lnRef idx="0"/>
+    <cs:fillRef idx="0"/>
+    <cs:effectRef idx="0"/>
+    <cs:fontRef idx="minor">
+      <a:schemeClr val="tx1"/>
+    </cs:fontRef>
+  </cs:plotArea>
+  <cs:plotArea3D mods="allowNoFillOverride allowNoLineOverride">
+    <cs:lnRef idx="0"/>
+    <cs:fillRef idx="0"/>
+    <cs:effectRef idx="0"/>
+    <cs:fontRef idx="minor">
+      <a:schemeClr val="tx1"/>
+    </cs:fontRef>
+  </cs:plotArea3D>
+  <cs:seriesAxis>
+    <cs:lnRef idx="0"/>
+    <cs:fillRef idx="0"/>
+    <cs:effectRef idx="0"/>
+    <cs:fontRef idx="minor">
+      <a:schemeClr val="tx1">
+        <a:lumMod val="65000"/>
+        <a:lumOff val="35000"/>
+      </a:schemeClr>
+    </cs:fontRef>
+    <cs:defRPr sz="1197" kern="1200"/>
+  </cs:seriesAxis>
+  <cs:seriesLine>
+    <cs:lnRef idx="0"/>
+    <cs:fillRef idx="0"/>
+    <cs:effectRef idx="0"/>
+    <cs:fontRef idx="minor">
+      <a:schemeClr val="tx1"/>
+    </cs:fontRef>
+    <cs:spPr>
+      <a:ln w="9525" cap="flat" cmpd="sng" algn="ctr">
+        <a:solidFill>
+          <a:schemeClr val="tx1">
+            <a:lumMod val="35000"/>
+            <a:lumOff val="65000"/>
+          </a:schemeClr>
+        </a:solidFill>
+        <a:round/>
+      </a:ln>
+    </cs:spPr>
+  </cs:seriesLine>
+  <cs:title>
+    <cs:lnRef idx="0"/>
+    <cs:fillRef idx="0"/>
+    <cs:effectRef idx="0"/>
+    <cs:fontRef idx="minor">
+      <a:schemeClr val="tx1">
+        <a:lumMod val="65000"/>
+        <a:lumOff val="35000"/>
+      </a:schemeClr>
+    </cs:fontRef>
+    <cs:defRPr sz="1862" b="0" kern="1200" spc="0" baseline="0"/>
+  </cs:title>
+  <cs:trendline>
+    <cs:lnRef idx="0">
+      <cs:styleClr val="auto"/>
+    </cs:lnRef>
+    <cs:fillRef idx="0"/>
+    <cs:effectRef idx="0"/>
+    <cs:fontRef idx="minor">
+      <a:schemeClr val="tx1"/>
+    </cs:fontRef>
+    <cs:spPr>
+      <a:ln w="19050" cap="rnd">
+        <a:solidFill>
+          <a:schemeClr val="phClr"/>
+        </a:solidFill>
+        <a:prstDash val="sysDot"/>
+      </a:ln>
+    </cs:spPr>
+  </cs:trendline>
+  <cs:trendlineLabel>
+    <cs:lnRef idx="0"/>
+    <cs:fillRef idx="0"/>
+    <cs:effectRef idx="0"/>
+    <cs:fontRef idx="minor">
+      <a:schemeClr val="tx1">
+        <a:lumMod val="65000"/>
+        <a:lumOff val="35000"/>
+      </a:schemeClr>
+    </cs:fontRef>
+    <cs:defRPr sz="1197" kern="1200"/>
+  </cs:trendlineLabel>
+  <cs:upBar>
+    <cs:lnRef idx="0"/>
+    <cs:fillRef idx="0"/>
+    <cs:effectRef idx="0"/>
+    <cs:fontRef idx="minor">
+      <a:schemeClr val="tx1"/>
+    </cs:fontRef>
+    <cs:spPr>
+      <a:solidFill>
+        <a:schemeClr val="lt1"/>
+      </a:solidFill>
+      <a:ln w="9525" cap="flat" cmpd="sng" algn="ctr">
+        <a:solidFill>
+          <a:schemeClr val="tx1">
+            <a:lumMod val="65000"/>
+            <a:lumOff val="35000"/>
+          </a:schemeClr>
+        </a:solidFill>
+        <a:round/>
+      </a:ln>
+    </cs:spPr>
+  </cs:upBar>
+  <cs:valueAxis>
+    <cs:lnRef idx="0"/>
+    <cs:fillRef idx="0"/>
+    <cs:effectRef idx="0"/>
+    <cs:fontRef idx="minor">
+      <a:schemeClr val="tx1">
+        <a:lumMod val="65000"/>
+        <a:lumOff val="35000"/>
+      </a:schemeClr>
+    </cs:fontRef>
+    <cs:defRPr sz="1197" kern="1200"/>
+  </cs:valueAxis>
+  <cs:wall>
+    <cs:lnRef idx="0"/>
+    <cs:fillRef idx="0"/>
+    <cs:effectRef idx="0"/>
+    <cs:fontRef idx="minor">
+      <a:schemeClr val="tx1"/>
+    </cs:fontRef>
+    <cs:spPr>
+      <a:noFill/>
+      <a:ln>
+        <a:noFill/>
+      </a:ln>
+    </cs:spPr>
+  </cs:wall>
+</cs:chartStyle>
+</file>
+
+<file path=ppt/charts/style4.xml><?xml version="1.0" encoding="utf-8"?>
+<cs:chartStyle xmlns:cs="http://schemas.microsoft.com/office/drawing/2012/chartStyle" xmlns:a="http://schemas.openxmlformats.org/drawingml/2006/main" id="201">
+  <cs:axisTitle>
+    <cs:lnRef idx="0"/>
+    <cs:fillRef idx="0"/>
+    <cs:effectRef idx="0"/>
+    <cs:fontRef idx="minor">
+      <a:schemeClr val="tx1">
+        <a:lumMod val="65000"/>
+        <a:lumOff val="35000"/>
+      </a:schemeClr>
+    </cs:fontRef>
+    <cs:defRPr sz="1330" kern="1200"/>
+  </cs:axisTitle>
+  <cs:categoryAxis>
+    <cs:lnRef idx="0"/>
+    <cs:fillRef idx="0"/>
+    <cs:effectRef idx="0"/>
+    <cs:fontRef idx="minor">
+      <a:schemeClr val="tx1">
+        <a:lumMod val="65000"/>
+        <a:lumOff val="35000"/>
+      </a:schemeClr>
+    </cs:fontRef>
+    <cs:spPr>
+      <a:ln w="9525" cap="flat" cmpd="sng" algn="ctr">
+        <a:solidFill>
+          <a:schemeClr val="tx1">
+            <a:lumMod val="15000"/>
+            <a:lumOff val="85000"/>
+          </a:schemeClr>
+        </a:solidFill>
+        <a:round/>
+      </a:ln>
+    </cs:spPr>
+    <cs:defRPr sz="1197" kern="1200"/>
+  </cs:categoryAxis>
+  <cs:chartArea mods="allowNoFillOverride allowNoLineOverride">
+    <cs:lnRef idx="0"/>
+    <cs:fillRef idx="0"/>
+    <cs:effectRef idx="0"/>
+    <cs:fontRef idx="minor">
+      <a:schemeClr val="tx1"/>
+    </cs:fontRef>
+    <cs:spPr>
+      <a:solidFill>
+        <a:schemeClr val="bg1"/>
+      </a:solidFill>
+      <a:ln w="9525" cap="flat" cmpd="sng" algn="ctr">
+        <a:solidFill>
+          <a:schemeClr val="tx1">
+            <a:lumMod val="15000"/>
+            <a:lumOff val="85000"/>
+          </a:schemeClr>
+        </a:solidFill>
+        <a:round/>
+      </a:ln>
+    </cs:spPr>
+    <cs:defRPr sz="1330" kern="1200"/>
+  </cs:chartArea>
+  <cs:dataLabel>
+    <cs:lnRef idx="0"/>
+    <cs:fillRef idx="0"/>
+    <cs:effectRef idx="0"/>
+    <cs:fontRef idx="minor">
+      <a:schemeClr val="tx1">
+        <a:lumMod val="75000"/>
+        <a:lumOff val="25000"/>
+      </a:schemeClr>
+    </cs:fontRef>
+    <cs:defRPr sz="1197" kern="1200"/>
+  </cs:dataLabel>
+  <cs:dataLabelCallout>
+    <cs:lnRef idx="0"/>
+    <cs:fillRef idx="0"/>
+    <cs:effectRef idx="0"/>
+    <cs:fontRef idx="minor">
+      <a:schemeClr val="dk1">
+        <a:lumMod val="65000"/>
+        <a:lumOff val="35000"/>
+      </a:schemeClr>
+    </cs:fontRef>
+    <cs:spPr>
+      <a:solidFill>
+        <a:schemeClr val="lt1"/>
+      </a:solidFill>
+      <a:ln>
+        <a:solidFill>
+          <a:schemeClr val="dk1">
+            <a:lumMod val="25000"/>
+            <a:lumOff val="75000"/>
+          </a:schemeClr>
+        </a:solidFill>
+      </a:ln>
+    </cs:spPr>
+    <cs:defRPr sz="1197" kern="1200"/>
+    <cs:bodyPr rot="0" spcFirstLastPara="1" vertOverflow="clip" horzOverflow="clip" vert="horz" wrap="square" lIns="36576" tIns="18288" rIns="36576" bIns="18288" anchor="ctr" anchorCtr="1">
+      <a:spAutoFit/>
+    </cs:bodyPr>
+  </cs:dataLabelCallout>
+  <cs:dataPoint>
+    <cs:lnRef idx="0"/>
+    <cs:fillRef idx="1">
+      <cs:styleClr val="auto"/>
+    </cs:fillRef>
+    <cs:effectRef idx="0"/>
+    <cs:fontRef idx="minor">
+      <a:schemeClr val="tx1"/>
+    </cs:fontRef>
+  </cs:dataPoint>
+  <cs:dataPoint3D>
+    <cs:lnRef idx="0"/>
+    <cs:fillRef idx="1">
+      <cs:styleClr val="auto"/>
+    </cs:fillRef>
+    <cs:effectRef idx="0"/>
+    <cs:fontRef idx="minor">
+      <a:schemeClr val="tx1"/>
+    </cs:fontRef>
+  </cs:dataPoint3D>
+  <cs:dataPointLine>
+    <cs:lnRef idx="0">
+      <cs:styleClr val="auto"/>
+    </cs:lnRef>
+    <cs:fillRef idx="1"/>
+    <cs:effectRef idx="0"/>
+    <cs:fontRef idx="minor">
+      <a:schemeClr val="tx1"/>
+    </cs:fontRef>
+    <cs:spPr>
+      <a:ln w="28575" cap="rnd">
+        <a:solidFill>
+          <a:schemeClr val="phClr"/>
+        </a:solidFill>
+        <a:round/>
+      </a:ln>
+    </cs:spPr>
+  </cs:dataPointLine>
+  <cs:dataPointMarker>
+    <cs:lnRef idx="0">
+      <cs:styleClr val="auto"/>
+    </cs:lnRef>
+    <cs:fillRef idx="1">
+      <cs:styleClr val="auto"/>
+    </cs:fillRef>
+    <cs:effectRef idx="0"/>
+    <cs:fontRef idx="minor">
+      <a:schemeClr val="tx1"/>
+    </cs:fontRef>
+    <cs:spPr>
+      <a:ln w="9525">
+        <a:solidFill>
+          <a:schemeClr val="phClr"/>
+        </a:solidFill>
+      </a:ln>
+    </cs:spPr>
+  </cs:dataPointMarker>
+  <cs:dataPointMarkerLayout symbol="circle" size="5"/>
+  <cs:dataPointWireframe>
+    <cs:lnRef idx="0">
+      <cs:styleClr val="auto"/>
+    </cs:lnRef>
+    <cs:fillRef idx="1"/>
+    <cs:effectRef idx="0"/>
+    <cs:fontRef idx="minor">
+      <a:schemeClr val="tx1"/>
+    </cs:fontRef>
+    <cs:spPr>
+      <a:ln w="9525" cap="rnd">
+        <a:solidFill>
+          <a:schemeClr val="phClr"/>
+        </a:solidFill>
+        <a:round/>
+      </a:ln>
+    </cs:spPr>
+  </cs:dataPointWireframe>
+  <cs:dataTable>
+    <cs:lnRef idx="0"/>
+    <cs:fillRef idx="0"/>
+    <cs:effectRef idx="0"/>
+    <cs:fontRef idx="minor">
+      <a:schemeClr val="tx1">
+        <a:lumMod val="65000"/>
+        <a:lumOff val="35000"/>
+      </a:schemeClr>
+    </cs:fontRef>
+    <cs:spPr>
+      <a:noFill/>
+      <a:ln w="9525" cap="flat" cmpd="sng" algn="ctr">
+        <a:solidFill>
+          <a:schemeClr val="tx1">
+            <a:lumMod val="15000"/>
+            <a:lumOff val="85000"/>
+          </a:schemeClr>
+        </a:solidFill>
+        <a:round/>
+      </a:ln>
+    </cs:spPr>
+    <cs:defRPr sz="1197" kern="1200"/>
+  </cs:dataTable>
+  <cs:downBar>
+    <cs:lnRef idx="0"/>
+    <cs:fillRef idx="0"/>
+    <cs:effectRef idx="0"/>
+    <cs:fontRef idx="minor">
+      <a:schemeClr val="dk1"/>
+    </cs:fontRef>
+    <cs:spPr>
+      <a:solidFill>
+        <a:schemeClr val="dk1">
+          <a:lumMod val="65000"/>
+          <a:lumOff val="35000"/>
+        </a:schemeClr>
+      </a:solidFill>
+      <a:ln w="9525">
+        <a:solidFill>
+          <a:schemeClr val="tx1">
+            <a:lumMod val="65000"/>
+            <a:lumOff val="35000"/>
+          </a:schemeClr>
+        </a:solidFill>
+      </a:ln>
+    </cs:spPr>
+  </cs:downBar>
+  <cs:dropLine>
+    <cs:lnRef idx="0"/>
+    <cs:fillRef idx="0"/>
+    <cs:effectRef idx="0"/>
+    <cs:fontRef idx="minor">
+      <a:schemeClr val="tx1"/>
+    </cs:fontRef>
+    <cs:spPr>
+      <a:ln w="9525" cap="flat" cmpd="sng" algn="ctr">
+        <a:solidFill>
+          <a:schemeClr val="tx1">
+            <a:lumMod val="35000"/>
+            <a:lumOff val="65000"/>
+          </a:schemeClr>
+        </a:solidFill>
+        <a:round/>
+      </a:ln>
+    </cs:spPr>
+  </cs:dropLine>
+  <cs:errorBar>
+    <cs:lnRef idx="0"/>
+    <cs:fillRef idx="0"/>
+    <cs:effectRef idx="0"/>
+    <cs:fontRef idx="minor">
+      <a:schemeClr val="tx1"/>
+    </cs:fontRef>
+    <cs:spPr>
+      <a:ln w="9525" cap="flat" cmpd="sng" algn="ctr">
+        <a:solidFill>
+          <a:schemeClr val="tx1">
+            <a:lumMod val="65000"/>
+            <a:lumOff val="35000"/>
+          </a:schemeClr>
+        </a:solidFill>
+        <a:round/>
+      </a:ln>
+    </cs:spPr>
+  </cs:errorBar>
+  <cs:floor>
+    <cs:lnRef idx="0"/>
+    <cs:fillRef idx="0"/>
+    <cs:effectRef idx="0"/>
+    <cs:fontRef idx="minor">
+      <a:schemeClr val="tx1"/>
+    </cs:fontRef>
+    <cs:spPr>
+      <a:noFill/>
+      <a:ln>
+        <a:noFill/>
+      </a:ln>
+    </cs:spPr>
+  </cs:floor>
+  <cs:gridlineMajor>
+    <cs:lnRef idx="0"/>
+    <cs:fillRef idx="0"/>
+    <cs:effectRef idx="0"/>
+    <cs:fontRef idx="minor">
+      <a:schemeClr val="tx1"/>
+    </cs:fontRef>
+    <cs:spPr>
+      <a:ln w="9525" cap="flat" cmpd="sng" algn="ctr">
+        <a:solidFill>
+          <a:schemeClr val="tx1">
+            <a:lumMod val="15000"/>
+            <a:lumOff val="85000"/>
+          </a:schemeClr>
+        </a:solidFill>
+        <a:round/>
+      </a:ln>
+    </cs:spPr>
+  </cs:gridlineMajor>
+  <cs:gridlineMinor>
+    <cs:lnRef idx="0"/>
+    <cs:fillRef idx="0"/>
+    <cs:effectRef idx="0"/>
+    <cs:fontRef idx="minor">
+      <a:schemeClr val="tx1"/>
+    </cs:fontRef>
+    <cs:spPr>
+      <a:ln w="9525" cap="flat" cmpd="sng" algn="ctr">
+        <a:solidFill>
+          <a:schemeClr val="tx1">
+            <a:lumMod val="5000"/>
+            <a:lumOff val="95000"/>
+          </a:schemeClr>
+        </a:solidFill>
+        <a:round/>
+      </a:ln>
+    </cs:spPr>
+  </cs:gridlineMinor>
+  <cs:hiLoLine>
+    <cs:lnRef idx="0"/>
+    <cs:fillRef idx="0"/>
+    <cs:effectRef idx="0"/>
+    <cs:fontRef idx="minor">
+      <a:schemeClr val="tx1"/>
+    </cs:fontRef>
+    <cs:spPr>
+      <a:ln w="9525" cap="flat" cmpd="sng" algn="ctr">
+        <a:solidFill>
+          <a:schemeClr val="tx1">
+            <a:lumMod val="75000"/>
+            <a:lumOff val="25000"/>
+          </a:schemeClr>
+        </a:solidFill>
+        <a:round/>
+      </a:ln>
+    </cs:spPr>
+  </cs:hiLoLine>
+  <cs:leaderLine>
+    <cs:lnRef idx="0"/>
+    <cs:fillRef idx="0"/>
+    <cs:effectRef idx="0"/>
+    <cs:fontRef idx="minor">
+      <a:schemeClr val="tx1"/>
+    </cs:fontRef>
+    <cs:spPr>
+      <a:ln w="9525" cap="flat" cmpd="sng" algn="ctr">
+        <a:solidFill>
+          <a:schemeClr val="tx1">
+            <a:lumMod val="35000"/>
+            <a:lumOff val="65000"/>
+          </a:schemeClr>
+        </a:solidFill>
+        <a:round/>
+      </a:ln>
+    </cs:spPr>
+  </cs:leaderLine>
+  <cs:legend>
+    <cs:lnRef idx="0"/>
+    <cs:fillRef idx="0"/>
+    <cs:effectRef idx="0"/>
+    <cs:fontRef idx="minor">
+      <a:schemeClr val="tx1">
+        <a:lumMod val="65000"/>
+        <a:lumOff val="35000"/>
+      </a:schemeClr>
+    </cs:fontRef>
+    <cs:defRPr sz="1197" kern="1200"/>
+  </cs:legend>
+  <cs:plotArea mods="allowNoFillOverride allowNoLineOverride">
+    <cs:lnRef idx="0"/>
+    <cs:fillRef idx="0"/>
+    <cs:effectRef idx="0"/>
+    <cs:fontRef idx="minor">
+      <a:schemeClr val="tx1"/>
+    </cs:fontRef>
+  </cs:plotArea>
+  <cs:plotArea3D mods="allowNoFillOverride allowNoLineOverride">
+    <cs:lnRef idx="0"/>
+    <cs:fillRef idx="0"/>
+    <cs:effectRef idx="0"/>
+    <cs:fontRef idx="minor">
+      <a:schemeClr val="tx1"/>
+    </cs:fontRef>
+  </cs:plotArea3D>
+  <cs:seriesAxis>
+    <cs:lnRef idx="0"/>
+    <cs:fillRef idx="0"/>
+    <cs:effectRef idx="0"/>
+    <cs:fontRef idx="minor">
+      <a:schemeClr val="tx1">
+        <a:lumMod val="65000"/>
+        <a:lumOff val="35000"/>
+      </a:schemeClr>
+    </cs:fontRef>
+    <cs:defRPr sz="1197" kern="1200"/>
+  </cs:seriesAxis>
+  <cs:seriesLine>
+    <cs:lnRef idx="0"/>
+    <cs:fillRef idx="0"/>
+    <cs:effectRef idx="0"/>
+    <cs:fontRef idx="minor">
+      <a:schemeClr val="tx1"/>
+    </cs:fontRef>
+    <cs:spPr>
+      <a:ln w="9525" cap="flat" cmpd="sng" algn="ctr">
+        <a:solidFill>
+          <a:schemeClr val="tx1">
+            <a:lumMod val="35000"/>
+            <a:lumOff val="65000"/>
+          </a:schemeClr>
+        </a:solidFill>
+        <a:round/>
+      </a:ln>
+    </cs:spPr>
+  </cs:seriesLine>
+  <cs:title>
+    <cs:lnRef idx="0"/>
+    <cs:fillRef idx="0"/>
+    <cs:effectRef idx="0"/>
+    <cs:fontRef idx="minor">
+      <a:schemeClr val="tx1">
+        <a:lumMod val="65000"/>
+        <a:lumOff val="35000"/>
+      </a:schemeClr>
+    </cs:fontRef>
+    <cs:defRPr sz="1862" b="0" kern="1200" spc="0" baseline="0"/>
+  </cs:title>
+  <cs:trendline>
+    <cs:lnRef idx="0">
+      <cs:styleClr val="auto"/>
+    </cs:lnRef>
+    <cs:fillRef idx="0"/>
+    <cs:effectRef idx="0"/>
+    <cs:fontRef idx="minor">
+      <a:schemeClr val="tx1"/>
+    </cs:fontRef>
+    <cs:spPr>
+      <a:ln w="19050" cap="rnd">
+        <a:solidFill>
+          <a:schemeClr val="phClr"/>
+        </a:solidFill>
+        <a:prstDash val="sysDot"/>
+      </a:ln>
+    </cs:spPr>
+  </cs:trendline>
+  <cs:trendlineLabel>
+    <cs:lnRef idx="0"/>
+    <cs:fillRef idx="0"/>
+    <cs:effectRef idx="0"/>
+    <cs:fontRef idx="minor">
+      <a:schemeClr val="tx1">
+        <a:lumMod val="65000"/>
+        <a:lumOff val="35000"/>
+      </a:schemeClr>
+    </cs:fontRef>
+    <cs:defRPr sz="1197" kern="1200"/>
+  </cs:trendlineLabel>
+  <cs:upBar>
+    <cs:lnRef idx="0"/>
+    <cs:fillRef idx="0"/>
+    <cs:effectRef idx="0"/>
+    <cs:fontRef idx="minor">
+      <a:schemeClr val="dk1"/>
+    </cs:fontRef>
+    <cs:spPr>
+      <a:solidFill>
+        <a:schemeClr val="lt1"/>
+      </a:solidFill>
+      <a:ln w="9525">
+        <a:solidFill>
+          <a:schemeClr val="tx1">
+            <a:lumMod val="15000"/>
+            <a:lumOff val="85000"/>
+          </a:schemeClr>
+        </a:solidFill>
+      </a:ln>
+    </cs:spPr>
+  </cs:upBar>
+  <cs:valueAxis>
+    <cs:lnRef idx="0"/>
+    <cs:fillRef idx="0"/>
+    <cs:effectRef idx="0"/>
+    <cs:fontRef idx="minor">
+      <a:schemeClr val="tx1">
+        <a:lumMod val="65000"/>
+        <a:lumOff val="35000"/>
+      </a:schemeClr>
+    </cs:fontRef>
+    <cs:defRPr sz="1197" kern="1200"/>
+  </cs:valueAxis>
+  <cs:wall>
+    <cs:lnRef idx="0"/>
+    <cs:fillRef idx="0"/>
+    <cs:effectRef idx="0"/>
+    <cs:fontRef idx="minor">
+      <a:schemeClr val="tx1"/>
+    </cs:fontRef>
+    <cs:spPr>
+      <a:noFill/>
+      <a:ln>
+        <a:noFill/>
+      </a:ln>
+    </cs:spPr>
+  </cs:wall>
+</cs:chartStyle>
 </file>
 
 <file path=ppt/diagrams/colors1.xml><?xml version="1.0" encoding="utf-8"?>
@@ -941,10 +4327,6 @@
             <a:rPr lang="en-US" dirty="0" err="1" smtClean="0"/>
             <a:t>Coref</a:t>
           </a:r>
-          <a:r>
-            <a:rPr lang="en-US" dirty="0" smtClean="0"/>
-            <a:t> Sol</a:t>
-          </a:r>
           <a:endParaRPr lang="en-US" dirty="0"/>
         </a:p>
       </dgm:t>
@@ -1283,6 +4665,13 @@
         </dgm:presLayoutVars>
       </dgm:prSet>
       <dgm:spPr/>
+      <dgm:t>
+        <a:bodyPr/>
+        <a:lstStyle/>
+        <a:p>
+          <a:endParaRPr lang="en-US"/>
+        </a:p>
+      </dgm:t>
     </dgm:pt>
     <dgm:pt modelId="{D957385E-43C8-4D96-A5D7-E599824C0A86}" type="pres">
       <dgm:prSet presAssocID="{1E2784D9-9E29-46B1-B9CD-A3C05C54593B}" presName="hierRoot1" presStyleCnt="0">
@@ -1304,6 +4693,13 @@
         </dgm:presLayoutVars>
       </dgm:prSet>
       <dgm:spPr/>
+      <dgm:t>
+        <a:bodyPr/>
+        <a:lstStyle/>
+        <a:p>
+          <a:endParaRPr lang="en-US"/>
+        </a:p>
+      </dgm:t>
     </dgm:pt>
     <dgm:pt modelId="{BA516EC6-DB45-48D6-8905-CC8D0E4CCE5B}" type="pres">
       <dgm:prSet presAssocID="{1E2784D9-9E29-46B1-B9CD-A3C05C54593B}" presName="titleText1" presStyleLbl="fgAcc0" presStyleIdx="0" presStyleCnt="1">
@@ -1313,10 +4709,24 @@
         </dgm:presLayoutVars>
       </dgm:prSet>
       <dgm:spPr/>
+      <dgm:t>
+        <a:bodyPr/>
+        <a:lstStyle/>
+        <a:p>
+          <a:endParaRPr lang="en-US"/>
+        </a:p>
+      </dgm:t>
     </dgm:pt>
     <dgm:pt modelId="{AD514E5D-E3C4-4DB0-BC0B-64DA792EBD9D}" type="pres">
       <dgm:prSet presAssocID="{1E2784D9-9E29-46B1-B9CD-A3C05C54593B}" presName="rootConnector1" presStyleLbl="node1" presStyleIdx="0" presStyleCnt="9"/>
       <dgm:spPr/>
+      <dgm:t>
+        <a:bodyPr/>
+        <a:lstStyle/>
+        <a:p>
+          <a:endParaRPr lang="en-US"/>
+        </a:p>
+      </dgm:t>
     </dgm:pt>
     <dgm:pt modelId="{F7716328-805E-4A61-8AEB-B5253EAEAD81}" type="pres">
       <dgm:prSet presAssocID="{1E2784D9-9E29-46B1-B9CD-A3C05C54593B}" presName="hierChild2" presStyleCnt="0"/>
@@ -1325,6 +4735,13 @@
     <dgm:pt modelId="{BA9A97A3-465C-4C5E-9258-10462B936FBE}" type="pres">
       <dgm:prSet presAssocID="{011BEE12-D095-4EBA-8B43-4F8E44C024DE}" presName="Name37" presStyleLbl="parChTrans1D2" presStyleIdx="0" presStyleCnt="2"/>
       <dgm:spPr/>
+      <dgm:t>
+        <a:bodyPr/>
+        <a:lstStyle/>
+        <a:p>
+          <a:endParaRPr lang="en-US"/>
+        </a:p>
+      </dgm:t>
     </dgm:pt>
     <dgm:pt modelId="{3A456AD9-8DCD-43EE-8541-5456671034B9}" type="pres">
       <dgm:prSet presAssocID="{AAC51C4B-0887-4EAB-AFA6-5E1639F0180B}" presName="hierRoot2" presStyleCnt="0">
@@ -1362,10 +4779,24 @@
         </dgm:presLayoutVars>
       </dgm:prSet>
       <dgm:spPr/>
+      <dgm:t>
+        <a:bodyPr/>
+        <a:lstStyle/>
+        <a:p>
+          <a:endParaRPr lang="en-US"/>
+        </a:p>
+      </dgm:t>
     </dgm:pt>
     <dgm:pt modelId="{B8D2D5D9-28CB-4A62-B31E-0DF25271FC25}" type="pres">
       <dgm:prSet presAssocID="{AAC51C4B-0887-4EAB-AFA6-5E1639F0180B}" presName="rootConnector" presStyleLbl="node2" presStyleIdx="0" presStyleCnt="0"/>
       <dgm:spPr/>
+      <dgm:t>
+        <a:bodyPr/>
+        <a:lstStyle/>
+        <a:p>
+          <a:endParaRPr lang="en-US"/>
+        </a:p>
+      </dgm:t>
     </dgm:pt>
     <dgm:pt modelId="{BB714AD1-6147-4737-A489-62C139D2E27A}" type="pres">
       <dgm:prSet presAssocID="{AAC51C4B-0887-4EAB-AFA6-5E1639F0180B}" presName="hierChild4" presStyleCnt="0"/>
@@ -1374,6 +4805,13 @@
     <dgm:pt modelId="{6FE1E39E-9BFB-4389-9630-D058398DCF54}" type="pres">
       <dgm:prSet presAssocID="{C3A847CF-25FB-44D2-8C05-340859574390}" presName="Name37" presStyleLbl="parChTrans1D3" presStyleIdx="0" presStyleCnt="7"/>
       <dgm:spPr/>
+      <dgm:t>
+        <a:bodyPr/>
+        <a:lstStyle/>
+        <a:p>
+          <a:endParaRPr lang="en-US"/>
+        </a:p>
+      </dgm:t>
     </dgm:pt>
     <dgm:pt modelId="{E584C956-FED1-4527-A683-CCCF5049C119}" type="pres">
       <dgm:prSet presAssocID="{DA7AA13C-3C82-4291-9454-29FCBB04CA68}" presName="hierRoot2" presStyleCnt="0">
@@ -1411,10 +4849,24 @@
         </dgm:presLayoutVars>
       </dgm:prSet>
       <dgm:spPr/>
+      <dgm:t>
+        <a:bodyPr/>
+        <a:lstStyle/>
+        <a:p>
+          <a:endParaRPr lang="en-US"/>
+        </a:p>
+      </dgm:t>
     </dgm:pt>
     <dgm:pt modelId="{E97C933E-B148-4CDA-AF1B-FAF402CE2B21}" type="pres">
       <dgm:prSet presAssocID="{DA7AA13C-3C82-4291-9454-29FCBB04CA68}" presName="rootConnector" presStyleLbl="node3" presStyleIdx="0" presStyleCnt="0"/>
       <dgm:spPr/>
+      <dgm:t>
+        <a:bodyPr/>
+        <a:lstStyle/>
+        <a:p>
+          <a:endParaRPr lang="en-US"/>
+        </a:p>
+      </dgm:t>
     </dgm:pt>
     <dgm:pt modelId="{3138BC06-9AB2-4057-9447-082B604FC6DE}" type="pres">
       <dgm:prSet presAssocID="{DA7AA13C-3C82-4291-9454-29FCBB04CA68}" presName="hierChild4" presStyleCnt="0"/>
@@ -1427,6 +4879,13 @@
     <dgm:pt modelId="{FA959E8B-744F-4C9C-9617-F905440A8953}" type="pres">
       <dgm:prSet presAssocID="{CEAE60FA-100D-4E4A-94AD-264BC34FF021}" presName="Name37" presStyleLbl="parChTrans1D3" presStyleIdx="1" presStyleCnt="7"/>
       <dgm:spPr/>
+      <dgm:t>
+        <a:bodyPr/>
+        <a:lstStyle/>
+        <a:p>
+          <a:endParaRPr lang="en-US"/>
+        </a:p>
+      </dgm:t>
     </dgm:pt>
     <dgm:pt modelId="{7F9B87D8-B4AD-4E98-B191-6D117485A960}" type="pres">
       <dgm:prSet presAssocID="{415F60B2-0DF2-48E8-AB82-BEF3A8619F23}" presName="hierRoot2" presStyleCnt="0">
@@ -1448,6 +4907,13 @@
         </dgm:presLayoutVars>
       </dgm:prSet>
       <dgm:spPr/>
+      <dgm:t>
+        <a:bodyPr/>
+        <a:lstStyle/>
+        <a:p>
+          <a:endParaRPr lang="en-US"/>
+        </a:p>
+      </dgm:t>
     </dgm:pt>
     <dgm:pt modelId="{A6982916-4F99-4BAC-8E04-AA593F51FCC3}" type="pres">
       <dgm:prSet presAssocID="{415F60B2-0DF2-48E8-AB82-BEF3A8619F23}" presName="titleText2" presStyleLbl="fgAcc1" presStyleIdx="2" presStyleCnt="9">
@@ -1468,6 +4934,13 @@
     <dgm:pt modelId="{B7AF82D3-6344-4500-B779-F4AD37423617}" type="pres">
       <dgm:prSet presAssocID="{415F60B2-0DF2-48E8-AB82-BEF3A8619F23}" presName="rootConnector" presStyleLbl="node3" presStyleIdx="0" presStyleCnt="0"/>
       <dgm:spPr/>
+      <dgm:t>
+        <a:bodyPr/>
+        <a:lstStyle/>
+        <a:p>
+          <a:endParaRPr lang="en-US"/>
+        </a:p>
+      </dgm:t>
     </dgm:pt>
     <dgm:pt modelId="{15C689AC-1291-46A2-9C66-4ADCAF4BC0D0}" type="pres">
       <dgm:prSet presAssocID="{415F60B2-0DF2-48E8-AB82-BEF3A8619F23}" presName="hierChild4" presStyleCnt="0"/>
@@ -1480,6 +4953,13 @@
     <dgm:pt modelId="{CA568CBB-9518-4E22-8223-F5EEF537CC4A}" type="pres">
       <dgm:prSet presAssocID="{88B99891-9BA2-46F2-B698-C2C3A8AF5B51}" presName="Name37" presStyleLbl="parChTrans1D3" presStyleIdx="2" presStyleCnt="7"/>
       <dgm:spPr/>
+      <dgm:t>
+        <a:bodyPr/>
+        <a:lstStyle/>
+        <a:p>
+          <a:endParaRPr lang="en-US"/>
+        </a:p>
+      </dgm:t>
     </dgm:pt>
     <dgm:pt modelId="{7D2B0D5A-8772-4A57-AA5D-CF1CA50092E3}" type="pres">
       <dgm:prSet presAssocID="{E0FB66E0-33B3-41A4-9BF6-E16E51656A26}" presName="hierRoot2" presStyleCnt="0">
@@ -1501,6 +4981,13 @@
         </dgm:presLayoutVars>
       </dgm:prSet>
       <dgm:spPr/>
+      <dgm:t>
+        <a:bodyPr/>
+        <a:lstStyle/>
+        <a:p>
+          <a:endParaRPr lang="en-US"/>
+        </a:p>
+      </dgm:t>
     </dgm:pt>
     <dgm:pt modelId="{ED56A925-B9E9-4FE6-801B-2A6A234B01EA}" type="pres">
       <dgm:prSet presAssocID="{E0FB66E0-33B3-41A4-9BF6-E16E51656A26}" presName="titleText2" presStyleLbl="fgAcc1" presStyleIdx="3" presStyleCnt="9">
@@ -1510,10 +4997,24 @@
         </dgm:presLayoutVars>
       </dgm:prSet>
       <dgm:spPr/>
+      <dgm:t>
+        <a:bodyPr/>
+        <a:lstStyle/>
+        <a:p>
+          <a:endParaRPr lang="en-US"/>
+        </a:p>
+      </dgm:t>
     </dgm:pt>
     <dgm:pt modelId="{419F8C5F-028E-45B5-98BB-B71BE1D0BE30}" type="pres">
       <dgm:prSet presAssocID="{E0FB66E0-33B3-41A4-9BF6-E16E51656A26}" presName="rootConnector" presStyleLbl="node3" presStyleIdx="0" presStyleCnt="0"/>
       <dgm:spPr/>
+      <dgm:t>
+        <a:bodyPr/>
+        <a:lstStyle/>
+        <a:p>
+          <a:endParaRPr lang="en-US"/>
+        </a:p>
+      </dgm:t>
     </dgm:pt>
     <dgm:pt modelId="{72CFB33E-BCCA-4F37-BEE9-8E8CF668C12F}" type="pres">
       <dgm:prSet presAssocID="{E0FB66E0-33B3-41A4-9BF6-E16E51656A26}" presName="hierChild4" presStyleCnt="0"/>
@@ -1526,6 +5027,13 @@
     <dgm:pt modelId="{1D08CFEC-489C-429E-B5C7-C43DE77D09BD}" type="pres">
       <dgm:prSet presAssocID="{61024248-BF14-4CB3-992D-D984F8702307}" presName="Name37" presStyleLbl="parChTrans1D3" presStyleIdx="3" presStyleCnt="7"/>
       <dgm:spPr/>
+      <dgm:t>
+        <a:bodyPr/>
+        <a:lstStyle/>
+        <a:p>
+          <a:endParaRPr lang="en-US"/>
+        </a:p>
+      </dgm:t>
     </dgm:pt>
     <dgm:pt modelId="{040777EE-C6A9-4629-AAD7-3EE50E165656}" type="pres">
       <dgm:prSet presAssocID="{9FA62B44-0D6A-4544-913C-18B81F2925DA}" presName="hierRoot2" presStyleCnt="0">
@@ -1563,10 +5071,24 @@
         </dgm:presLayoutVars>
       </dgm:prSet>
       <dgm:spPr/>
+      <dgm:t>
+        <a:bodyPr/>
+        <a:lstStyle/>
+        <a:p>
+          <a:endParaRPr lang="en-US"/>
+        </a:p>
+      </dgm:t>
     </dgm:pt>
     <dgm:pt modelId="{464D352C-2622-4765-AFFB-F6CEF0B73C81}" type="pres">
       <dgm:prSet presAssocID="{9FA62B44-0D6A-4544-913C-18B81F2925DA}" presName="rootConnector" presStyleLbl="node3" presStyleIdx="0" presStyleCnt="0"/>
       <dgm:spPr/>
+      <dgm:t>
+        <a:bodyPr/>
+        <a:lstStyle/>
+        <a:p>
+          <a:endParaRPr lang="en-US"/>
+        </a:p>
+      </dgm:t>
     </dgm:pt>
     <dgm:pt modelId="{5726A633-B668-49AF-B6FF-2376434176DB}" type="pres">
       <dgm:prSet presAssocID="{9FA62B44-0D6A-4544-913C-18B81F2925DA}" presName="hierChild4" presStyleCnt="0"/>
@@ -1583,6 +5105,13 @@
     <dgm:pt modelId="{BB49634F-6DB0-4C14-A358-EAB4ED8A1DDD}" type="pres">
       <dgm:prSet presAssocID="{F819521E-5DD1-4C12-BEEA-BFCC9C05B796}" presName="Name37" presStyleLbl="parChTrans1D2" presStyleIdx="1" presStyleCnt="2"/>
       <dgm:spPr/>
+      <dgm:t>
+        <a:bodyPr/>
+        <a:lstStyle/>
+        <a:p>
+          <a:endParaRPr lang="en-US"/>
+        </a:p>
+      </dgm:t>
     </dgm:pt>
     <dgm:pt modelId="{20807286-4A4D-4DEF-91DA-805DCFCBDDC1}" type="pres">
       <dgm:prSet presAssocID="{EE589686-0AEE-4FEC-90E0-42A85C614504}" presName="hierRoot2" presStyleCnt="0">
@@ -1604,6 +5133,13 @@
         </dgm:presLayoutVars>
       </dgm:prSet>
       <dgm:spPr/>
+      <dgm:t>
+        <a:bodyPr/>
+        <a:lstStyle/>
+        <a:p>
+          <a:endParaRPr lang="en-US"/>
+        </a:p>
+      </dgm:t>
     </dgm:pt>
     <dgm:pt modelId="{7411D461-ABDA-4212-9CFE-F2838AFFE510}" type="pres">
       <dgm:prSet presAssocID="{EE589686-0AEE-4FEC-90E0-42A85C614504}" presName="titleText2" presStyleLbl="fgAcc1" presStyleIdx="5" presStyleCnt="9">
@@ -1613,10 +5149,24 @@
         </dgm:presLayoutVars>
       </dgm:prSet>
       <dgm:spPr/>
+      <dgm:t>
+        <a:bodyPr/>
+        <a:lstStyle/>
+        <a:p>
+          <a:endParaRPr lang="en-US"/>
+        </a:p>
+      </dgm:t>
     </dgm:pt>
     <dgm:pt modelId="{9E6D3F4A-E33D-46AA-81C0-82D64B6E19CB}" type="pres">
       <dgm:prSet presAssocID="{EE589686-0AEE-4FEC-90E0-42A85C614504}" presName="rootConnector" presStyleLbl="node2" presStyleIdx="0" presStyleCnt="0"/>
       <dgm:spPr/>
+      <dgm:t>
+        <a:bodyPr/>
+        <a:lstStyle/>
+        <a:p>
+          <a:endParaRPr lang="en-US"/>
+        </a:p>
+      </dgm:t>
     </dgm:pt>
     <dgm:pt modelId="{A69A0336-1B19-4E21-8B21-F212D99CA0E0}" type="pres">
       <dgm:prSet presAssocID="{EE589686-0AEE-4FEC-90E0-42A85C614504}" presName="hierChild4" presStyleCnt="0"/>
@@ -1625,6 +5175,13 @@
     <dgm:pt modelId="{FF0A65A8-FA0D-4982-B1EC-B5AD458F5A2F}" type="pres">
       <dgm:prSet presAssocID="{B37AF6E0-0509-4DD3-80B9-05BF72DB5DF3}" presName="Name37" presStyleLbl="parChTrans1D3" presStyleIdx="4" presStyleCnt="7"/>
       <dgm:spPr/>
+      <dgm:t>
+        <a:bodyPr/>
+        <a:lstStyle/>
+        <a:p>
+          <a:endParaRPr lang="en-US"/>
+        </a:p>
+      </dgm:t>
     </dgm:pt>
     <dgm:pt modelId="{2E7327FC-1EB1-4B30-B247-3CED512B2C7C}" type="pres">
       <dgm:prSet presAssocID="{74CC264C-3864-475D-A47C-AA842A8BF945}" presName="hierRoot2" presStyleCnt="0">
@@ -1662,10 +5219,24 @@
         </dgm:presLayoutVars>
       </dgm:prSet>
       <dgm:spPr/>
+      <dgm:t>
+        <a:bodyPr/>
+        <a:lstStyle/>
+        <a:p>
+          <a:endParaRPr lang="en-US"/>
+        </a:p>
+      </dgm:t>
     </dgm:pt>
     <dgm:pt modelId="{0700B41A-B197-4B85-9323-F3F8FEC8EE81}" type="pres">
       <dgm:prSet presAssocID="{74CC264C-3864-475D-A47C-AA842A8BF945}" presName="rootConnector" presStyleLbl="node3" presStyleIdx="0" presStyleCnt="0"/>
       <dgm:spPr/>
+      <dgm:t>
+        <a:bodyPr/>
+        <a:lstStyle/>
+        <a:p>
+          <a:endParaRPr lang="en-US"/>
+        </a:p>
+      </dgm:t>
     </dgm:pt>
     <dgm:pt modelId="{CF6FBF26-F6D2-46F2-8638-66A925215347}" type="pres">
       <dgm:prSet presAssocID="{74CC264C-3864-475D-A47C-AA842A8BF945}" presName="hierChild4" presStyleCnt="0"/>
@@ -1678,6 +5249,13 @@
     <dgm:pt modelId="{C8DDC76C-256F-4A01-895E-F828F30DBFD3}" type="pres">
       <dgm:prSet presAssocID="{CDC9A5B6-6288-41D8-A687-BD7DFDB711FD}" presName="Name37" presStyleLbl="parChTrans1D3" presStyleIdx="5" presStyleCnt="7"/>
       <dgm:spPr/>
+      <dgm:t>
+        <a:bodyPr/>
+        <a:lstStyle/>
+        <a:p>
+          <a:endParaRPr lang="en-US"/>
+        </a:p>
+      </dgm:t>
     </dgm:pt>
     <dgm:pt modelId="{41D3B52B-64ED-4E83-82A3-5A1BD0F9604A}" type="pres">
       <dgm:prSet presAssocID="{BA19D309-EBC4-437E-BF7B-0CC6B0B2CFEB}" presName="hierRoot2" presStyleCnt="0">
@@ -1699,6 +5277,13 @@
         </dgm:presLayoutVars>
       </dgm:prSet>
       <dgm:spPr/>
+      <dgm:t>
+        <a:bodyPr/>
+        <a:lstStyle/>
+        <a:p>
+          <a:endParaRPr lang="en-US"/>
+        </a:p>
+      </dgm:t>
     </dgm:pt>
     <dgm:pt modelId="{5129C98D-8E1A-466B-8D5D-E4988D757573}" type="pres">
       <dgm:prSet presAssocID="{BA19D309-EBC4-437E-BF7B-0CC6B0B2CFEB}" presName="titleText2" presStyleLbl="fgAcc1" presStyleIdx="7" presStyleCnt="9">
@@ -1708,10 +5293,24 @@
         </dgm:presLayoutVars>
       </dgm:prSet>
       <dgm:spPr/>
+      <dgm:t>
+        <a:bodyPr/>
+        <a:lstStyle/>
+        <a:p>
+          <a:endParaRPr lang="en-US"/>
+        </a:p>
+      </dgm:t>
     </dgm:pt>
     <dgm:pt modelId="{D7359B74-4B2E-4FA4-80BA-9D344056CDAC}" type="pres">
       <dgm:prSet presAssocID="{BA19D309-EBC4-437E-BF7B-0CC6B0B2CFEB}" presName="rootConnector" presStyleLbl="node3" presStyleIdx="0" presStyleCnt="0"/>
       <dgm:spPr/>
+      <dgm:t>
+        <a:bodyPr/>
+        <a:lstStyle/>
+        <a:p>
+          <a:endParaRPr lang="en-US"/>
+        </a:p>
+      </dgm:t>
     </dgm:pt>
     <dgm:pt modelId="{2C8D2FD0-974F-48D7-84DC-1F63A14A6EF3}" type="pres">
       <dgm:prSet presAssocID="{BA19D309-EBC4-437E-BF7B-0CC6B0B2CFEB}" presName="hierChild4" presStyleCnt="0"/>
@@ -1724,6 +5323,13 @@
     <dgm:pt modelId="{5E7B65F4-92C5-4201-803D-D7B1487A5BFA}" type="pres">
       <dgm:prSet presAssocID="{059399E2-58CC-45C3-A34B-62318B1C12FA}" presName="Name37" presStyleLbl="parChTrans1D3" presStyleIdx="6" presStyleCnt="7"/>
       <dgm:spPr/>
+      <dgm:t>
+        <a:bodyPr/>
+        <a:lstStyle/>
+        <a:p>
+          <a:endParaRPr lang="en-US"/>
+        </a:p>
+      </dgm:t>
     </dgm:pt>
     <dgm:pt modelId="{3D9EB86D-7113-4817-A15D-0E7493711B9E}" type="pres">
       <dgm:prSet presAssocID="{D75B104E-FEE9-4938-9BB3-67A86C294A49}" presName="hierRoot2" presStyleCnt="0">
@@ -1761,10 +5367,24 @@
         </dgm:presLayoutVars>
       </dgm:prSet>
       <dgm:spPr/>
+      <dgm:t>
+        <a:bodyPr/>
+        <a:lstStyle/>
+        <a:p>
+          <a:endParaRPr lang="en-US"/>
+        </a:p>
+      </dgm:t>
     </dgm:pt>
     <dgm:pt modelId="{6BF2C2C8-578E-488A-BB48-63A4E50D70F6}" type="pres">
       <dgm:prSet presAssocID="{D75B104E-FEE9-4938-9BB3-67A86C294A49}" presName="rootConnector" presStyleLbl="node3" presStyleIdx="0" presStyleCnt="0"/>
       <dgm:spPr/>
+      <dgm:t>
+        <a:bodyPr/>
+        <a:lstStyle/>
+        <a:p>
+          <a:endParaRPr lang="en-US"/>
+        </a:p>
+      </dgm:t>
     </dgm:pt>
     <dgm:pt modelId="{D590EBA9-874F-4CA2-AC46-142BCDDF5C4E}" type="pres">
       <dgm:prSet presAssocID="{D75B104E-FEE9-4938-9BB3-67A86C294A49}" presName="hierChild4" presStyleCnt="0"/>
@@ -1784,56 +5404,56 @@
     </dgm:pt>
   </dgm:ptLst>
   <dgm:cxnLst>
+    <dgm:cxn modelId="{9F0236C6-8A9C-421C-BB7E-B21E5D5CD072}" type="presOf" srcId="{CEAE60FA-100D-4E4A-94AD-264BC34FF021}" destId="{FA959E8B-744F-4C9C-9617-F905440A8953}" srcOrd="0" destOrd="0" presId="urn:microsoft.com/office/officeart/2008/layout/NameandTitleOrganizationalChart"/>
+    <dgm:cxn modelId="{FF7EE5DF-7151-4A93-B717-8BBAC568631D}" srcId="{45787D4F-C6F1-4868-B2FC-31AC19BFA3A7}" destId="{1E2784D9-9E29-46B1-B9CD-A3C05C54593B}" srcOrd="0" destOrd="0" parTransId="{C80E7303-3294-4AEF-8D7A-1520EFDE9CBE}" sibTransId="{91F40493-27F4-4C74-8AAE-37E11A396D43}"/>
+    <dgm:cxn modelId="{E9E01FDF-46FC-414D-BD42-C8531701D822}" type="presOf" srcId="{61024248-BF14-4CB3-992D-D984F8702307}" destId="{1D08CFEC-489C-429E-B5C7-C43DE77D09BD}" srcOrd="0" destOrd="0" presId="urn:microsoft.com/office/officeart/2008/layout/NameandTitleOrganizationalChart"/>
+    <dgm:cxn modelId="{929721A1-7EDC-4949-8EDA-B458784A09D0}" type="presOf" srcId="{BA19D309-EBC4-437E-BF7B-0CC6B0B2CFEB}" destId="{1095A25D-A7D3-4D74-8A4C-988827CD7A08}" srcOrd="0" destOrd="0" presId="urn:microsoft.com/office/officeart/2008/layout/NameandTitleOrganizationalChart"/>
+    <dgm:cxn modelId="{4B992AE7-EDF8-44DF-B1AD-19936C14BF97}" srcId="{AAC51C4B-0887-4EAB-AFA6-5E1639F0180B}" destId="{DA7AA13C-3C82-4291-9454-29FCBB04CA68}" srcOrd="0" destOrd="0" parTransId="{C3A847CF-25FB-44D2-8C05-340859574390}" sibTransId="{84396B10-FC84-49E5-A3FE-00F1D2AA00F2}"/>
     <dgm:cxn modelId="{74100892-8A8E-4F86-BF09-56FF1EF31C55}" type="presOf" srcId="{EE589686-0AEE-4FEC-90E0-42A85C614504}" destId="{9E6D3F4A-E33D-46AA-81C0-82D64B6E19CB}" srcOrd="1" destOrd="0" presId="urn:microsoft.com/office/officeart/2008/layout/NameandTitleOrganizationalChart"/>
+    <dgm:cxn modelId="{5F80B5D3-7843-4D8A-90FB-648F79B69113}" srcId="{AAC51C4B-0887-4EAB-AFA6-5E1639F0180B}" destId="{9FA62B44-0D6A-4544-913C-18B81F2925DA}" srcOrd="3" destOrd="0" parTransId="{61024248-BF14-4CB3-992D-D984F8702307}" sibTransId="{AE740AB1-1837-4813-B383-35B98BF75CAA}"/>
+    <dgm:cxn modelId="{EFCEAF2E-8B17-430D-9C91-6B1C75607552}" type="presOf" srcId="{AE740AB1-1837-4813-B383-35B98BF75CAA}" destId="{0C50475B-3216-4848-9324-F63383EA4425}" srcOrd="0" destOrd="0" presId="urn:microsoft.com/office/officeart/2008/layout/NameandTitleOrganizationalChart"/>
+    <dgm:cxn modelId="{01812C3F-F280-4B76-8F3B-F3472E12BC3D}" type="presOf" srcId="{88B99891-9BA2-46F2-B698-C2C3A8AF5B51}" destId="{CA568CBB-9518-4E22-8223-F5EEF537CC4A}" srcOrd="0" destOrd="0" presId="urn:microsoft.com/office/officeart/2008/layout/NameandTitleOrganizationalChart"/>
+    <dgm:cxn modelId="{4FA4546C-DF9A-4277-8FEB-BE1A5709C8B8}" type="presOf" srcId="{AAC51C4B-0887-4EAB-AFA6-5E1639F0180B}" destId="{B8D2D5D9-28CB-4A62-B31E-0DF25271FC25}" srcOrd="1" destOrd="0" presId="urn:microsoft.com/office/officeart/2008/layout/NameandTitleOrganizationalChart"/>
+    <dgm:cxn modelId="{3929C245-8098-4BD5-9621-C7EB0AA9A443}" type="presOf" srcId="{E0FB66E0-33B3-41A4-9BF6-E16E51656A26}" destId="{0A01C404-02A1-4677-B70D-973332C001F2}" srcOrd="0" destOrd="0" presId="urn:microsoft.com/office/officeart/2008/layout/NameandTitleOrganizationalChart"/>
+    <dgm:cxn modelId="{6F76F910-95CC-443F-BF00-EA9038A4CDFE}" type="presOf" srcId="{91F40493-27F4-4C74-8AAE-37E11A396D43}" destId="{BA516EC6-DB45-48D6-8905-CC8D0E4CCE5B}" srcOrd="0" destOrd="0" presId="urn:microsoft.com/office/officeart/2008/layout/NameandTitleOrganizationalChart"/>
+    <dgm:cxn modelId="{6B6CD32B-C796-4E20-9036-9E69211B4FEA}" srcId="{EE589686-0AEE-4FEC-90E0-42A85C614504}" destId="{D75B104E-FEE9-4938-9BB3-67A86C294A49}" srcOrd="2" destOrd="0" parTransId="{059399E2-58CC-45C3-A34B-62318B1C12FA}" sibTransId="{E64B4258-115E-4BB1-BFB2-EBD5050CEBAC}"/>
+    <dgm:cxn modelId="{9F2C78A7-20C5-4F82-A084-788E0168DDA8}" type="presOf" srcId="{DA7AA13C-3C82-4291-9454-29FCBB04CA68}" destId="{C4A0104F-62E7-465F-BDDC-3F76350C9B1A}" srcOrd="0" destOrd="0" presId="urn:microsoft.com/office/officeart/2008/layout/NameandTitleOrganizationalChart"/>
+    <dgm:cxn modelId="{BBC0959E-9B91-4639-A37A-D132C5D975E6}" type="presOf" srcId="{D86BFD93-41C4-4F52-821A-5DF6909992B4}" destId="{ED56A925-B9E9-4FE6-801B-2A6A234B01EA}" srcOrd="0" destOrd="0" presId="urn:microsoft.com/office/officeart/2008/layout/NameandTitleOrganizationalChart"/>
+    <dgm:cxn modelId="{3A4EED77-7F20-4509-9B50-959970688314}" type="presOf" srcId="{74CC264C-3864-475D-A47C-AA842A8BF945}" destId="{6E7F9C9D-06ED-4887-9221-FAC76BBA45E7}" srcOrd="0" destOrd="0" presId="urn:microsoft.com/office/officeart/2008/layout/NameandTitleOrganizationalChart"/>
+    <dgm:cxn modelId="{F32E7410-DCC6-42AF-B32F-353603EE4535}" srcId="{AAC51C4B-0887-4EAB-AFA6-5E1639F0180B}" destId="{415F60B2-0DF2-48E8-AB82-BEF3A8619F23}" srcOrd="1" destOrd="0" parTransId="{CEAE60FA-100D-4E4A-94AD-264BC34FF021}" sibTransId="{C69128D6-2AE4-423E-90AA-D8D33CDD480E}"/>
+    <dgm:cxn modelId="{0C1BCE05-4063-49C9-8D05-7A2CAD78C732}" type="presOf" srcId="{1E2784D9-9E29-46B1-B9CD-A3C05C54593B}" destId="{22371A45-D7E2-48D3-BDBA-D2BA2A53C765}" srcOrd="0" destOrd="0" presId="urn:microsoft.com/office/officeart/2008/layout/NameandTitleOrganizationalChart"/>
+    <dgm:cxn modelId="{79908991-BF15-4BEE-899F-D89DB980DF64}" type="presOf" srcId="{BA19D309-EBC4-437E-BF7B-0CC6B0B2CFEB}" destId="{D7359B74-4B2E-4FA4-80BA-9D344056CDAC}" srcOrd="1" destOrd="0" presId="urn:microsoft.com/office/officeart/2008/layout/NameandTitleOrganizationalChart"/>
+    <dgm:cxn modelId="{E623C802-800B-4788-AD8F-45ADA427B10E}" srcId="{1E2784D9-9E29-46B1-B9CD-A3C05C54593B}" destId="{AAC51C4B-0887-4EAB-AFA6-5E1639F0180B}" srcOrd="0" destOrd="0" parTransId="{011BEE12-D095-4EBA-8B43-4F8E44C024DE}" sibTransId="{E3F90CD8-BA04-4104-87F2-C20D311E5E70}"/>
     <dgm:cxn modelId="{4FEC1E55-05B8-4F74-A57B-1DCEEFE4A628}" type="presOf" srcId="{F819521E-5DD1-4C12-BEEA-BFCC9C05B796}" destId="{BB49634F-6DB0-4C14-A358-EAB4ED8A1DDD}" srcOrd="0" destOrd="0" presId="urn:microsoft.com/office/officeart/2008/layout/NameandTitleOrganizationalChart"/>
+    <dgm:cxn modelId="{4AEA9DBA-96B8-4E45-898E-48E24E668B7E}" type="presOf" srcId="{E0FB66E0-33B3-41A4-9BF6-E16E51656A26}" destId="{419F8C5F-028E-45B5-98BB-B71BE1D0BE30}" srcOrd="1" destOrd="0" presId="urn:microsoft.com/office/officeart/2008/layout/NameandTitleOrganizationalChart"/>
+    <dgm:cxn modelId="{739F6517-ADA8-4003-8918-0C2BAE6C9754}" type="presOf" srcId="{D75B104E-FEE9-4938-9BB3-67A86C294A49}" destId="{1EB60522-F764-4BA1-B7EF-740FF2FBFBAD}" srcOrd="0" destOrd="0" presId="urn:microsoft.com/office/officeart/2008/layout/NameandTitleOrganizationalChart"/>
+    <dgm:cxn modelId="{7A2734A5-CEB0-4F3F-8E00-78BA9A84D46F}" type="presOf" srcId="{1E2784D9-9E29-46B1-B9CD-A3C05C54593B}" destId="{AD514E5D-E3C4-4DB0-BC0B-64DA792EBD9D}" srcOrd="1" destOrd="0" presId="urn:microsoft.com/office/officeart/2008/layout/NameandTitleOrganizationalChart"/>
+    <dgm:cxn modelId="{23640172-2B21-413D-B7E0-03AF189E4B41}" type="presOf" srcId="{74CC264C-3864-475D-A47C-AA842A8BF945}" destId="{0700B41A-B197-4B85-9323-F3F8FEC8EE81}" srcOrd="1" destOrd="0" presId="urn:microsoft.com/office/officeart/2008/layout/NameandTitleOrganizationalChart"/>
+    <dgm:cxn modelId="{B3443A2D-FB46-460C-842B-2C99E07E34FB}" type="presOf" srcId="{D75B104E-FEE9-4938-9BB3-67A86C294A49}" destId="{6BF2C2C8-578E-488A-BB48-63A4E50D70F6}" srcOrd="1" destOrd="0" presId="urn:microsoft.com/office/officeart/2008/layout/NameandTitleOrganizationalChart"/>
+    <dgm:cxn modelId="{03BECA32-0885-492E-9070-45F2406E19AB}" type="presOf" srcId="{DA7AA13C-3C82-4291-9454-29FCBB04CA68}" destId="{E97C933E-B148-4CDA-AF1B-FAF402CE2B21}" srcOrd="1" destOrd="0" presId="urn:microsoft.com/office/officeart/2008/layout/NameandTitleOrganizationalChart"/>
+    <dgm:cxn modelId="{0FE31AE8-0FB2-4A88-9780-4D21FE68FA51}" type="presOf" srcId="{C3A847CF-25FB-44D2-8C05-340859574390}" destId="{6FE1E39E-9BFB-4389-9630-D058398DCF54}" srcOrd="0" destOrd="0" presId="urn:microsoft.com/office/officeart/2008/layout/NameandTitleOrganizationalChart"/>
+    <dgm:cxn modelId="{C599CCF6-3A31-492E-94FD-58477BD8BF66}" type="presOf" srcId="{EE589686-0AEE-4FEC-90E0-42A85C614504}" destId="{5941FFAF-A796-4351-B7F2-BEA2A996930E}" srcOrd="0" destOrd="0" presId="urn:microsoft.com/office/officeart/2008/layout/NameandTitleOrganizationalChart"/>
+    <dgm:cxn modelId="{EA321EE9-80C1-4E70-9344-E20D13C096A5}" type="presOf" srcId="{059399E2-58CC-45C3-A34B-62318B1C12FA}" destId="{5E7B65F4-92C5-4201-803D-D7B1487A5BFA}" srcOrd="0" destOrd="0" presId="urn:microsoft.com/office/officeart/2008/layout/NameandTitleOrganizationalChart"/>
+    <dgm:cxn modelId="{05A52B50-397E-4E02-82BC-56DD8F8E2E98}" type="presOf" srcId="{011BEE12-D095-4EBA-8B43-4F8E44C024DE}" destId="{BA9A97A3-465C-4C5E-9258-10462B936FBE}" srcOrd="0" destOrd="0" presId="urn:microsoft.com/office/officeart/2008/layout/NameandTitleOrganizationalChart"/>
+    <dgm:cxn modelId="{409190EA-C1B6-4867-BB40-0B2975AEC1FC}" type="presOf" srcId="{C69128D6-2AE4-423E-90AA-D8D33CDD480E}" destId="{A6982916-4F99-4BAC-8E04-AA593F51FCC3}" srcOrd="0" destOrd="0" presId="urn:microsoft.com/office/officeart/2008/layout/NameandTitleOrganizationalChart"/>
+    <dgm:cxn modelId="{647F3A54-5A08-47C4-B9DD-4F64EEF86DE1}" type="presOf" srcId="{84396B10-FC84-49E5-A3FE-00F1D2AA00F2}" destId="{03E70BCA-CF23-4213-AC42-68BCBB7F6E48}" srcOrd="0" destOrd="0" presId="urn:microsoft.com/office/officeart/2008/layout/NameandTitleOrganizationalChart"/>
+    <dgm:cxn modelId="{AF9E9263-B9FD-4121-A57A-A6086A164BA3}" srcId="{1E2784D9-9E29-46B1-B9CD-A3C05C54593B}" destId="{EE589686-0AEE-4FEC-90E0-42A85C614504}" srcOrd="1" destOrd="0" parTransId="{F819521E-5DD1-4C12-BEEA-BFCC9C05B796}" sibTransId="{50802B5D-57EA-4DB1-AC95-0A321245592F}"/>
+    <dgm:cxn modelId="{4B96746C-59A7-4A82-AC67-1CB1F089C317}" type="presOf" srcId="{9FA62B44-0D6A-4544-913C-18B81F2925DA}" destId="{EA505C1F-441F-4AD9-A21A-01E93BB0DAD6}" srcOrd="0" destOrd="0" presId="urn:microsoft.com/office/officeart/2008/layout/NameandTitleOrganizationalChart"/>
+    <dgm:cxn modelId="{9828638F-EBF0-4CBF-9203-5DB24042E560}" type="presOf" srcId="{415F60B2-0DF2-48E8-AB82-BEF3A8619F23}" destId="{B7AF82D3-6344-4500-B779-F4AD37423617}" srcOrd="1" destOrd="0" presId="urn:microsoft.com/office/officeart/2008/layout/NameandTitleOrganizationalChart"/>
+    <dgm:cxn modelId="{6E9962EE-775B-464D-8070-8F1FD8B6E356}" type="presOf" srcId="{9FA62B44-0D6A-4544-913C-18B81F2925DA}" destId="{464D352C-2622-4765-AFFB-F6CEF0B73C81}" srcOrd="1" destOrd="0" presId="urn:microsoft.com/office/officeart/2008/layout/NameandTitleOrganizationalChart"/>
+    <dgm:cxn modelId="{E6ECDBDB-5283-45B5-8C86-A802AEC3225A}" type="presOf" srcId="{E64B4258-115E-4BB1-BFB2-EBD5050CEBAC}" destId="{030EF7C8-D002-4622-A2FC-74ED9A0288E8}" srcOrd="0" destOrd="0" presId="urn:microsoft.com/office/officeart/2008/layout/NameandTitleOrganizationalChart"/>
+    <dgm:cxn modelId="{22946BA8-7F9D-4BCB-B585-D4D2BCEDC8BF}" type="presOf" srcId="{AAC51C4B-0887-4EAB-AFA6-5E1639F0180B}" destId="{D9896E67-1AF2-4AE7-80B9-81F28C497663}" srcOrd="0" destOrd="0" presId="urn:microsoft.com/office/officeart/2008/layout/NameandTitleOrganizationalChart"/>
+    <dgm:cxn modelId="{05758613-8B8A-42B1-A280-440EA2685BD6}" type="presOf" srcId="{50802B5D-57EA-4DB1-AC95-0A321245592F}" destId="{7411D461-ABDA-4212-9CFE-F2838AFFE510}" srcOrd="0" destOrd="0" presId="urn:microsoft.com/office/officeart/2008/layout/NameandTitleOrganizationalChart"/>
+    <dgm:cxn modelId="{A7D68B0F-A5EA-4F3E-B30A-B41FDD4A2B4C}" srcId="{AAC51C4B-0887-4EAB-AFA6-5E1639F0180B}" destId="{E0FB66E0-33B3-41A4-9BF6-E16E51656A26}" srcOrd="2" destOrd="0" parTransId="{88B99891-9BA2-46F2-B698-C2C3A8AF5B51}" sibTransId="{D86BFD93-41C4-4F52-821A-5DF6909992B4}"/>
     <dgm:cxn modelId="{AB82C9EA-E27B-406A-A733-98E610369A1B}" type="presOf" srcId="{415F60B2-0DF2-48E8-AB82-BEF3A8619F23}" destId="{DED529AB-3E1F-449D-8BE7-9BDD25E86F0A}" srcOrd="0" destOrd="0" presId="urn:microsoft.com/office/officeart/2008/layout/NameandTitleOrganizationalChart"/>
-    <dgm:cxn modelId="{E6ECDBDB-5283-45B5-8C86-A802AEC3225A}" type="presOf" srcId="{E64B4258-115E-4BB1-BFB2-EBD5050CEBAC}" destId="{030EF7C8-D002-4622-A2FC-74ED9A0288E8}" srcOrd="0" destOrd="0" presId="urn:microsoft.com/office/officeart/2008/layout/NameandTitleOrganizationalChart"/>
-    <dgm:cxn modelId="{3A4EED77-7F20-4509-9B50-959970688314}" type="presOf" srcId="{74CC264C-3864-475D-A47C-AA842A8BF945}" destId="{6E7F9C9D-06ED-4887-9221-FAC76BBA45E7}" srcOrd="0" destOrd="0" presId="urn:microsoft.com/office/officeart/2008/layout/NameandTitleOrganizationalChart"/>
+    <dgm:cxn modelId="{73CCC103-90A4-4058-846E-7E7F9C3D786D}" type="presOf" srcId="{C1B0F8DF-8977-4F24-ADEE-A062F5D1736A}" destId="{5129C98D-8E1A-466B-8D5D-E4988D757573}" srcOrd="0" destOrd="0" presId="urn:microsoft.com/office/officeart/2008/layout/NameandTitleOrganizationalChart"/>
+    <dgm:cxn modelId="{8AD8335D-0F18-4194-AC6B-D45C74989CEF}" srcId="{EE589686-0AEE-4FEC-90E0-42A85C614504}" destId="{74CC264C-3864-475D-A47C-AA842A8BF945}" srcOrd="0" destOrd="0" parTransId="{B37AF6E0-0509-4DD3-80B9-05BF72DB5DF3}" sibTransId="{17AA2F57-B975-4412-90F5-972E7338E938}"/>
+    <dgm:cxn modelId="{9B0DE32A-D822-4429-889A-C9E4A9127D05}" srcId="{EE589686-0AEE-4FEC-90E0-42A85C614504}" destId="{BA19D309-EBC4-437E-BF7B-0CC6B0B2CFEB}" srcOrd="1" destOrd="0" parTransId="{CDC9A5B6-6288-41D8-A687-BD7DFDB711FD}" sibTransId="{C1B0F8DF-8977-4F24-ADEE-A062F5D1736A}"/>
+    <dgm:cxn modelId="{2D72374F-4786-4CD3-9D21-06FD4DA935B3}" type="presOf" srcId="{45787D4F-C6F1-4868-B2FC-31AC19BFA3A7}" destId="{7DF563CD-F18E-423F-A70C-E8800C027BB6}" srcOrd="0" destOrd="0" presId="urn:microsoft.com/office/officeart/2008/layout/NameandTitleOrganizationalChart"/>
+    <dgm:cxn modelId="{2B92F60B-F77C-4939-90D5-FC3CEFE50C8C}" type="presOf" srcId="{17AA2F57-B975-4412-90F5-972E7338E938}" destId="{E7DBC640-B9E3-44E6-B3B6-39BEAB4CDFDF}" srcOrd="0" destOrd="0" presId="urn:microsoft.com/office/officeart/2008/layout/NameandTitleOrganizationalChart"/>
     <dgm:cxn modelId="{00C8F7E3-CA09-4297-9CB4-BC3C5F638D33}" type="presOf" srcId="{CDC9A5B6-6288-41D8-A687-BD7DFDB711FD}" destId="{C8DDC76C-256F-4A01-895E-F828F30DBFD3}" srcOrd="0" destOrd="0" presId="urn:microsoft.com/office/officeart/2008/layout/NameandTitleOrganizationalChart"/>
-    <dgm:cxn modelId="{E9E01FDF-46FC-414D-BD42-C8531701D822}" type="presOf" srcId="{61024248-BF14-4CB3-992D-D984F8702307}" destId="{1D08CFEC-489C-429E-B5C7-C43DE77D09BD}" srcOrd="0" destOrd="0" presId="urn:microsoft.com/office/officeart/2008/layout/NameandTitleOrganizationalChart"/>
-    <dgm:cxn modelId="{6F76F910-95CC-443F-BF00-EA9038A4CDFE}" type="presOf" srcId="{91F40493-27F4-4C74-8AAE-37E11A396D43}" destId="{BA516EC6-DB45-48D6-8905-CC8D0E4CCE5B}" srcOrd="0" destOrd="0" presId="urn:microsoft.com/office/officeart/2008/layout/NameandTitleOrganizationalChart"/>
-    <dgm:cxn modelId="{C599CCF6-3A31-492E-94FD-58477BD8BF66}" type="presOf" srcId="{EE589686-0AEE-4FEC-90E0-42A85C614504}" destId="{5941FFAF-A796-4351-B7F2-BEA2A996930E}" srcOrd="0" destOrd="0" presId="urn:microsoft.com/office/officeart/2008/layout/NameandTitleOrganizationalChart"/>
-    <dgm:cxn modelId="{BBC0959E-9B91-4639-A37A-D132C5D975E6}" type="presOf" srcId="{D86BFD93-41C4-4F52-821A-5DF6909992B4}" destId="{ED56A925-B9E9-4FE6-801B-2A6A234B01EA}" srcOrd="0" destOrd="0" presId="urn:microsoft.com/office/officeart/2008/layout/NameandTitleOrganizationalChart"/>
-    <dgm:cxn modelId="{6E9962EE-775B-464D-8070-8F1FD8B6E356}" type="presOf" srcId="{9FA62B44-0D6A-4544-913C-18B81F2925DA}" destId="{464D352C-2622-4765-AFFB-F6CEF0B73C81}" srcOrd="1" destOrd="0" presId="urn:microsoft.com/office/officeart/2008/layout/NameandTitleOrganizationalChart"/>
-    <dgm:cxn modelId="{3929C245-8098-4BD5-9621-C7EB0AA9A443}" type="presOf" srcId="{E0FB66E0-33B3-41A4-9BF6-E16E51656A26}" destId="{0A01C404-02A1-4677-B70D-973332C001F2}" srcOrd="0" destOrd="0" presId="urn:microsoft.com/office/officeart/2008/layout/NameandTitleOrganizationalChart"/>
-    <dgm:cxn modelId="{9F0236C6-8A9C-421C-BB7E-B21E5D5CD072}" type="presOf" srcId="{CEAE60FA-100D-4E4A-94AD-264BC34FF021}" destId="{FA959E8B-744F-4C9C-9617-F905440A8953}" srcOrd="0" destOrd="0" presId="urn:microsoft.com/office/officeart/2008/layout/NameandTitleOrganizationalChart"/>
-    <dgm:cxn modelId="{F32E7410-DCC6-42AF-B32F-353603EE4535}" srcId="{AAC51C4B-0887-4EAB-AFA6-5E1639F0180B}" destId="{415F60B2-0DF2-48E8-AB82-BEF3A8619F23}" srcOrd="1" destOrd="0" parTransId="{CEAE60FA-100D-4E4A-94AD-264BC34FF021}" sibTransId="{C69128D6-2AE4-423E-90AA-D8D33CDD480E}"/>
-    <dgm:cxn modelId="{0FE31AE8-0FB2-4A88-9780-4D21FE68FA51}" type="presOf" srcId="{C3A847CF-25FB-44D2-8C05-340859574390}" destId="{6FE1E39E-9BFB-4389-9630-D058398DCF54}" srcOrd="0" destOrd="0" presId="urn:microsoft.com/office/officeart/2008/layout/NameandTitleOrganizationalChart"/>
-    <dgm:cxn modelId="{9B0DE32A-D822-4429-889A-C9E4A9127D05}" srcId="{EE589686-0AEE-4FEC-90E0-42A85C614504}" destId="{BA19D309-EBC4-437E-BF7B-0CC6B0B2CFEB}" srcOrd="1" destOrd="0" parTransId="{CDC9A5B6-6288-41D8-A687-BD7DFDB711FD}" sibTransId="{C1B0F8DF-8977-4F24-ADEE-A062F5D1736A}"/>
-    <dgm:cxn modelId="{929721A1-7EDC-4949-8EDA-B458784A09D0}" type="presOf" srcId="{BA19D309-EBC4-437E-BF7B-0CC6B0B2CFEB}" destId="{1095A25D-A7D3-4D74-8A4C-988827CD7A08}" srcOrd="0" destOrd="0" presId="urn:microsoft.com/office/officeart/2008/layout/NameandTitleOrganizationalChart"/>
-    <dgm:cxn modelId="{647F3A54-5A08-47C4-B9DD-4F64EEF86DE1}" type="presOf" srcId="{84396B10-FC84-49E5-A3FE-00F1D2AA00F2}" destId="{03E70BCA-CF23-4213-AC42-68BCBB7F6E48}" srcOrd="0" destOrd="0" presId="urn:microsoft.com/office/officeart/2008/layout/NameandTitleOrganizationalChart"/>
-    <dgm:cxn modelId="{73CCC103-90A4-4058-846E-7E7F9C3D786D}" type="presOf" srcId="{C1B0F8DF-8977-4F24-ADEE-A062F5D1736A}" destId="{5129C98D-8E1A-466B-8D5D-E4988D757573}" srcOrd="0" destOrd="0" presId="urn:microsoft.com/office/officeart/2008/layout/NameandTitleOrganizationalChart"/>
-    <dgm:cxn modelId="{739F6517-ADA8-4003-8918-0C2BAE6C9754}" type="presOf" srcId="{D75B104E-FEE9-4938-9BB3-67A86C294A49}" destId="{1EB60522-F764-4BA1-B7EF-740FF2FBFBAD}" srcOrd="0" destOrd="0" presId="urn:microsoft.com/office/officeart/2008/layout/NameandTitleOrganizationalChart"/>
-    <dgm:cxn modelId="{05758613-8B8A-42B1-A280-440EA2685BD6}" type="presOf" srcId="{50802B5D-57EA-4DB1-AC95-0A321245592F}" destId="{7411D461-ABDA-4212-9CFE-F2838AFFE510}" srcOrd="0" destOrd="0" presId="urn:microsoft.com/office/officeart/2008/layout/NameandTitleOrganizationalChart"/>
-    <dgm:cxn modelId="{FF7EE5DF-7151-4A93-B717-8BBAC568631D}" srcId="{45787D4F-C6F1-4868-B2FC-31AC19BFA3A7}" destId="{1E2784D9-9E29-46B1-B9CD-A3C05C54593B}" srcOrd="0" destOrd="0" parTransId="{C80E7303-3294-4AEF-8D7A-1520EFDE9CBE}" sibTransId="{91F40493-27F4-4C74-8AAE-37E11A396D43}"/>
-    <dgm:cxn modelId="{4FA4546C-DF9A-4277-8FEB-BE1A5709C8B8}" type="presOf" srcId="{AAC51C4B-0887-4EAB-AFA6-5E1639F0180B}" destId="{B8D2D5D9-28CB-4A62-B31E-0DF25271FC25}" srcOrd="1" destOrd="0" presId="urn:microsoft.com/office/officeart/2008/layout/NameandTitleOrganizationalChart"/>
-    <dgm:cxn modelId="{0C1BCE05-4063-49C9-8D05-7A2CAD78C732}" type="presOf" srcId="{1E2784D9-9E29-46B1-B9CD-A3C05C54593B}" destId="{22371A45-D7E2-48D3-BDBA-D2BA2A53C765}" srcOrd="0" destOrd="0" presId="urn:microsoft.com/office/officeart/2008/layout/NameandTitleOrganizationalChart"/>
-    <dgm:cxn modelId="{05A52B50-397E-4E02-82BC-56DD8F8E2E98}" type="presOf" srcId="{011BEE12-D095-4EBA-8B43-4F8E44C024DE}" destId="{BA9A97A3-465C-4C5E-9258-10462B936FBE}" srcOrd="0" destOrd="0" presId="urn:microsoft.com/office/officeart/2008/layout/NameandTitleOrganizationalChart"/>
-    <dgm:cxn modelId="{79908991-BF15-4BEE-899F-D89DB980DF64}" type="presOf" srcId="{BA19D309-EBC4-437E-BF7B-0CC6B0B2CFEB}" destId="{D7359B74-4B2E-4FA4-80BA-9D344056CDAC}" srcOrd="1" destOrd="0" presId="urn:microsoft.com/office/officeart/2008/layout/NameandTitleOrganizationalChart"/>
-    <dgm:cxn modelId="{B3443A2D-FB46-460C-842B-2C99E07E34FB}" type="presOf" srcId="{D75B104E-FEE9-4938-9BB3-67A86C294A49}" destId="{6BF2C2C8-578E-488A-BB48-63A4E50D70F6}" srcOrd="1" destOrd="0" presId="urn:microsoft.com/office/officeart/2008/layout/NameandTitleOrganizationalChart"/>
-    <dgm:cxn modelId="{23640172-2B21-413D-B7E0-03AF189E4B41}" type="presOf" srcId="{74CC264C-3864-475D-A47C-AA842A8BF945}" destId="{0700B41A-B197-4B85-9323-F3F8FEC8EE81}" srcOrd="1" destOrd="0" presId="urn:microsoft.com/office/officeart/2008/layout/NameandTitleOrganizationalChart"/>
+    <dgm:cxn modelId="{0974D867-9C98-47F7-BFF2-5FE7866F5064}" type="presOf" srcId="{E3F90CD8-BA04-4104-87F2-C20D311E5E70}" destId="{441B4ED7-F270-493C-8D9B-74B5E2823F0F}" srcOrd="0" destOrd="0" presId="urn:microsoft.com/office/officeart/2008/layout/NameandTitleOrganizationalChart"/>
     <dgm:cxn modelId="{A04E2F6C-3DA1-4C8F-A062-0BF0CE1DB3AF}" type="presOf" srcId="{B37AF6E0-0509-4DD3-80B9-05BF72DB5DF3}" destId="{FF0A65A8-FA0D-4982-B1EC-B5AD458F5A2F}" srcOrd="0" destOrd="0" presId="urn:microsoft.com/office/officeart/2008/layout/NameandTitleOrganizationalChart"/>
-    <dgm:cxn modelId="{01812C3F-F280-4B76-8F3B-F3472E12BC3D}" type="presOf" srcId="{88B99891-9BA2-46F2-B698-C2C3A8AF5B51}" destId="{CA568CBB-9518-4E22-8223-F5EEF537CC4A}" srcOrd="0" destOrd="0" presId="urn:microsoft.com/office/officeart/2008/layout/NameandTitleOrganizationalChart"/>
-    <dgm:cxn modelId="{A7D68B0F-A5EA-4F3E-B30A-B41FDD4A2B4C}" srcId="{AAC51C4B-0887-4EAB-AFA6-5E1639F0180B}" destId="{E0FB66E0-33B3-41A4-9BF6-E16E51656A26}" srcOrd="2" destOrd="0" parTransId="{88B99891-9BA2-46F2-B698-C2C3A8AF5B51}" sibTransId="{D86BFD93-41C4-4F52-821A-5DF6909992B4}"/>
-    <dgm:cxn modelId="{4AEA9DBA-96B8-4E45-898E-48E24E668B7E}" type="presOf" srcId="{E0FB66E0-33B3-41A4-9BF6-E16E51656A26}" destId="{419F8C5F-028E-45B5-98BB-B71BE1D0BE30}" srcOrd="1" destOrd="0" presId="urn:microsoft.com/office/officeart/2008/layout/NameandTitleOrganizationalChart"/>
-    <dgm:cxn modelId="{7A2734A5-CEB0-4F3F-8E00-78BA9A84D46F}" type="presOf" srcId="{1E2784D9-9E29-46B1-B9CD-A3C05C54593B}" destId="{AD514E5D-E3C4-4DB0-BC0B-64DA792EBD9D}" srcOrd="1" destOrd="0" presId="urn:microsoft.com/office/officeart/2008/layout/NameandTitleOrganizationalChart"/>
-    <dgm:cxn modelId="{EFCEAF2E-8B17-430D-9C91-6B1C75607552}" type="presOf" srcId="{AE740AB1-1837-4813-B383-35B98BF75CAA}" destId="{0C50475B-3216-4848-9324-F63383EA4425}" srcOrd="0" destOrd="0" presId="urn:microsoft.com/office/officeart/2008/layout/NameandTitleOrganizationalChart"/>
-    <dgm:cxn modelId="{9F2C78A7-20C5-4F82-A084-788E0168DDA8}" type="presOf" srcId="{DA7AA13C-3C82-4291-9454-29FCBB04CA68}" destId="{C4A0104F-62E7-465F-BDDC-3F76350C9B1A}" srcOrd="0" destOrd="0" presId="urn:microsoft.com/office/officeart/2008/layout/NameandTitleOrganizationalChart"/>
-    <dgm:cxn modelId="{4B96746C-59A7-4A82-AC67-1CB1F089C317}" type="presOf" srcId="{9FA62B44-0D6A-4544-913C-18B81F2925DA}" destId="{EA505C1F-441F-4AD9-A21A-01E93BB0DAD6}" srcOrd="0" destOrd="0" presId="urn:microsoft.com/office/officeart/2008/layout/NameandTitleOrganizationalChart"/>
-    <dgm:cxn modelId="{409190EA-C1B6-4867-BB40-0B2975AEC1FC}" type="presOf" srcId="{C69128D6-2AE4-423E-90AA-D8D33CDD480E}" destId="{A6982916-4F99-4BAC-8E04-AA593F51FCC3}" srcOrd="0" destOrd="0" presId="urn:microsoft.com/office/officeart/2008/layout/NameandTitleOrganizationalChart"/>
-    <dgm:cxn modelId="{2B92F60B-F77C-4939-90D5-FC3CEFE50C8C}" type="presOf" srcId="{17AA2F57-B975-4412-90F5-972E7338E938}" destId="{E7DBC640-B9E3-44E6-B3B6-39BEAB4CDFDF}" srcOrd="0" destOrd="0" presId="urn:microsoft.com/office/officeart/2008/layout/NameandTitleOrganizationalChart"/>
-    <dgm:cxn modelId="{9828638F-EBF0-4CBF-9203-5DB24042E560}" type="presOf" srcId="{415F60B2-0DF2-48E8-AB82-BEF3A8619F23}" destId="{B7AF82D3-6344-4500-B779-F4AD37423617}" srcOrd="1" destOrd="0" presId="urn:microsoft.com/office/officeart/2008/layout/NameandTitleOrganizationalChart"/>
-    <dgm:cxn modelId="{5F80B5D3-7843-4D8A-90FB-648F79B69113}" srcId="{AAC51C4B-0887-4EAB-AFA6-5E1639F0180B}" destId="{9FA62B44-0D6A-4544-913C-18B81F2925DA}" srcOrd="3" destOrd="0" parTransId="{61024248-BF14-4CB3-992D-D984F8702307}" sibTransId="{AE740AB1-1837-4813-B383-35B98BF75CAA}"/>
-    <dgm:cxn modelId="{EA321EE9-80C1-4E70-9344-E20D13C096A5}" type="presOf" srcId="{059399E2-58CC-45C3-A34B-62318B1C12FA}" destId="{5E7B65F4-92C5-4201-803D-D7B1487A5BFA}" srcOrd="0" destOrd="0" presId="urn:microsoft.com/office/officeart/2008/layout/NameandTitleOrganizationalChart"/>
-    <dgm:cxn modelId="{6B6CD32B-C796-4E20-9036-9E69211B4FEA}" srcId="{EE589686-0AEE-4FEC-90E0-42A85C614504}" destId="{D75B104E-FEE9-4938-9BB3-67A86C294A49}" srcOrd="2" destOrd="0" parTransId="{059399E2-58CC-45C3-A34B-62318B1C12FA}" sibTransId="{E64B4258-115E-4BB1-BFB2-EBD5050CEBAC}"/>
-    <dgm:cxn modelId="{03BECA32-0885-492E-9070-45F2406E19AB}" type="presOf" srcId="{DA7AA13C-3C82-4291-9454-29FCBB04CA68}" destId="{E97C933E-B148-4CDA-AF1B-FAF402CE2B21}" srcOrd="1" destOrd="0" presId="urn:microsoft.com/office/officeart/2008/layout/NameandTitleOrganizationalChart"/>
-    <dgm:cxn modelId="{AF9E9263-B9FD-4121-A57A-A6086A164BA3}" srcId="{1E2784D9-9E29-46B1-B9CD-A3C05C54593B}" destId="{EE589686-0AEE-4FEC-90E0-42A85C614504}" srcOrd="1" destOrd="0" parTransId="{F819521E-5DD1-4C12-BEEA-BFCC9C05B796}" sibTransId="{50802B5D-57EA-4DB1-AC95-0A321245592F}"/>
-    <dgm:cxn modelId="{22946BA8-7F9D-4BCB-B585-D4D2BCEDC8BF}" type="presOf" srcId="{AAC51C4B-0887-4EAB-AFA6-5E1639F0180B}" destId="{D9896E67-1AF2-4AE7-80B9-81F28C497663}" srcOrd="0" destOrd="0" presId="urn:microsoft.com/office/officeart/2008/layout/NameandTitleOrganizationalChart"/>
-    <dgm:cxn modelId="{0974D867-9C98-47F7-BFF2-5FE7866F5064}" type="presOf" srcId="{E3F90CD8-BA04-4104-87F2-C20D311E5E70}" destId="{441B4ED7-F270-493C-8D9B-74B5E2823F0F}" srcOrd="0" destOrd="0" presId="urn:microsoft.com/office/officeart/2008/layout/NameandTitleOrganizationalChart"/>
-    <dgm:cxn modelId="{4B992AE7-EDF8-44DF-B1AD-19936C14BF97}" srcId="{AAC51C4B-0887-4EAB-AFA6-5E1639F0180B}" destId="{DA7AA13C-3C82-4291-9454-29FCBB04CA68}" srcOrd="0" destOrd="0" parTransId="{C3A847CF-25FB-44D2-8C05-340859574390}" sibTransId="{84396B10-FC84-49E5-A3FE-00F1D2AA00F2}"/>
-    <dgm:cxn modelId="{2D72374F-4786-4CD3-9D21-06FD4DA935B3}" type="presOf" srcId="{45787D4F-C6F1-4868-B2FC-31AC19BFA3A7}" destId="{7DF563CD-F18E-423F-A70C-E8800C027BB6}" srcOrd="0" destOrd="0" presId="urn:microsoft.com/office/officeart/2008/layout/NameandTitleOrganizationalChart"/>
-    <dgm:cxn modelId="{8AD8335D-0F18-4194-AC6B-D45C74989CEF}" srcId="{EE589686-0AEE-4FEC-90E0-42A85C614504}" destId="{74CC264C-3864-475D-A47C-AA842A8BF945}" srcOrd="0" destOrd="0" parTransId="{B37AF6E0-0509-4DD3-80B9-05BF72DB5DF3}" sibTransId="{17AA2F57-B975-4412-90F5-972E7338E938}"/>
-    <dgm:cxn modelId="{E623C802-800B-4788-AD8F-45ADA427B10E}" srcId="{1E2784D9-9E29-46B1-B9CD-A3C05C54593B}" destId="{AAC51C4B-0887-4EAB-AFA6-5E1639F0180B}" srcOrd="0" destOrd="0" parTransId="{011BEE12-D095-4EBA-8B43-4F8E44C024DE}" sibTransId="{E3F90CD8-BA04-4104-87F2-C20D311E5E70}"/>
     <dgm:cxn modelId="{0CCE257F-9084-435B-98A9-B9C1033CD6B2}" type="presParOf" srcId="{7DF563CD-F18E-423F-A70C-E8800C027BB6}" destId="{D957385E-43C8-4D96-A5D7-E599824C0A86}" srcOrd="0" destOrd="0" presId="urn:microsoft.com/office/officeart/2008/layout/NameandTitleOrganizationalChart"/>
     <dgm:cxn modelId="{A4753B29-39DD-4FFD-AC2E-E768E3AF155B}" type="presParOf" srcId="{D957385E-43C8-4D96-A5D7-E599824C0A86}" destId="{05AE227A-3D9B-4C6B-A894-E70DF55D4C17}" srcOrd="0" destOrd="0" presId="urn:microsoft.com/office/officeart/2008/layout/NameandTitleOrganizationalChart"/>
     <dgm:cxn modelId="{BB69D1F9-31B8-43E5-80C8-F308CD656E45}" type="presParOf" srcId="{05AE227A-3D9B-4C6B-A894-E70DF55D4C17}" destId="{22371A45-D7E2-48D3-BDBA-D2BA2A53C765}" srcOrd="0" destOrd="0" presId="urn:microsoft.com/office/officeart/2008/layout/NameandTitleOrganizationalChart"/>
@@ -2692,10 +6312,6 @@
           <a:r>
             <a:rPr lang="en-US" sz="1400" kern="1200" dirty="0" err="1" smtClean="0"/>
             <a:t>Coref</a:t>
-          </a:r>
-          <a:r>
-            <a:rPr lang="en-US" sz="1400" kern="1200" dirty="0" smtClean="0"/>
-            <a:t> Sol</a:t>
           </a:r>
           <a:endParaRPr lang="en-US" sz="1400" kern="1200" dirty="0"/>
         </a:p>
@@ -11324,7 +14940,7 @@
           <a:graphicData uri="http://schemas.openxmlformats.org/presentationml/2006/ole">
             <mc:AlternateContent xmlns:mc="http://schemas.openxmlformats.org/markup-compatibility/2006">
               <mc:Choice xmlns:v="urn:schemas-microsoft-com:vml" Requires="v">
-                <p:oleObj spid="_x0000_s2088" r:id="rId4" imgW="5505405" imgH="3343454" progId="Visio.Drawing.15">
+                <p:oleObj spid="_x0000_s2103" r:id="rId4" imgW="5505405" imgH="3343454" progId="Visio.Drawing.15">
                   <p:embed/>
                 </p:oleObj>
               </mc:Choice>
@@ -11812,20 +15428,20 @@
           <p:nvPr>
             <p:extLst>
               <p:ext uri="{D42A27DB-BD31-4B8C-83A1-F6EECF244321}">
-                <p14:modId xmlns:p14="http://schemas.microsoft.com/office/powerpoint/2010/main" val="3080862363"/>
+                <p14:modId xmlns:p14="http://schemas.microsoft.com/office/powerpoint/2010/main" val="4260387086"/>
               </p:ext>
             </p:extLst>
           </p:nvPr>
         </p:nvGraphicFramePr>
         <p:xfrm>
-          <a:off x="105410" y="964316"/>
+          <a:off x="105410" y="1066800"/>
           <a:ext cx="9023350" cy="4800600"/>
         </p:xfrm>
         <a:graphic>
           <a:graphicData uri="http://schemas.openxmlformats.org/presentationml/2006/ole">
             <mc:AlternateContent xmlns:mc="http://schemas.openxmlformats.org/markup-compatibility/2006">
               <mc:Choice xmlns:v="urn:schemas-microsoft-com:vml" Requires="v">
-                <p:oleObj spid="_x0000_s3109" r:id="rId4" imgW="6629579" imgH="3514785" progId="Visio.Drawing.15">
+                <p:oleObj spid="_x0000_s3124" r:id="rId4" imgW="6629579" imgH="3514785" progId="Visio.Drawing.15">
                   <p:embed/>
                 </p:oleObj>
               </mc:Choice>
@@ -11855,7 +15471,7 @@
                     </p:blipFill>
                     <p:spPr bwMode="auto">
                       <a:xfrm>
-                        <a:off x="105410" y="964316"/>
+                        <a:off x="105410" y="1066800"/>
                         <a:ext cx="9023350" cy="4800600"/>
                       </a:xfrm>
                       <a:prstGeom prst="rect">
@@ -11870,72 +15486,6 @@
           </a:graphicData>
         </a:graphic>
       </p:graphicFrame>
-      <p:sp>
-        <p:nvSpPr>
-          <p:cNvPr id="11" name="TextBox 10"/>
-          <p:cNvSpPr txBox="1"/>
-          <p:nvPr/>
-        </p:nvSpPr>
-        <p:spPr>
-          <a:xfrm>
-            <a:off x="3281430" y="5871859"/>
-            <a:ext cx="2671309" cy="369332"/>
-          </a:xfrm>
-          <a:prstGeom prst="rect">
-            <a:avLst/>
-          </a:prstGeom>
-          <a:noFill/>
-        </p:spPr>
-        <p:txBody>
-          <a:bodyPr wrap="none" rtlCol="0">
-            <a:spAutoFit/>
-          </a:bodyPr>
-          <a:lstStyle/>
-          <a:p>
-            <a:r>
-              <a:rPr lang="en-US" dirty="0" smtClean="0"/>
-              <a:t>Chi </a:t>
-            </a:r>
-            <a:r>
-              <a:rPr lang="en-US" dirty="0" err="1" smtClean="0"/>
-              <a:t>tiết</a:t>
-            </a:r>
-            <a:r>
-              <a:rPr lang="en-US" dirty="0" smtClean="0"/>
-              <a:t> </a:t>
-            </a:r>
-            <a:r>
-              <a:rPr lang="en-US" dirty="0" err="1" smtClean="0"/>
-              <a:t>hệ</a:t>
-            </a:r>
-            <a:r>
-              <a:rPr lang="en-US" dirty="0" smtClean="0"/>
-              <a:t> </a:t>
-            </a:r>
-            <a:r>
-              <a:rPr lang="en-US" dirty="0" err="1" smtClean="0"/>
-              <a:t>thống</a:t>
-            </a:r>
-            <a:r>
-              <a:rPr lang="en-US" dirty="0" smtClean="0"/>
-              <a:t> </a:t>
-            </a:r>
-            <a:r>
-              <a:rPr lang="en-US" dirty="0" err="1" smtClean="0"/>
-              <a:t>phân</a:t>
-            </a:r>
-            <a:r>
-              <a:rPr lang="en-US" dirty="0" smtClean="0"/>
-              <a:t> </a:t>
-            </a:r>
-            <a:r>
-              <a:rPr lang="en-US" dirty="0" err="1" smtClean="0"/>
-              <a:t>loại</a:t>
-            </a:r>
-            <a:endParaRPr lang="en-US" dirty="0"/>
-          </a:p>
-        </p:txBody>
-      </p:sp>
     </p:spTree>
     <p:extLst>
       <p:ext uri="{BB962C8B-B14F-4D97-AF65-F5344CB8AC3E}">
@@ -12134,7 +15684,7 @@
           <p:nvPr>
             <p:extLst>
               <p:ext uri="{D42A27DB-BD31-4B8C-83A1-F6EECF244321}">
-                <p14:modId xmlns:p14="http://schemas.microsoft.com/office/powerpoint/2010/main" val="1135295266"/>
+                <p14:modId xmlns:p14="http://schemas.microsoft.com/office/powerpoint/2010/main" val="3530426746"/>
               </p:ext>
             </p:extLst>
           </p:nvPr>
@@ -12340,146 +15890,111 @@
           </a:p>
         </p:txBody>
       </p:sp>
+      <p:graphicFrame>
+        <p:nvGraphicFramePr>
+          <p:cNvPr id="16" name="Chart 15"/>
+          <p:cNvGraphicFramePr/>
+          <p:nvPr>
+            <p:extLst>
+              <p:ext uri="{D42A27DB-BD31-4B8C-83A1-F6EECF244321}">
+                <p14:modId xmlns:p14="http://schemas.microsoft.com/office/powerpoint/2010/main" val="1516371001"/>
+              </p:ext>
+            </p:extLst>
+          </p:nvPr>
+        </p:nvGraphicFramePr>
+        <p:xfrm>
+          <a:off x="-731520" y="2400299"/>
+          <a:ext cx="3657600" cy="2438400"/>
+        </p:xfrm>
+        <a:graphic>
+          <a:graphicData uri="http://schemas.openxmlformats.org/drawingml/2006/chart">
+            <c:chart xmlns:c="http://schemas.openxmlformats.org/drawingml/2006/chart" xmlns:r="http://schemas.openxmlformats.org/officeDocument/2006/relationships" r:id="rId3"/>
+          </a:graphicData>
+        </a:graphic>
+      </p:graphicFrame>
+      <p:graphicFrame>
+        <p:nvGraphicFramePr>
+          <p:cNvPr id="17" name="Chart 16"/>
+          <p:cNvGraphicFramePr/>
+          <p:nvPr>
+            <p:extLst>
+              <p:ext uri="{D42A27DB-BD31-4B8C-83A1-F6EECF244321}">
+                <p14:modId xmlns:p14="http://schemas.microsoft.com/office/powerpoint/2010/main" val="436919839"/>
+              </p:ext>
+            </p:extLst>
+          </p:nvPr>
+        </p:nvGraphicFramePr>
+        <p:xfrm>
+          <a:off x="2072640" y="2400299"/>
+          <a:ext cx="3657600" cy="2438400"/>
+        </p:xfrm>
+        <a:graphic>
+          <a:graphicData uri="http://schemas.openxmlformats.org/drawingml/2006/chart">
+            <c:chart xmlns:c="http://schemas.openxmlformats.org/drawingml/2006/chart" xmlns:r="http://schemas.openxmlformats.org/officeDocument/2006/relationships" r:id="rId4"/>
+          </a:graphicData>
+        </a:graphic>
+      </p:graphicFrame>
+      <p:graphicFrame>
+        <p:nvGraphicFramePr>
+          <p:cNvPr id="18" name="Chart 17"/>
+          <p:cNvGraphicFramePr/>
+          <p:nvPr>
+            <p:extLst>
+              <p:ext uri="{D42A27DB-BD31-4B8C-83A1-F6EECF244321}">
+                <p14:modId xmlns:p14="http://schemas.microsoft.com/office/powerpoint/2010/main" val="3846755364"/>
+              </p:ext>
+            </p:extLst>
+          </p:nvPr>
+        </p:nvGraphicFramePr>
+        <p:xfrm>
+          <a:off x="5528280" y="2400299"/>
+          <a:ext cx="3657600" cy="2438400"/>
+        </p:xfrm>
+        <a:graphic>
+          <a:graphicData uri="http://schemas.openxmlformats.org/drawingml/2006/chart">
+            <c:chart xmlns:c="http://schemas.openxmlformats.org/drawingml/2006/chart" xmlns:r="http://schemas.openxmlformats.org/officeDocument/2006/relationships" r:id="rId5"/>
+          </a:graphicData>
+        </a:graphic>
+      </p:graphicFrame>
       <p:sp>
         <p:nvSpPr>
-          <p:cNvPr id="8" name="Rectangle 8"/>
-          <p:cNvSpPr txBox="1">
-            <a:spLocks/>
-          </p:cNvSpPr>
+          <p:cNvPr id="19" name="TextBox 18"/>
+          <p:cNvSpPr txBox="1"/>
           <p:nvPr/>
         </p:nvSpPr>
         <p:spPr>
           <a:xfrm>
-            <a:off x="685800" y="1371600"/>
-            <a:ext cx="7467600" cy="4800600"/>
+            <a:off x="3134651" y="5358139"/>
+            <a:ext cx="2874698" cy="523220"/>
           </a:xfrm>
           <a:prstGeom prst="rect">
             <a:avLst/>
           </a:prstGeom>
+          <a:noFill/>
         </p:spPr>
         <p:txBody>
-          <a:bodyPr vert="horz" lIns="91440" tIns="45720" rIns="91440" bIns="45720" rtlCol="0">
-            <a:normAutofit/>
+          <a:bodyPr wrap="none" rtlCol="0">
+            <a:spAutoFit/>
           </a:bodyPr>
           <a:lstStyle/>
           <a:p>
-            <a:pPr marL="457200" lvl="0" indent="-457200">
-              <a:spcBef>
-                <a:spcPct val="20000"/>
-              </a:spcBef>
-              <a:buFontTx/>
-              <a:buChar char="-"/>
-              <a:defRPr/>
-            </a:pPr>
             <a:r>
-              <a:rPr lang="en-US" sz="3200" dirty="0" err="1" smtClean="0"/>
-              <a:t>Tiến</a:t>
+              <a:rPr lang="en-US" sz="2800" b="1" dirty="0" err="1" smtClean="0"/>
+              <a:t>Hiện</a:t>
             </a:r>
             <a:r>
-              <a:rPr lang="en-US" sz="3200" dirty="0" smtClean="0"/>
+              <a:rPr lang="en-US" sz="2800" b="1" dirty="0" smtClean="0"/>
               <a:t> </a:t>
             </a:r>
             <a:r>
-              <a:rPr lang="en-US" sz="3200" dirty="0" err="1" smtClean="0"/>
-              <a:t>độ</a:t>
-            </a:r>
-            <a:r>
-              <a:rPr lang="en-US" sz="3200" dirty="0" smtClean="0"/>
-              <a:t> </a:t>
-            </a:r>
-            <a:r>
-              <a:rPr lang="en-US" sz="3200" dirty="0" err="1" smtClean="0"/>
-              <a:t>hiện</a:t>
-            </a:r>
-            <a:r>
-              <a:rPr lang="en-US" sz="3200" dirty="0" smtClean="0"/>
-              <a:t> </a:t>
-            </a:r>
-            <a:r>
-              <a:rPr lang="en-US" sz="3200" dirty="0" err="1" smtClean="0"/>
+              <a:rPr lang="en-US" sz="2800" b="1" dirty="0" err="1" smtClean="0"/>
               <a:t>thực</a:t>
             </a:r>
             <a:r>
-              <a:rPr lang="en-US" sz="3200" dirty="0" smtClean="0"/>
-              <a:t> feature</a:t>
+              <a:rPr lang="en-US" sz="2800" b="1" dirty="0" smtClean="0"/>
+              <a:t> Feature</a:t>
             </a:r>
-          </a:p>
-          <a:p>
-            <a:pPr marL="914400" lvl="1" indent="-457200">
-              <a:spcBef>
-                <a:spcPct val="20000"/>
-              </a:spcBef>
-              <a:buFontTx/>
-              <a:buChar char="-"/>
-              <a:defRPr/>
-            </a:pPr>
-            <a:r>
-              <a:rPr lang="en-US" sz="3200" dirty="0" err="1" smtClean="0"/>
-              <a:t>Lớp</a:t>
-            </a:r>
-            <a:r>
-              <a:rPr lang="en-US" sz="3200" dirty="0" smtClean="0"/>
-              <a:t> Person Instance: </a:t>
-            </a:r>
-            <a:r>
-              <a:rPr lang="en-US" sz="3200" i="1" dirty="0" smtClean="0"/>
-              <a:t>12/29</a:t>
-            </a:r>
-          </a:p>
-          <a:p>
-            <a:pPr marL="914400" lvl="1" indent="-457200">
-              <a:spcBef>
-                <a:spcPct val="20000"/>
-              </a:spcBef>
-              <a:buFontTx/>
-              <a:buChar char="-"/>
-              <a:defRPr/>
-            </a:pPr>
-            <a:r>
-              <a:rPr lang="en-US" sz="3200" dirty="0" err="1" smtClean="0"/>
-              <a:t>Lớp</a:t>
-            </a:r>
-            <a:r>
-              <a:rPr lang="en-US" sz="3200" dirty="0" smtClean="0"/>
-              <a:t> Person Pair: </a:t>
-            </a:r>
-            <a:r>
-              <a:rPr lang="en-US" sz="3200" i="1" dirty="0" smtClean="0"/>
-              <a:t>15/20</a:t>
-            </a:r>
-          </a:p>
-          <a:p>
-            <a:pPr marL="914400" lvl="1" indent="-457200">
-              <a:spcBef>
-                <a:spcPct val="20000"/>
-              </a:spcBef>
-              <a:buFontTx/>
-              <a:buChar char="-"/>
-              <a:defRPr/>
-            </a:pPr>
-            <a:r>
-              <a:rPr lang="en-US" sz="3200" dirty="0" err="1" smtClean="0"/>
-              <a:t>Lớp</a:t>
-            </a:r>
-            <a:r>
-              <a:rPr lang="en-US" sz="3200" dirty="0" smtClean="0"/>
-              <a:t> Pronoun Instance: </a:t>
-            </a:r>
-            <a:r>
-              <a:rPr lang="en-US" sz="3200" i="1" dirty="0" smtClean="0"/>
-              <a:t>7/13</a:t>
-            </a:r>
-          </a:p>
-          <a:p>
-            <a:pPr marL="457200" lvl="0" indent="-457200">
-              <a:spcBef>
-                <a:spcPct val="20000"/>
-              </a:spcBef>
-              <a:buFontTx/>
-              <a:buChar char="-"/>
-              <a:defRPr/>
-            </a:pPr>
-            <a:endParaRPr lang="en-US" sz="3200" dirty="0"/>
+            <a:endParaRPr lang="en-US" sz="2800" b="1" dirty="0"/>
           </a:p>
         </p:txBody>
       </p:sp>
@@ -12674,253 +16189,28 @@
           </a:p>
         </p:txBody>
       </p:sp>
-      <p:sp>
-        <p:nvSpPr>
-          <p:cNvPr id="8" name="Rectangle 8"/>
-          <p:cNvSpPr txBox="1">
-            <a:spLocks/>
-          </p:cNvSpPr>
-          <p:nvPr/>
-        </p:nvSpPr>
-        <p:spPr>
-          <a:xfrm>
-            <a:off x="685800" y="1371600"/>
-            <a:ext cx="7467600" cy="4800600"/>
-          </a:xfrm>
-          <a:prstGeom prst="rect">
-            <a:avLst/>
-          </a:prstGeom>
-        </p:spPr>
-        <p:txBody>
-          <a:bodyPr vert="horz" lIns="91440" tIns="45720" rIns="91440" bIns="45720" rtlCol="0">
-            <a:normAutofit/>
-          </a:bodyPr>
-          <a:lstStyle/>
-          <a:p>
-            <a:pPr marL="457200" lvl="0" indent="-457200">
-              <a:spcBef>
-                <a:spcPct val="20000"/>
-              </a:spcBef>
-              <a:buFontTx/>
-              <a:buChar char="-"/>
-              <a:defRPr/>
-            </a:pPr>
-            <a:r>
-              <a:rPr lang="en-US" sz="3200" dirty="0" smtClean="0"/>
-              <a:t>Train </a:t>
-            </a:r>
-            <a:r>
-              <a:rPr lang="en-US" sz="3200" dirty="0" err="1" smtClean="0"/>
-              <a:t>trên</a:t>
-            </a:r>
-            <a:r>
-              <a:rPr lang="en-US" sz="3200" dirty="0" smtClean="0"/>
-              <a:t> </a:t>
-            </a:r>
-            <a:r>
-              <a:rPr lang="en-US" sz="3200" b="1" dirty="0" smtClean="0"/>
-              <a:t>20</a:t>
-            </a:r>
-            <a:r>
-              <a:rPr lang="en-US" sz="3200" dirty="0" smtClean="0"/>
-              <a:t> </a:t>
-            </a:r>
-            <a:r>
-              <a:rPr lang="en-US" sz="3200" dirty="0" err="1" smtClean="0"/>
-              <a:t>bệnh</a:t>
-            </a:r>
-            <a:r>
-              <a:rPr lang="en-US" sz="3200" dirty="0" smtClean="0"/>
-              <a:t> </a:t>
-            </a:r>
-            <a:r>
-              <a:rPr lang="en-US" sz="3200" dirty="0" err="1" smtClean="0"/>
-              <a:t>án</a:t>
-            </a:r>
-            <a:r>
-              <a:rPr lang="en-US" sz="3200" dirty="0" smtClean="0"/>
-              <a:t> </a:t>
-            </a:r>
-            <a:r>
-              <a:rPr lang="en-US" sz="3200" dirty="0" err="1" smtClean="0"/>
-              <a:t>bất</a:t>
-            </a:r>
-            <a:r>
-              <a:rPr lang="en-US" sz="3200" dirty="0" smtClean="0"/>
-              <a:t> </a:t>
-            </a:r>
-            <a:r>
-              <a:rPr lang="en-US" sz="3200" dirty="0" err="1" smtClean="0"/>
-              <a:t>kì</a:t>
-            </a:r>
-            <a:r>
-              <a:rPr lang="en-US" sz="3200" dirty="0" smtClean="0"/>
-              <a:t>, Test </a:t>
-            </a:r>
-            <a:r>
-              <a:rPr lang="en-US" sz="3200" dirty="0" err="1" smtClean="0"/>
-              <a:t>trên</a:t>
-            </a:r>
-            <a:r>
-              <a:rPr lang="en-US" sz="3200" dirty="0" smtClean="0"/>
-              <a:t> </a:t>
-            </a:r>
-            <a:r>
-              <a:rPr lang="en-US" sz="3200" b="1" dirty="0" smtClean="0"/>
-              <a:t>20</a:t>
-            </a:r>
-            <a:r>
-              <a:rPr lang="en-US" sz="3200" dirty="0" smtClean="0"/>
-              <a:t> </a:t>
-            </a:r>
-            <a:r>
-              <a:rPr lang="en-US" sz="3200" dirty="0" err="1" smtClean="0"/>
-              <a:t>bệnh</a:t>
-            </a:r>
-            <a:r>
-              <a:rPr lang="en-US" sz="3200" dirty="0" smtClean="0"/>
-              <a:t> </a:t>
-            </a:r>
-            <a:r>
-              <a:rPr lang="en-US" sz="3200" dirty="0" err="1" smtClean="0"/>
-              <a:t>án</a:t>
-            </a:r>
-            <a:r>
-              <a:rPr lang="en-US" sz="3200" dirty="0" smtClean="0"/>
-              <a:t> </a:t>
-            </a:r>
-            <a:r>
-              <a:rPr lang="en-US" sz="3200" dirty="0" err="1" smtClean="0"/>
-              <a:t>bất</a:t>
-            </a:r>
-            <a:r>
-              <a:rPr lang="en-US" sz="3200" dirty="0" smtClean="0"/>
-              <a:t> </a:t>
-            </a:r>
-            <a:r>
-              <a:rPr lang="en-US" sz="3200" dirty="0" err="1" smtClean="0"/>
-              <a:t>kì</a:t>
-            </a:r>
-            <a:endParaRPr lang="en-US" sz="3200" dirty="0" smtClean="0"/>
-          </a:p>
-          <a:p>
-            <a:pPr marL="457200" lvl="0" indent="-457200">
-              <a:spcBef>
-                <a:spcPct val="20000"/>
-              </a:spcBef>
-              <a:buFontTx/>
-              <a:buChar char="-"/>
-              <a:defRPr/>
-            </a:pPr>
-            <a:r>
-              <a:rPr lang="en-US" sz="3200" dirty="0" err="1" smtClean="0"/>
-              <a:t>Kết</a:t>
-            </a:r>
-            <a:r>
-              <a:rPr lang="en-US" sz="3200" dirty="0" smtClean="0"/>
-              <a:t> </a:t>
-            </a:r>
-            <a:r>
-              <a:rPr lang="en-US" sz="3200" dirty="0" err="1" smtClean="0"/>
-              <a:t>quả</a:t>
-            </a:r>
-            <a:r>
-              <a:rPr lang="en-US" sz="3200" dirty="0" smtClean="0"/>
-              <a:t> </a:t>
-            </a:r>
-            <a:r>
-              <a:rPr lang="en-US" sz="3200" dirty="0" err="1" smtClean="0"/>
-              <a:t>đạt</a:t>
-            </a:r>
-            <a:r>
-              <a:rPr lang="en-US" sz="3200" dirty="0" smtClean="0"/>
-              <a:t> </a:t>
-            </a:r>
-            <a:r>
-              <a:rPr lang="en-US" sz="3200" dirty="0" err="1" smtClean="0"/>
-              <a:t>được</a:t>
-            </a:r>
-            <a:endParaRPr lang="en-US" sz="3200" dirty="0" smtClean="0"/>
-          </a:p>
-          <a:p>
-            <a:pPr marL="914400" lvl="1" indent="-457200">
-              <a:spcBef>
-                <a:spcPct val="20000"/>
-              </a:spcBef>
-              <a:buFontTx/>
-              <a:buChar char="-"/>
-              <a:defRPr/>
-            </a:pPr>
-            <a:r>
-              <a:rPr lang="en-US" sz="3200" dirty="0" err="1" smtClean="0"/>
-              <a:t>Lớp</a:t>
-            </a:r>
-            <a:r>
-              <a:rPr lang="en-US" sz="3200" dirty="0" smtClean="0"/>
-              <a:t> Person Instance: </a:t>
-            </a:r>
-            <a:r>
-              <a:rPr lang="en-US" sz="3200" i="1" dirty="0" smtClean="0"/>
-              <a:t>78.45%</a:t>
-            </a:r>
-          </a:p>
-          <a:p>
-            <a:pPr marL="914400" lvl="1" indent="-457200">
-              <a:spcBef>
-                <a:spcPct val="20000"/>
-              </a:spcBef>
-              <a:buFontTx/>
-              <a:buChar char="-"/>
-              <a:defRPr/>
-            </a:pPr>
-            <a:r>
-              <a:rPr lang="en-US" sz="3200" dirty="0" err="1" smtClean="0"/>
-              <a:t>Lớp</a:t>
-            </a:r>
-            <a:r>
-              <a:rPr lang="en-US" sz="3200" dirty="0" smtClean="0"/>
-              <a:t> Person Pair: </a:t>
-            </a:r>
-            <a:r>
-              <a:rPr lang="en-US" sz="3200" i="1" dirty="0" smtClean="0"/>
-              <a:t>63.91%</a:t>
-            </a:r>
-          </a:p>
-          <a:p>
-            <a:pPr marL="914400" lvl="1" indent="-457200">
-              <a:spcBef>
-                <a:spcPct val="20000"/>
-              </a:spcBef>
-              <a:buFontTx/>
-              <a:buChar char="-"/>
-              <a:defRPr/>
-            </a:pPr>
-            <a:r>
-              <a:rPr lang="en-US" sz="3200" dirty="0" err="1" smtClean="0"/>
-              <a:t>Lớp</a:t>
-            </a:r>
-            <a:r>
-              <a:rPr lang="en-US" sz="3200" dirty="0" smtClean="0"/>
-              <a:t> Pronoun Instance: </a:t>
-            </a:r>
-            <a:r>
-              <a:rPr lang="en-US" sz="3200" i="1" dirty="0" smtClean="0"/>
-              <a:t>72.95%</a:t>
-            </a:r>
-          </a:p>
-          <a:p>
-            <a:pPr marL="457200" lvl="0" indent="-457200">
-              <a:spcBef>
-                <a:spcPct val="20000"/>
-              </a:spcBef>
-              <a:buFontTx/>
-              <a:buChar char="-"/>
-              <a:defRPr/>
-            </a:pPr>
-            <a:endParaRPr lang="en-US" sz="3200" dirty="0"/>
-          </a:p>
-        </p:txBody>
-      </p:sp>
+      <p:graphicFrame>
+        <p:nvGraphicFramePr>
+          <p:cNvPr id="16" name="Chart 15"/>
+          <p:cNvGraphicFramePr/>
+          <p:nvPr>
+            <p:extLst>
+              <p:ext uri="{D42A27DB-BD31-4B8C-83A1-F6EECF244321}">
+                <p14:modId xmlns:p14="http://schemas.microsoft.com/office/powerpoint/2010/main" val="325414996"/>
+              </p:ext>
+            </p:extLst>
+          </p:nvPr>
+        </p:nvGraphicFramePr>
+        <p:xfrm>
+          <a:off x="266699" y="1142998"/>
+          <a:ext cx="8610601" cy="4953002"/>
+        </p:xfrm>
+        <a:graphic>
+          <a:graphicData uri="http://schemas.openxmlformats.org/drawingml/2006/chart">
+            <c:chart xmlns:c="http://schemas.openxmlformats.org/drawingml/2006/chart" xmlns:r="http://schemas.openxmlformats.org/officeDocument/2006/relationships" r:id="rId3"/>
+          </a:graphicData>
+        </a:graphic>
+      </p:graphicFrame>
     </p:spTree>
     <p:extLst>
       <p:ext uri="{BB962C8B-B14F-4D97-AF65-F5344CB8AC3E}">

</xml_diff>